<commit_message>
Cambios en la presentacion de la fabrica de zapatos
</commit_message>
<xml_diff>
--- a/Documentos/ActividadesEnClase/ComplementoPrimeraActividad/ComplementoActividadClase.pptx
+++ b/Documentos/ActividadesEnClase/ComplementoPrimeraActividad/ComplementoActividadClase.pptx
@@ -5,23 +5,27 @@
     <p:sldMasterId id="2147483659" r:id="rId4"/>
   </p:sldMasterIdLst>
   <p:notesMasterIdLst>
-    <p:notesMasterId r:id="rId19"/>
+    <p:notesMasterId r:id="rId23"/>
   </p:notesMasterIdLst>
   <p:sldIdLst>
     <p:sldId id="256" r:id="rId5"/>
-    <p:sldId id="259" r:id="rId6"/>
-    <p:sldId id="267" r:id="rId7"/>
-    <p:sldId id="268" r:id="rId8"/>
-    <p:sldId id="269" r:id="rId9"/>
-    <p:sldId id="270" r:id="rId10"/>
-    <p:sldId id="275" r:id="rId11"/>
+    <p:sldId id="267" r:id="rId6"/>
+    <p:sldId id="259" r:id="rId7"/>
+    <p:sldId id="270" r:id="rId8"/>
+    <p:sldId id="275" r:id="rId9"/>
+    <p:sldId id="268" r:id="rId10"/>
+    <p:sldId id="269" r:id="rId11"/>
     <p:sldId id="276" r:id="rId12"/>
     <p:sldId id="278" r:id="rId13"/>
     <p:sldId id="277" r:id="rId14"/>
     <p:sldId id="279" r:id="rId15"/>
     <p:sldId id="280" r:id="rId16"/>
     <p:sldId id="281" r:id="rId17"/>
-    <p:sldId id="263" r:id="rId18"/>
+    <p:sldId id="282" r:id="rId18"/>
+    <p:sldId id="283" r:id="rId19"/>
+    <p:sldId id="284" r:id="rId20"/>
+    <p:sldId id="285" r:id="rId21"/>
+    <p:sldId id="263" r:id="rId22"/>
   </p:sldIdLst>
   <p:sldSz cx="9144000" cy="5143500" type="screen16x9"/>
   <p:notesSz cx="6858000" cy="9144000"/>
@@ -1032,6 +1036,430 @@
   <p:cSld>
     <p:spTree>
       <p:nvGrpSpPr>
+        <p:cNvPr id="1" name="Shape 72"/>
+        <p:cNvGrpSpPr/>
+        <p:nvPr/>
+      </p:nvGrpSpPr>
+      <p:grpSpPr>
+        <a:xfrm>
+          <a:off x="0" y="0"/>
+          <a:ext cx="0" cy="0"/>
+          <a:chOff x="0" y="0"/>
+          <a:chExt cx="0" cy="0"/>
+        </a:xfrm>
+      </p:grpSpPr>
+      <p:sp>
+        <p:nvSpPr>
+          <p:cNvPr id="73" name="Shape 73"/>
+          <p:cNvSpPr>
+            <a:spLocks noGrp="1" noRot="1" noChangeAspect="1"/>
+          </p:cNvSpPr>
+          <p:nvPr>
+            <p:ph type="sldImg" idx="2"/>
+          </p:nvPr>
+        </p:nvSpPr>
+        <p:spPr>
+          <a:xfrm>
+            <a:off x="381000" y="685800"/>
+            <a:ext cx="6096000" cy="3429000"/>
+          </a:xfrm>
+          <a:custGeom>
+            <a:avLst/>
+            <a:gdLst/>
+            <a:ahLst/>
+            <a:cxnLst/>
+            <a:rect l="0" t="0" r="0" b="0"/>
+            <a:pathLst>
+              <a:path w="120000" h="120000" extrusionOk="0">
+                <a:moveTo>
+                  <a:pt x="0" y="0"/>
+                </a:moveTo>
+                <a:lnTo>
+                  <a:pt x="120000" y="0"/>
+                </a:lnTo>
+                <a:lnTo>
+                  <a:pt x="120000" y="120000"/>
+                </a:lnTo>
+                <a:lnTo>
+                  <a:pt x="0" y="120000"/>
+                </a:lnTo>
+                <a:close/>
+              </a:path>
+            </a:pathLst>
+          </a:custGeom>
+        </p:spPr>
+      </p:sp>
+      <p:sp>
+        <p:nvSpPr>
+          <p:cNvPr id="74" name="Shape 74"/>
+          <p:cNvSpPr txBox="1">
+            <a:spLocks noGrp="1"/>
+          </p:cNvSpPr>
+          <p:nvPr>
+            <p:ph type="body" idx="1"/>
+          </p:nvPr>
+        </p:nvSpPr>
+        <p:spPr>
+          <a:xfrm>
+            <a:off x="685800" y="4343400"/>
+            <a:ext cx="5486400" cy="4114800"/>
+          </a:xfrm>
+          <a:prstGeom prst="rect">
+            <a:avLst/>
+          </a:prstGeom>
+        </p:spPr>
+        <p:txBody>
+          <a:bodyPr lIns="91425" tIns="91425" rIns="91425" bIns="91425" anchor="t" anchorCtr="0">
+            <a:noAutofit/>
+          </a:bodyPr>
+          <a:lstStyle/>
+          <a:p>
+            <a:pPr lvl="0" rtl="0">
+              <a:spcBef>
+                <a:spcPts val="0"/>
+              </a:spcBef>
+              <a:buNone/>
+            </a:pPr>
+            <a:endParaRPr dirty="0"/>
+          </a:p>
+        </p:txBody>
+      </p:sp>
+    </p:spTree>
+    <p:extLst>
+      <p:ext uri="{BB962C8B-B14F-4D97-AF65-F5344CB8AC3E}">
+        <p14:creationId xmlns:p14="http://schemas.microsoft.com/office/powerpoint/2010/main" val="3795936684"/>
+      </p:ext>
+    </p:extLst>
+  </p:cSld>
+  <p:clrMapOvr>
+    <a:masterClrMapping/>
+  </p:clrMapOvr>
+</p:notes>
+</file>
+
+<file path=ppt/notesSlides/notesSlide15.xml><?xml version="1.0" encoding="utf-8"?>
+<p:notes xmlns:a="http://schemas.openxmlformats.org/drawingml/2006/main" xmlns:r="http://schemas.openxmlformats.org/officeDocument/2006/relationships" xmlns:p="http://schemas.openxmlformats.org/presentationml/2006/main" showMasterSp="0" showMasterPhAnim="0">
+  <p:cSld>
+    <p:spTree>
+      <p:nvGrpSpPr>
+        <p:cNvPr id="1" name="Shape 72"/>
+        <p:cNvGrpSpPr/>
+        <p:nvPr/>
+      </p:nvGrpSpPr>
+      <p:grpSpPr>
+        <a:xfrm>
+          <a:off x="0" y="0"/>
+          <a:ext cx="0" cy="0"/>
+          <a:chOff x="0" y="0"/>
+          <a:chExt cx="0" cy="0"/>
+        </a:xfrm>
+      </p:grpSpPr>
+      <p:sp>
+        <p:nvSpPr>
+          <p:cNvPr id="73" name="Shape 73"/>
+          <p:cNvSpPr>
+            <a:spLocks noGrp="1" noRot="1" noChangeAspect="1"/>
+          </p:cNvSpPr>
+          <p:nvPr>
+            <p:ph type="sldImg" idx="2"/>
+          </p:nvPr>
+        </p:nvSpPr>
+        <p:spPr>
+          <a:xfrm>
+            <a:off x="381000" y="685800"/>
+            <a:ext cx="6096000" cy="3429000"/>
+          </a:xfrm>
+          <a:custGeom>
+            <a:avLst/>
+            <a:gdLst/>
+            <a:ahLst/>
+            <a:cxnLst/>
+            <a:rect l="0" t="0" r="0" b="0"/>
+            <a:pathLst>
+              <a:path w="120000" h="120000" extrusionOk="0">
+                <a:moveTo>
+                  <a:pt x="0" y="0"/>
+                </a:moveTo>
+                <a:lnTo>
+                  <a:pt x="120000" y="0"/>
+                </a:lnTo>
+                <a:lnTo>
+                  <a:pt x="120000" y="120000"/>
+                </a:lnTo>
+                <a:lnTo>
+                  <a:pt x="0" y="120000"/>
+                </a:lnTo>
+                <a:close/>
+              </a:path>
+            </a:pathLst>
+          </a:custGeom>
+        </p:spPr>
+      </p:sp>
+      <p:sp>
+        <p:nvSpPr>
+          <p:cNvPr id="74" name="Shape 74"/>
+          <p:cNvSpPr txBox="1">
+            <a:spLocks noGrp="1"/>
+          </p:cNvSpPr>
+          <p:nvPr>
+            <p:ph type="body" idx="1"/>
+          </p:nvPr>
+        </p:nvSpPr>
+        <p:spPr>
+          <a:xfrm>
+            <a:off x="685800" y="4343400"/>
+            <a:ext cx="5486400" cy="4114800"/>
+          </a:xfrm>
+          <a:prstGeom prst="rect">
+            <a:avLst/>
+          </a:prstGeom>
+        </p:spPr>
+        <p:txBody>
+          <a:bodyPr lIns="91425" tIns="91425" rIns="91425" bIns="91425" anchor="t" anchorCtr="0">
+            <a:noAutofit/>
+          </a:bodyPr>
+          <a:lstStyle/>
+          <a:p>
+            <a:pPr lvl="0" rtl="0">
+              <a:spcBef>
+                <a:spcPts val="0"/>
+              </a:spcBef>
+              <a:buNone/>
+            </a:pPr>
+            <a:endParaRPr dirty="0"/>
+          </a:p>
+        </p:txBody>
+      </p:sp>
+    </p:spTree>
+    <p:extLst>
+      <p:ext uri="{BB962C8B-B14F-4D97-AF65-F5344CB8AC3E}">
+        <p14:creationId xmlns:p14="http://schemas.microsoft.com/office/powerpoint/2010/main" val="2080053374"/>
+      </p:ext>
+    </p:extLst>
+  </p:cSld>
+  <p:clrMapOvr>
+    <a:masterClrMapping/>
+  </p:clrMapOvr>
+</p:notes>
+</file>
+
+<file path=ppt/notesSlides/notesSlide16.xml><?xml version="1.0" encoding="utf-8"?>
+<p:notes xmlns:a="http://schemas.openxmlformats.org/drawingml/2006/main" xmlns:r="http://schemas.openxmlformats.org/officeDocument/2006/relationships" xmlns:p="http://schemas.openxmlformats.org/presentationml/2006/main" showMasterSp="0" showMasterPhAnim="0">
+  <p:cSld>
+    <p:spTree>
+      <p:nvGrpSpPr>
+        <p:cNvPr id="1" name="Shape 72"/>
+        <p:cNvGrpSpPr/>
+        <p:nvPr/>
+      </p:nvGrpSpPr>
+      <p:grpSpPr>
+        <a:xfrm>
+          <a:off x="0" y="0"/>
+          <a:ext cx="0" cy="0"/>
+          <a:chOff x="0" y="0"/>
+          <a:chExt cx="0" cy="0"/>
+        </a:xfrm>
+      </p:grpSpPr>
+      <p:sp>
+        <p:nvSpPr>
+          <p:cNvPr id="73" name="Shape 73"/>
+          <p:cNvSpPr>
+            <a:spLocks noGrp="1" noRot="1" noChangeAspect="1"/>
+          </p:cNvSpPr>
+          <p:nvPr>
+            <p:ph type="sldImg" idx="2"/>
+          </p:nvPr>
+        </p:nvSpPr>
+        <p:spPr>
+          <a:xfrm>
+            <a:off x="381000" y="685800"/>
+            <a:ext cx="6096000" cy="3429000"/>
+          </a:xfrm>
+          <a:custGeom>
+            <a:avLst/>
+            <a:gdLst/>
+            <a:ahLst/>
+            <a:cxnLst/>
+            <a:rect l="0" t="0" r="0" b="0"/>
+            <a:pathLst>
+              <a:path w="120000" h="120000" extrusionOk="0">
+                <a:moveTo>
+                  <a:pt x="0" y="0"/>
+                </a:moveTo>
+                <a:lnTo>
+                  <a:pt x="120000" y="0"/>
+                </a:lnTo>
+                <a:lnTo>
+                  <a:pt x="120000" y="120000"/>
+                </a:lnTo>
+                <a:lnTo>
+                  <a:pt x="0" y="120000"/>
+                </a:lnTo>
+                <a:close/>
+              </a:path>
+            </a:pathLst>
+          </a:custGeom>
+        </p:spPr>
+      </p:sp>
+      <p:sp>
+        <p:nvSpPr>
+          <p:cNvPr id="74" name="Shape 74"/>
+          <p:cNvSpPr txBox="1">
+            <a:spLocks noGrp="1"/>
+          </p:cNvSpPr>
+          <p:nvPr>
+            <p:ph type="body" idx="1"/>
+          </p:nvPr>
+        </p:nvSpPr>
+        <p:spPr>
+          <a:xfrm>
+            <a:off x="685800" y="4343400"/>
+            <a:ext cx="5486400" cy="4114800"/>
+          </a:xfrm>
+          <a:prstGeom prst="rect">
+            <a:avLst/>
+          </a:prstGeom>
+        </p:spPr>
+        <p:txBody>
+          <a:bodyPr lIns="91425" tIns="91425" rIns="91425" bIns="91425" anchor="t" anchorCtr="0">
+            <a:noAutofit/>
+          </a:bodyPr>
+          <a:lstStyle/>
+          <a:p>
+            <a:pPr lvl="0" rtl="0">
+              <a:spcBef>
+                <a:spcPts val="0"/>
+              </a:spcBef>
+              <a:buNone/>
+            </a:pPr>
+            <a:endParaRPr dirty="0"/>
+          </a:p>
+        </p:txBody>
+      </p:sp>
+    </p:spTree>
+    <p:extLst>
+      <p:ext uri="{BB962C8B-B14F-4D97-AF65-F5344CB8AC3E}">
+        <p14:creationId xmlns:p14="http://schemas.microsoft.com/office/powerpoint/2010/main" val="3422672312"/>
+      </p:ext>
+    </p:extLst>
+  </p:cSld>
+  <p:clrMapOvr>
+    <a:masterClrMapping/>
+  </p:clrMapOvr>
+</p:notes>
+</file>
+
+<file path=ppt/notesSlides/notesSlide17.xml><?xml version="1.0" encoding="utf-8"?>
+<p:notes xmlns:a="http://schemas.openxmlformats.org/drawingml/2006/main" xmlns:r="http://schemas.openxmlformats.org/officeDocument/2006/relationships" xmlns:p="http://schemas.openxmlformats.org/presentationml/2006/main" showMasterSp="0" showMasterPhAnim="0">
+  <p:cSld>
+    <p:spTree>
+      <p:nvGrpSpPr>
+        <p:cNvPr id="1" name="Shape 72"/>
+        <p:cNvGrpSpPr/>
+        <p:nvPr/>
+      </p:nvGrpSpPr>
+      <p:grpSpPr>
+        <a:xfrm>
+          <a:off x="0" y="0"/>
+          <a:ext cx="0" cy="0"/>
+          <a:chOff x="0" y="0"/>
+          <a:chExt cx="0" cy="0"/>
+        </a:xfrm>
+      </p:grpSpPr>
+      <p:sp>
+        <p:nvSpPr>
+          <p:cNvPr id="73" name="Shape 73"/>
+          <p:cNvSpPr>
+            <a:spLocks noGrp="1" noRot="1" noChangeAspect="1"/>
+          </p:cNvSpPr>
+          <p:nvPr>
+            <p:ph type="sldImg" idx="2"/>
+          </p:nvPr>
+        </p:nvSpPr>
+        <p:spPr>
+          <a:xfrm>
+            <a:off x="381000" y="685800"/>
+            <a:ext cx="6096000" cy="3429000"/>
+          </a:xfrm>
+          <a:custGeom>
+            <a:avLst/>
+            <a:gdLst/>
+            <a:ahLst/>
+            <a:cxnLst/>
+            <a:rect l="0" t="0" r="0" b="0"/>
+            <a:pathLst>
+              <a:path w="120000" h="120000" extrusionOk="0">
+                <a:moveTo>
+                  <a:pt x="0" y="0"/>
+                </a:moveTo>
+                <a:lnTo>
+                  <a:pt x="120000" y="0"/>
+                </a:lnTo>
+                <a:lnTo>
+                  <a:pt x="120000" y="120000"/>
+                </a:lnTo>
+                <a:lnTo>
+                  <a:pt x="0" y="120000"/>
+                </a:lnTo>
+                <a:close/>
+              </a:path>
+            </a:pathLst>
+          </a:custGeom>
+        </p:spPr>
+      </p:sp>
+      <p:sp>
+        <p:nvSpPr>
+          <p:cNvPr id="74" name="Shape 74"/>
+          <p:cNvSpPr txBox="1">
+            <a:spLocks noGrp="1"/>
+          </p:cNvSpPr>
+          <p:nvPr>
+            <p:ph type="body" idx="1"/>
+          </p:nvPr>
+        </p:nvSpPr>
+        <p:spPr>
+          <a:xfrm>
+            <a:off x="685800" y="4343400"/>
+            <a:ext cx="5486400" cy="4114800"/>
+          </a:xfrm>
+          <a:prstGeom prst="rect">
+            <a:avLst/>
+          </a:prstGeom>
+        </p:spPr>
+        <p:txBody>
+          <a:bodyPr lIns="91425" tIns="91425" rIns="91425" bIns="91425" anchor="t" anchorCtr="0">
+            <a:noAutofit/>
+          </a:bodyPr>
+          <a:lstStyle/>
+          <a:p>
+            <a:pPr lvl="0" rtl="0">
+              <a:spcBef>
+                <a:spcPts val="0"/>
+              </a:spcBef>
+              <a:buNone/>
+            </a:pPr>
+            <a:endParaRPr dirty="0"/>
+          </a:p>
+        </p:txBody>
+      </p:sp>
+    </p:spTree>
+    <p:extLst>
+      <p:ext uri="{BB962C8B-B14F-4D97-AF65-F5344CB8AC3E}">
+        <p14:creationId xmlns:p14="http://schemas.microsoft.com/office/powerpoint/2010/main" val="3510789590"/>
+      </p:ext>
+    </p:extLst>
+  </p:cSld>
+  <p:clrMapOvr>
+    <a:masterClrMapping/>
+  </p:clrMapOvr>
+</p:notes>
+</file>
+
+<file path=ppt/notesSlides/notesSlide18.xml><?xml version="1.0" encoding="utf-8"?>
+<p:notes xmlns:a="http://schemas.openxmlformats.org/drawingml/2006/main" xmlns:r="http://schemas.openxmlformats.org/officeDocument/2006/relationships" xmlns:p="http://schemas.openxmlformats.org/presentationml/2006/main" showMasterSp="0" showMasterPhAnim="0">
+  <p:cSld>
+    <p:spTree>
+      <p:nvGrpSpPr>
         <p:cNvPr id="1" name="Shape 101"/>
         <p:cNvGrpSpPr/>
         <p:nvPr/>
@@ -1229,7 +1657,7 @@
     </p:spTree>
     <p:extLst>
       <p:ext uri="{BB962C8B-B14F-4D97-AF65-F5344CB8AC3E}">
-        <p14:creationId xmlns:p14="http://schemas.microsoft.com/office/powerpoint/2010/main" val="2511305184"/>
+        <p14:creationId xmlns:p14="http://schemas.microsoft.com/office/powerpoint/2010/main" val="3298022075"/>
       </p:ext>
     </p:extLst>
   </p:cSld>
@@ -1335,7 +1763,7 @@
     </p:spTree>
     <p:extLst>
       <p:ext uri="{BB962C8B-B14F-4D97-AF65-F5344CB8AC3E}">
-        <p14:creationId xmlns:p14="http://schemas.microsoft.com/office/powerpoint/2010/main" val="3298022075"/>
+        <p14:creationId xmlns:p14="http://schemas.microsoft.com/office/powerpoint/2010/main" val="2511305184"/>
       </p:ext>
     </p:extLst>
   </p:cSld>
@@ -1441,7 +1869,7 @@
     </p:spTree>
     <p:extLst>
       <p:ext uri="{BB962C8B-B14F-4D97-AF65-F5344CB8AC3E}">
-        <p14:creationId xmlns:p14="http://schemas.microsoft.com/office/powerpoint/2010/main" val="1981828436"/>
+        <p14:creationId xmlns:p14="http://schemas.microsoft.com/office/powerpoint/2010/main" val="1995000199"/>
       </p:ext>
     </p:extLst>
   </p:cSld>
@@ -1547,7 +1975,7 @@
     </p:spTree>
     <p:extLst>
       <p:ext uri="{BB962C8B-B14F-4D97-AF65-F5344CB8AC3E}">
-        <p14:creationId xmlns:p14="http://schemas.microsoft.com/office/powerpoint/2010/main" val="1732087590"/>
+        <p14:creationId xmlns:p14="http://schemas.microsoft.com/office/powerpoint/2010/main" val="3394488298"/>
       </p:ext>
     </p:extLst>
   </p:cSld>
@@ -1653,7 +2081,7 @@
     </p:spTree>
     <p:extLst>
       <p:ext uri="{BB962C8B-B14F-4D97-AF65-F5344CB8AC3E}">
-        <p14:creationId xmlns:p14="http://schemas.microsoft.com/office/powerpoint/2010/main" val="1995000199"/>
+        <p14:creationId xmlns:p14="http://schemas.microsoft.com/office/powerpoint/2010/main" val="1981828436"/>
       </p:ext>
     </p:extLst>
   </p:cSld>
@@ -1759,7 +2187,7 @@
     </p:spTree>
     <p:extLst>
       <p:ext uri="{BB962C8B-B14F-4D97-AF65-F5344CB8AC3E}">
-        <p14:creationId xmlns:p14="http://schemas.microsoft.com/office/powerpoint/2010/main" val="3394488298"/>
+        <p14:creationId xmlns:p14="http://schemas.microsoft.com/office/powerpoint/2010/main" val="1732087590"/>
       </p:ext>
     </p:extLst>
   </p:cSld>
@@ -5474,6 +5902,13 @@
   <p:clrMapOvr>
     <a:masterClrMapping/>
   </p:clrMapOvr>
+  <p:timing>
+    <p:tnLst>
+      <p:par>
+        <p:cTn id="1" dur="indefinite" restart="never" nodeType="tmRoot"/>
+      </p:par>
+    </p:tnLst>
+  </p:timing>
 </p:sld>
 </file>
 
@@ -5512,7 +5947,7 @@
           <p:cNvPr id="2" name="Shape 76">
             <a:extLst>
               <a:ext uri="{FF2B5EF4-FFF2-40B4-BE49-F238E27FC236}">
-                <a16:creationId xmlns:a16="http://schemas.microsoft.com/office/drawing/2014/main" id="{53C233B4-85B1-4BA1-A512-E0FD3FF78830}"/>
+                <a16:creationId xmlns="" xmlns:a16="http://schemas.microsoft.com/office/drawing/2014/main" id="{53C233B4-85B1-4BA1-A512-E0FD3FF78830}"/>
               </a:ext>
             </a:extLst>
           </p:cNvPr>
@@ -5565,7 +6000,7 @@
           <p:cNvPr id="3" name="Shape 77">
             <a:extLst>
               <a:ext uri="{FF2B5EF4-FFF2-40B4-BE49-F238E27FC236}">
-                <a16:creationId xmlns:a16="http://schemas.microsoft.com/office/drawing/2014/main" id="{08A6C367-C85B-4C21-800C-3BB63CD57AA4}"/>
+                <a16:creationId xmlns="" xmlns:a16="http://schemas.microsoft.com/office/drawing/2014/main" id="{08A6C367-C85B-4C21-800C-3BB63CD57AA4}"/>
               </a:ext>
             </a:extLst>
           </p:cNvPr>
@@ -5597,7 +6032,7 @@
           <p:cNvPr id="4" name="Marcador de contenido 2">
             <a:extLst>
               <a:ext uri="{FF2B5EF4-FFF2-40B4-BE49-F238E27FC236}">
-                <a16:creationId xmlns:a16="http://schemas.microsoft.com/office/drawing/2014/main" id="{C825BB67-98F6-4EED-8DAB-7A6E7335C2A9}"/>
+                <a16:creationId xmlns="" xmlns:a16="http://schemas.microsoft.com/office/drawing/2014/main" id="{C825BB67-98F6-4EED-8DAB-7A6E7335C2A9}"/>
               </a:ext>
             </a:extLst>
           </p:cNvPr>
@@ -5888,6 +6323,13 @@
   <p:clrMapOvr>
     <a:masterClrMapping/>
   </p:clrMapOvr>
+  <p:timing>
+    <p:tnLst>
+      <p:par>
+        <p:cTn id="1" dur="indefinite" restart="never" nodeType="tmRoot"/>
+      </p:par>
+    </p:tnLst>
+  </p:timing>
 </p:sld>
 </file>
 
@@ -5926,7 +6368,7 @@
           <p:cNvPr id="2" name="Shape 76">
             <a:extLst>
               <a:ext uri="{FF2B5EF4-FFF2-40B4-BE49-F238E27FC236}">
-                <a16:creationId xmlns:a16="http://schemas.microsoft.com/office/drawing/2014/main" id="{53C233B4-85B1-4BA1-A512-E0FD3FF78830}"/>
+                <a16:creationId xmlns="" xmlns:a16="http://schemas.microsoft.com/office/drawing/2014/main" id="{53C233B4-85B1-4BA1-A512-E0FD3FF78830}"/>
               </a:ext>
             </a:extLst>
           </p:cNvPr>
@@ -5979,7 +6421,7 @@
           <p:cNvPr id="3" name="Shape 77">
             <a:extLst>
               <a:ext uri="{FF2B5EF4-FFF2-40B4-BE49-F238E27FC236}">
-                <a16:creationId xmlns:a16="http://schemas.microsoft.com/office/drawing/2014/main" id="{08A6C367-C85B-4C21-800C-3BB63CD57AA4}"/>
+                <a16:creationId xmlns="" xmlns:a16="http://schemas.microsoft.com/office/drawing/2014/main" id="{08A6C367-C85B-4C21-800C-3BB63CD57AA4}"/>
               </a:ext>
             </a:extLst>
           </p:cNvPr>
@@ -6011,7 +6453,7 @@
           <p:cNvPr id="4" name="Marcador de contenido 2">
             <a:extLst>
               <a:ext uri="{FF2B5EF4-FFF2-40B4-BE49-F238E27FC236}">
-                <a16:creationId xmlns:a16="http://schemas.microsoft.com/office/drawing/2014/main" id="{C825BB67-98F6-4EED-8DAB-7A6E7335C2A9}"/>
+                <a16:creationId xmlns="" xmlns:a16="http://schemas.microsoft.com/office/drawing/2014/main" id="{C825BB67-98F6-4EED-8DAB-7A6E7335C2A9}"/>
               </a:ext>
             </a:extLst>
           </p:cNvPr>
@@ -6302,6 +6744,13 @@
   <p:clrMapOvr>
     <a:masterClrMapping/>
   </p:clrMapOvr>
+  <p:timing>
+    <p:tnLst>
+      <p:par>
+        <p:cTn id="1" dur="indefinite" restart="never" nodeType="tmRoot"/>
+      </p:par>
+    </p:tnLst>
+  </p:timing>
 </p:sld>
 </file>
 
@@ -6340,7 +6789,7 @@
           <p:cNvPr id="2" name="Shape 76">
             <a:extLst>
               <a:ext uri="{FF2B5EF4-FFF2-40B4-BE49-F238E27FC236}">
-                <a16:creationId xmlns:a16="http://schemas.microsoft.com/office/drawing/2014/main" id="{53C233B4-85B1-4BA1-A512-E0FD3FF78830}"/>
+                <a16:creationId xmlns="" xmlns:a16="http://schemas.microsoft.com/office/drawing/2014/main" id="{53C233B4-85B1-4BA1-A512-E0FD3FF78830}"/>
               </a:ext>
             </a:extLst>
           </p:cNvPr>
@@ -6393,7 +6842,7 @@
           <p:cNvPr id="3" name="Shape 77">
             <a:extLst>
               <a:ext uri="{FF2B5EF4-FFF2-40B4-BE49-F238E27FC236}">
-                <a16:creationId xmlns:a16="http://schemas.microsoft.com/office/drawing/2014/main" id="{08A6C367-C85B-4C21-800C-3BB63CD57AA4}"/>
+                <a16:creationId xmlns="" xmlns:a16="http://schemas.microsoft.com/office/drawing/2014/main" id="{08A6C367-C85B-4C21-800C-3BB63CD57AA4}"/>
               </a:ext>
             </a:extLst>
           </p:cNvPr>
@@ -6425,7 +6874,7 @@
           <p:cNvPr id="4" name="Marcador de contenido 2">
             <a:extLst>
               <a:ext uri="{FF2B5EF4-FFF2-40B4-BE49-F238E27FC236}">
-                <a16:creationId xmlns:a16="http://schemas.microsoft.com/office/drawing/2014/main" id="{C825BB67-98F6-4EED-8DAB-7A6E7335C2A9}"/>
+                <a16:creationId xmlns="" xmlns:a16="http://schemas.microsoft.com/office/drawing/2014/main" id="{C825BB67-98F6-4EED-8DAB-7A6E7335C2A9}"/>
               </a:ext>
             </a:extLst>
           </p:cNvPr>
@@ -6699,6 +7148,13 @@
   <p:clrMapOvr>
     <a:masterClrMapping/>
   </p:clrMapOvr>
+  <p:timing>
+    <p:tnLst>
+      <p:par>
+        <p:cTn id="1" dur="indefinite" restart="never" nodeType="tmRoot"/>
+      </p:par>
+    </p:tnLst>
+  </p:timing>
 </p:sld>
 </file>
 
@@ -6737,7 +7193,7 @@
           <p:cNvPr id="2" name="Shape 76">
             <a:extLst>
               <a:ext uri="{FF2B5EF4-FFF2-40B4-BE49-F238E27FC236}">
-                <a16:creationId xmlns:a16="http://schemas.microsoft.com/office/drawing/2014/main" id="{53C233B4-85B1-4BA1-A512-E0FD3FF78830}"/>
+                <a16:creationId xmlns="" xmlns:a16="http://schemas.microsoft.com/office/drawing/2014/main" id="{53C233B4-85B1-4BA1-A512-E0FD3FF78830}"/>
               </a:ext>
             </a:extLst>
           </p:cNvPr>
@@ -6790,7 +7246,7 @@
           <p:cNvPr id="3" name="Shape 77">
             <a:extLst>
               <a:ext uri="{FF2B5EF4-FFF2-40B4-BE49-F238E27FC236}">
-                <a16:creationId xmlns:a16="http://schemas.microsoft.com/office/drawing/2014/main" id="{08A6C367-C85B-4C21-800C-3BB63CD57AA4}"/>
+                <a16:creationId xmlns="" xmlns:a16="http://schemas.microsoft.com/office/drawing/2014/main" id="{08A6C367-C85B-4C21-800C-3BB63CD57AA4}"/>
               </a:ext>
             </a:extLst>
           </p:cNvPr>
@@ -6822,7 +7278,7 @@
           <p:cNvPr id="4" name="Marcador de contenido 2">
             <a:extLst>
               <a:ext uri="{FF2B5EF4-FFF2-40B4-BE49-F238E27FC236}">
-                <a16:creationId xmlns:a16="http://schemas.microsoft.com/office/drawing/2014/main" id="{C825BB67-98F6-4EED-8DAB-7A6E7335C2A9}"/>
+                <a16:creationId xmlns="" xmlns:a16="http://schemas.microsoft.com/office/drawing/2014/main" id="{C825BB67-98F6-4EED-8DAB-7A6E7335C2A9}"/>
               </a:ext>
             </a:extLst>
           </p:cNvPr>
@@ -7235,10 +7691,1580 @@
   <p:clrMapOvr>
     <a:masterClrMapping/>
   </p:clrMapOvr>
+  <p:timing>
+    <p:tnLst>
+      <p:par>
+        <p:cTn id="1" dur="indefinite" restart="never" nodeType="tmRoot"/>
+      </p:par>
+    </p:tnLst>
+  </p:timing>
 </p:sld>
 </file>
 
 <file path=ppt/slides/slide14.xml><?xml version="1.0" encoding="utf-8"?>
+<p:sld xmlns:a="http://schemas.openxmlformats.org/drawingml/2006/main" xmlns:r="http://schemas.openxmlformats.org/officeDocument/2006/relationships" xmlns:p="http://schemas.openxmlformats.org/presentationml/2006/main">
+  <p:cSld>
+    <p:bg>
+      <p:bgPr>
+        <a:blipFill>
+          <a:blip r:embed="rId3">
+            <a:alphaModFix/>
+          </a:blip>
+          <a:stretch>
+            <a:fillRect/>
+          </a:stretch>
+        </a:blipFill>
+        <a:effectLst/>
+      </p:bgPr>
+    </p:bg>
+    <p:spTree>
+      <p:nvGrpSpPr>
+        <p:cNvPr id="1" name="Shape 75"/>
+        <p:cNvGrpSpPr/>
+        <p:nvPr/>
+      </p:nvGrpSpPr>
+      <p:grpSpPr>
+        <a:xfrm>
+          <a:off x="0" y="0"/>
+          <a:ext cx="0" cy="0"/>
+          <a:chOff x="0" y="0"/>
+          <a:chExt cx="0" cy="0"/>
+        </a:xfrm>
+      </p:grpSpPr>
+      <p:sp>
+        <p:nvSpPr>
+          <p:cNvPr id="2" name="Shape 76">
+            <a:extLst>
+              <a:ext uri="{FF2B5EF4-FFF2-40B4-BE49-F238E27FC236}">
+                <a16:creationId xmlns="" xmlns:a16="http://schemas.microsoft.com/office/drawing/2014/main" id="{53C233B4-85B1-4BA1-A512-E0FD3FF78830}"/>
+              </a:ext>
+            </a:extLst>
+          </p:cNvPr>
+          <p:cNvSpPr txBox="1">
+            <a:spLocks noGrp="1"/>
+          </p:cNvSpPr>
+          <p:nvPr>
+            <p:ph type="title"/>
+          </p:nvPr>
+        </p:nvSpPr>
+        <p:spPr>
+          <a:xfrm>
+            <a:off x="0" y="0"/>
+            <a:ext cx="9144000" cy="572700"/>
+          </a:xfrm>
+          <a:prstGeom prst="rect">
+            <a:avLst/>
+          </a:prstGeom>
+        </p:spPr>
+        <p:txBody>
+          <a:bodyPr lIns="91425" tIns="91425" rIns="91425" bIns="91425" anchor="t" anchorCtr="0">
+            <a:noAutofit/>
+          </a:bodyPr>
+          <a:lstStyle/>
+          <a:p>
+            <a:pPr lvl="0" algn="ctr" rtl="0">
+              <a:spcBef>
+                <a:spcPts val="0"/>
+              </a:spcBef>
+              <a:buNone/>
+            </a:pPr>
+            <a:r>
+              <a:rPr lang="es-CO" dirty="0" smtClean="0">
+                <a:solidFill>
+                  <a:srgbClr val="D65213"/>
+                </a:solidFill>
+              </a:rPr>
+              <a:t>Propuesta de valor</a:t>
+            </a:r>
+            <a:endParaRPr lang="es" dirty="0">
+              <a:solidFill>
+                <a:srgbClr val="D65213"/>
+              </a:solidFill>
+            </a:endParaRPr>
+          </a:p>
+        </p:txBody>
+      </p:sp>
+      <p:cxnSp>
+        <p:nvCxnSpPr>
+          <p:cNvPr id="3" name="Shape 77">
+            <a:extLst>
+              <a:ext uri="{FF2B5EF4-FFF2-40B4-BE49-F238E27FC236}">
+                <a16:creationId xmlns="" xmlns:a16="http://schemas.microsoft.com/office/drawing/2014/main" id="{08A6C367-C85B-4C21-800C-3BB63CD57AA4}"/>
+              </a:ext>
+            </a:extLst>
+          </p:cNvPr>
+          <p:cNvCxnSpPr/>
+          <p:nvPr/>
+        </p:nvCxnSpPr>
+        <p:spPr>
+          <a:xfrm>
+            <a:off x="1250331" y="1591977"/>
+            <a:ext cx="0" cy="330000"/>
+          </a:xfrm>
+          <a:prstGeom prst="straightConnector1">
+            <a:avLst/>
+          </a:prstGeom>
+          <a:noFill/>
+          <a:ln w="19050" cap="flat" cmpd="sng">
+            <a:solidFill>
+              <a:srgbClr val="FF9900"/>
+            </a:solidFill>
+            <a:prstDash val="solid"/>
+            <a:round/>
+            <a:headEnd type="none" w="lg" len="lg"/>
+            <a:tailEnd type="none" w="lg" len="lg"/>
+          </a:ln>
+        </p:spPr>
+      </p:cxnSp>
+      <p:sp>
+        <p:nvSpPr>
+          <p:cNvPr id="4" name="Marcador de contenido 2">
+            <a:extLst>
+              <a:ext uri="{FF2B5EF4-FFF2-40B4-BE49-F238E27FC236}">
+                <a16:creationId xmlns="" xmlns:a16="http://schemas.microsoft.com/office/drawing/2014/main" id="{C825BB67-98F6-4EED-8DAB-7A6E7335C2A9}"/>
+              </a:ext>
+            </a:extLst>
+          </p:cNvPr>
+          <p:cNvSpPr txBox="1">
+            <a:spLocks/>
+          </p:cNvSpPr>
+          <p:nvPr/>
+        </p:nvSpPr>
+        <p:spPr>
+          <a:xfrm>
+            <a:off x="1250331" y="1591977"/>
+            <a:ext cx="7321347" cy="1664340"/>
+          </a:xfrm>
+          <a:prstGeom prst="rect">
+            <a:avLst/>
+          </a:prstGeom>
+        </p:spPr>
+        <p:txBody>
+          <a:bodyPr vert="horz" lIns="91440" tIns="45720" rIns="91440" bIns="45720" rtlCol="0">
+            <a:normAutofit/>
+          </a:bodyPr>
+          <a:lstStyle>
+            <a:lvl1pPr marL="228600" indent="-228600" algn="l" defTabSz="914400" rtl="0" eaLnBrk="1" latinLnBrk="0" hangingPunct="1">
+              <a:lnSpc>
+                <a:spcPct val="90000"/>
+              </a:lnSpc>
+              <a:spcBef>
+                <a:spcPts val="1000"/>
+              </a:spcBef>
+              <a:buFont typeface="Arial" panose="020B0604020202020204" pitchFamily="34" charset="0"/>
+              <a:buChar char="•"/>
+              <a:defRPr sz="2800" kern="1200">
+                <a:solidFill>
+                  <a:schemeClr val="tx1"/>
+                </a:solidFill>
+                <a:latin typeface="+mn-lt"/>
+                <a:ea typeface="+mn-ea"/>
+                <a:cs typeface="+mn-cs"/>
+              </a:defRPr>
+            </a:lvl1pPr>
+            <a:lvl2pPr marL="685800" indent="-228600" algn="l" defTabSz="914400" rtl="0" eaLnBrk="1" latinLnBrk="0" hangingPunct="1">
+              <a:lnSpc>
+                <a:spcPct val="90000"/>
+              </a:lnSpc>
+              <a:spcBef>
+                <a:spcPts val="500"/>
+              </a:spcBef>
+              <a:buFont typeface="Arial" panose="020B0604020202020204" pitchFamily="34" charset="0"/>
+              <a:buChar char="•"/>
+              <a:defRPr sz="2400" kern="1200">
+                <a:solidFill>
+                  <a:schemeClr val="tx1"/>
+                </a:solidFill>
+                <a:latin typeface="+mn-lt"/>
+                <a:ea typeface="+mn-ea"/>
+                <a:cs typeface="+mn-cs"/>
+              </a:defRPr>
+            </a:lvl2pPr>
+            <a:lvl3pPr marL="1143000" indent="-228600" algn="l" defTabSz="914400" rtl="0" eaLnBrk="1" latinLnBrk="0" hangingPunct="1">
+              <a:lnSpc>
+                <a:spcPct val="90000"/>
+              </a:lnSpc>
+              <a:spcBef>
+                <a:spcPts val="500"/>
+              </a:spcBef>
+              <a:buFont typeface="Arial" panose="020B0604020202020204" pitchFamily="34" charset="0"/>
+              <a:buChar char="•"/>
+              <a:defRPr sz="2000" kern="1200">
+                <a:solidFill>
+                  <a:schemeClr val="tx1"/>
+                </a:solidFill>
+                <a:latin typeface="+mn-lt"/>
+                <a:ea typeface="+mn-ea"/>
+                <a:cs typeface="+mn-cs"/>
+              </a:defRPr>
+            </a:lvl3pPr>
+            <a:lvl4pPr marL="1600200" indent="-228600" algn="l" defTabSz="914400" rtl="0" eaLnBrk="1" latinLnBrk="0" hangingPunct="1">
+              <a:lnSpc>
+                <a:spcPct val="90000"/>
+              </a:lnSpc>
+              <a:spcBef>
+                <a:spcPts val="500"/>
+              </a:spcBef>
+              <a:buFont typeface="Arial" panose="020B0604020202020204" pitchFamily="34" charset="0"/>
+              <a:buChar char="•"/>
+              <a:defRPr sz="1800" kern="1200">
+                <a:solidFill>
+                  <a:schemeClr val="tx1"/>
+                </a:solidFill>
+                <a:latin typeface="+mn-lt"/>
+                <a:ea typeface="+mn-ea"/>
+                <a:cs typeface="+mn-cs"/>
+              </a:defRPr>
+            </a:lvl4pPr>
+            <a:lvl5pPr marL="2057400" indent="-228600" algn="l" defTabSz="914400" rtl="0" eaLnBrk="1" latinLnBrk="0" hangingPunct="1">
+              <a:lnSpc>
+                <a:spcPct val="90000"/>
+              </a:lnSpc>
+              <a:spcBef>
+                <a:spcPts val="500"/>
+              </a:spcBef>
+              <a:buFont typeface="Arial" panose="020B0604020202020204" pitchFamily="34" charset="0"/>
+              <a:buChar char="•"/>
+              <a:defRPr sz="1800" kern="1200">
+                <a:solidFill>
+                  <a:schemeClr val="tx1"/>
+                </a:solidFill>
+                <a:latin typeface="+mn-lt"/>
+                <a:ea typeface="+mn-ea"/>
+                <a:cs typeface="+mn-cs"/>
+              </a:defRPr>
+            </a:lvl5pPr>
+            <a:lvl6pPr marL="2514600" indent="-228600" algn="l" defTabSz="914400" rtl="0" eaLnBrk="1" latinLnBrk="0" hangingPunct="1">
+              <a:lnSpc>
+                <a:spcPct val="90000"/>
+              </a:lnSpc>
+              <a:spcBef>
+                <a:spcPts val="500"/>
+              </a:spcBef>
+              <a:buFont typeface="Arial" panose="020B0604020202020204" pitchFamily="34" charset="0"/>
+              <a:buChar char="•"/>
+              <a:defRPr sz="1800" kern="1200">
+                <a:solidFill>
+                  <a:schemeClr val="tx1"/>
+                </a:solidFill>
+                <a:latin typeface="+mn-lt"/>
+                <a:ea typeface="+mn-ea"/>
+                <a:cs typeface="+mn-cs"/>
+              </a:defRPr>
+            </a:lvl6pPr>
+            <a:lvl7pPr marL="2971800" indent="-228600" algn="l" defTabSz="914400" rtl="0" eaLnBrk="1" latinLnBrk="0" hangingPunct="1">
+              <a:lnSpc>
+                <a:spcPct val="90000"/>
+              </a:lnSpc>
+              <a:spcBef>
+                <a:spcPts val="500"/>
+              </a:spcBef>
+              <a:buFont typeface="Arial" panose="020B0604020202020204" pitchFamily="34" charset="0"/>
+              <a:buChar char="•"/>
+              <a:defRPr sz="1800" kern="1200">
+                <a:solidFill>
+                  <a:schemeClr val="tx1"/>
+                </a:solidFill>
+                <a:latin typeface="+mn-lt"/>
+                <a:ea typeface="+mn-ea"/>
+                <a:cs typeface="+mn-cs"/>
+              </a:defRPr>
+            </a:lvl7pPr>
+            <a:lvl8pPr marL="3429000" indent="-228600" algn="l" defTabSz="914400" rtl="0" eaLnBrk="1" latinLnBrk="0" hangingPunct="1">
+              <a:lnSpc>
+                <a:spcPct val="90000"/>
+              </a:lnSpc>
+              <a:spcBef>
+                <a:spcPts val="500"/>
+              </a:spcBef>
+              <a:buFont typeface="Arial" panose="020B0604020202020204" pitchFamily="34" charset="0"/>
+              <a:buChar char="•"/>
+              <a:defRPr sz="1800" kern="1200">
+                <a:solidFill>
+                  <a:schemeClr val="tx1"/>
+                </a:solidFill>
+                <a:latin typeface="+mn-lt"/>
+                <a:ea typeface="+mn-ea"/>
+                <a:cs typeface="+mn-cs"/>
+              </a:defRPr>
+            </a:lvl8pPr>
+            <a:lvl9pPr marL="3886200" indent="-228600" algn="l" defTabSz="914400" rtl="0" eaLnBrk="1" latinLnBrk="0" hangingPunct="1">
+              <a:lnSpc>
+                <a:spcPct val="90000"/>
+              </a:lnSpc>
+              <a:spcBef>
+                <a:spcPts val="500"/>
+              </a:spcBef>
+              <a:buFont typeface="Arial" panose="020B0604020202020204" pitchFamily="34" charset="0"/>
+              <a:buChar char="•"/>
+              <a:defRPr sz="1800" kern="1200">
+                <a:solidFill>
+                  <a:schemeClr val="tx1"/>
+                </a:solidFill>
+                <a:latin typeface="+mn-lt"/>
+                <a:ea typeface="+mn-ea"/>
+                <a:cs typeface="+mn-cs"/>
+              </a:defRPr>
+            </a:lvl9pPr>
+          </a:lstStyle>
+          <a:p>
+            <a:pPr marL="0" lvl="0" indent="0">
+              <a:buNone/>
+              <a:defRPr/>
+            </a:pPr>
+            <a:r>
+              <a:rPr lang="es-CO" sz="1800" dirty="0" smtClean="0">
+                <a:latin typeface="Calibri" panose="020F0502020204030204"/>
+              </a:rPr>
+              <a:t>Se creara un software que tiene dos faces, la primera fase consiste en recolectar la información de producción y personal, horarios, materiales, tiempos de construcción, etc. A la par se diseña e implementa los algoritmos necesarios que le permitirán organizar su producción para designar el personal necesario para que cumplan con la demanda y no sobrecargar a los usuarios.</a:t>
+            </a:r>
+            <a:endParaRPr lang="es-CO" sz="1800" dirty="0">
+              <a:latin typeface="Calibri" panose="020F0502020204030204"/>
+            </a:endParaRPr>
+          </a:p>
+        </p:txBody>
+      </p:sp>
+    </p:spTree>
+    <p:extLst>
+      <p:ext uri="{BB962C8B-B14F-4D97-AF65-F5344CB8AC3E}">
+        <p14:creationId xmlns:p14="http://schemas.microsoft.com/office/powerpoint/2010/main" val="3404587541"/>
+      </p:ext>
+    </p:extLst>
+  </p:cSld>
+  <p:clrMapOvr>
+    <a:masterClrMapping/>
+  </p:clrMapOvr>
+  <p:timing>
+    <p:tnLst>
+      <p:par>
+        <p:cTn id="1" dur="indefinite" restart="never" nodeType="tmRoot"/>
+      </p:par>
+    </p:tnLst>
+  </p:timing>
+</p:sld>
+</file>
+
+<file path=ppt/slides/slide15.xml><?xml version="1.0" encoding="utf-8"?>
+<p:sld xmlns:a="http://schemas.openxmlformats.org/drawingml/2006/main" xmlns:r="http://schemas.openxmlformats.org/officeDocument/2006/relationships" xmlns:p="http://schemas.openxmlformats.org/presentationml/2006/main">
+  <p:cSld>
+    <p:bg>
+      <p:bgPr>
+        <a:blipFill>
+          <a:blip r:embed="rId3">
+            <a:alphaModFix/>
+          </a:blip>
+          <a:stretch>
+            <a:fillRect/>
+          </a:stretch>
+        </a:blipFill>
+        <a:effectLst/>
+      </p:bgPr>
+    </p:bg>
+    <p:spTree>
+      <p:nvGrpSpPr>
+        <p:cNvPr id="1" name="Shape 75"/>
+        <p:cNvGrpSpPr/>
+        <p:nvPr/>
+      </p:nvGrpSpPr>
+      <p:grpSpPr>
+        <a:xfrm>
+          <a:off x="0" y="0"/>
+          <a:ext cx="0" cy="0"/>
+          <a:chOff x="0" y="0"/>
+          <a:chExt cx="0" cy="0"/>
+        </a:xfrm>
+      </p:grpSpPr>
+      <p:sp>
+        <p:nvSpPr>
+          <p:cNvPr id="2" name="Shape 76">
+            <a:extLst>
+              <a:ext uri="{FF2B5EF4-FFF2-40B4-BE49-F238E27FC236}">
+                <a16:creationId xmlns="" xmlns:a16="http://schemas.microsoft.com/office/drawing/2014/main" id="{53C233B4-85B1-4BA1-A512-E0FD3FF78830}"/>
+              </a:ext>
+            </a:extLst>
+          </p:cNvPr>
+          <p:cNvSpPr txBox="1">
+            <a:spLocks noGrp="1"/>
+          </p:cNvSpPr>
+          <p:nvPr>
+            <p:ph type="title"/>
+          </p:nvPr>
+        </p:nvSpPr>
+        <p:spPr>
+          <a:xfrm>
+            <a:off x="0" y="0"/>
+            <a:ext cx="8617727" cy="572700"/>
+          </a:xfrm>
+          <a:prstGeom prst="rect">
+            <a:avLst/>
+          </a:prstGeom>
+        </p:spPr>
+        <p:txBody>
+          <a:bodyPr lIns="91425" tIns="91425" rIns="91425" bIns="91425" anchor="t" anchorCtr="0">
+            <a:noAutofit/>
+          </a:bodyPr>
+          <a:lstStyle/>
+          <a:p>
+            <a:pPr lvl="0" algn="ctr" rtl="0">
+              <a:spcBef>
+                <a:spcPts val="0"/>
+              </a:spcBef>
+              <a:buNone/>
+            </a:pPr>
+            <a:r>
+              <a:rPr lang="es-CO" dirty="0" smtClean="0">
+                <a:solidFill>
+                  <a:srgbClr val="D65213"/>
+                </a:solidFill>
+              </a:rPr>
+              <a:t>Ventajas competitivas</a:t>
+            </a:r>
+            <a:endParaRPr lang="es" dirty="0">
+              <a:solidFill>
+                <a:srgbClr val="D65213"/>
+              </a:solidFill>
+            </a:endParaRPr>
+          </a:p>
+        </p:txBody>
+      </p:sp>
+      <p:cxnSp>
+        <p:nvCxnSpPr>
+          <p:cNvPr id="3" name="Shape 77">
+            <a:extLst>
+              <a:ext uri="{FF2B5EF4-FFF2-40B4-BE49-F238E27FC236}">
+                <a16:creationId xmlns="" xmlns:a16="http://schemas.microsoft.com/office/drawing/2014/main" id="{08A6C367-C85B-4C21-800C-3BB63CD57AA4}"/>
+              </a:ext>
+            </a:extLst>
+          </p:cNvPr>
+          <p:cNvCxnSpPr/>
+          <p:nvPr/>
+        </p:nvCxnSpPr>
+        <p:spPr>
+          <a:xfrm>
+            <a:off x="1250331" y="1591977"/>
+            <a:ext cx="0" cy="330000"/>
+          </a:xfrm>
+          <a:prstGeom prst="straightConnector1">
+            <a:avLst/>
+          </a:prstGeom>
+          <a:noFill/>
+          <a:ln w="19050" cap="flat" cmpd="sng">
+            <a:solidFill>
+              <a:srgbClr val="FF9900"/>
+            </a:solidFill>
+            <a:prstDash val="solid"/>
+            <a:round/>
+            <a:headEnd type="none" w="lg" len="lg"/>
+            <a:tailEnd type="none" w="lg" len="lg"/>
+          </a:ln>
+        </p:spPr>
+      </p:cxnSp>
+      <p:sp>
+        <p:nvSpPr>
+          <p:cNvPr id="4" name="Marcador de contenido 2">
+            <a:extLst>
+              <a:ext uri="{FF2B5EF4-FFF2-40B4-BE49-F238E27FC236}">
+                <a16:creationId xmlns="" xmlns:a16="http://schemas.microsoft.com/office/drawing/2014/main" id="{C825BB67-98F6-4EED-8DAB-7A6E7335C2A9}"/>
+              </a:ext>
+            </a:extLst>
+          </p:cNvPr>
+          <p:cNvSpPr txBox="1">
+            <a:spLocks/>
+          </p:cNvSpPr>
+          <p:nvPr/>
+        </p:nvSpPr>
+        <p:spPr>
+          <a:xfrm>
+            <a:off x="1250331" y="1591977"/>
+            <a:ext cx="7321347" cy="1664340"/>
+          </a:xfrm>
+          <a:prstGeom prst="rect">
+            <a:avLst/>
+          </a:prstGeom>
+        </p:spPr>
+        <p:txBody>
+          <a:bodyPr vert="horz" lIns="91440" tIns="45720" rIns="91440" bIns="45720" rtlCol="0">
+            <a:normAutofit fontScale="92500" lnSpcReduction="10000"/>
+          </a:bodyPr>
+          <a:lstStyle>
+            <a:lvl1pPr marL="228600" indent="-228600" algn="l" defTabSz="914400" rtl="0" eaLnBrk="1" latinLnBrk="0" hangingPunct="1">
+              <a:lnSpc>
+                <a:spcPct val="90000"/>
+              </a:lnSpc>
+              <a:spcBef>
+                <a:spcPts val="1000"/>
+              </a:spcBef>
+              <a:buFont typeface="Arial" panose="020B0604020202020204" pitchFamily="34" charset="0"/>
+              <a:buChar char="•"/>
+              <a:defRPr sz="2800" kern="1200">
+                <a:solidFill>
+                  <a:schemeClr val="tx1"/>
+                </a:solidFill>
+                <a:latin typeface="+mn-lt"/>
+                <a:ea typeface="+mn-ea"/>
+                <a:cs typeface="+mn-cs"/>
+              </a:defRPr>
+            </a:lvl1pPr>
+            <a:lvl2pPr marL="685800" indent="-228600" algn="l" defTabSz="914400" rtl="0" eaLnBrk="1" latinLnBrk="0" hangingPunct="1">
+              <a:lnSpc>
+                <a:spcPct val="90000"/>
+              </a:lnSpc>
+              <a:spcBef>
+                <a:spcPts val="500"/>
+              </a:spcBef>
+              <a:buFont typeface="Arial" panose="020B0604020202020204" pitchFamily="34" charset="0"/>
+              <a:buChar char="•"/>
+              <a:defRPr sz="2400" kern="1200">
+                <a:solidFill>
+                  <a:schemeClr val="tx1"/>
+                </a:solidFill>
+                <a:latin typeface="+mn-lt"/>
+                <a:ea typeface="+mn-ea"/>
+                <a:cs typeface="+mn-cs"/>
+              </a:defRPr>
+            </a:lvl2pPr>
+            <a:lvl3pPr marL="1143000" indent="-228600" algn="l" defTabSz="914400" rtl="0" eaLnBrk="1" latinLnBrk="0" hangingPunct="1">
+              <a:lnSpc>
+                <a:spcPct val="90000"/>
+              </a:lnSpc>
+              <a:spcBef>
+                <a:spcPts val="500"/>
+              </a:spcBef>
+              <a:buFont typeface="Arial" panose="020B0604020202020204" pitchFamily="34" charset="0"/>
+              <a:buChar char="•"/>
+              <a:defRPr sz="2000" kern="1200">
+                <a:solidFill>
+                  <a:schemeClr val="tx1"/>
+                </a:solidFill>
+                <a:latin typeface="+mn-lt"/>
+                <a:ea typeface="+mn-ea"/>
+                <a:cs typeface="+mn-cs"/>
+              </a:defRPr>
+            </a:lvl3pPr>
+            <a:lvl4pPr marL="1600200" indent="-228600" algn="l" defTabSz="914400" rtl="0" eaLnBrk="1" latinLnBrk="0" hangingPunct="1">
+              <a:lnSpc>
+                <a:spcPct val="90000"/>
+              </a:lnSpc>
+              <a:spcBef>
+                <a:spcPts val="500"/>
+              </a:spcBef>
+              <a:buFont typeface="Arial" panose="020B0604020202020204" pitchFamily="34" charset="0"/>
+              <a:buChar char="•"/>
+              <a:defRPr sz="1800" kern="1200">
+                <a:solidFill>
+                  <a:schemeClr val="tx1"/>
+                </a:solidFill>
+                <a:latin typeface="+mn-lt"/>
+                <a:ea typeface="+mn-ea"/>
+                <a:cs typeface="+mn-cs"/>
+              </a:defRPr>
+            </a:lvl4pPr>
+            <a:lvl5pPr marL="2057400" indent="-228600" algn="l" defTabSz="914400" rtl="0" eaLnBrk="1" latinLnBrk="0" hangingPunct="1">
+              <a:lnSpc>
+                <a:spcPct val="90000"/>
+              </a:lnSpc>
+              <a:spcBef>
+                <a:spcPts val="500"/>
+              </a:spcBef>
+              <a:buFont typeface="Arial" panose="020B0604020202020204" pitchFamily="34" charset="0"/>
+              <a:buChar char="•"/>
+              <a:defRPr sz="1800" kern="1200">
+                <a:solidFill>
+                  <a:schemeClr val="tx1"/>
+                </a:solidFill>
+                <a:latin typeface="+mn-lt"/>
+                <a:ea typeface="+mn-ea"/>
+                <a:cs typeface="+mn-cs"/>
+              </a:defRPr>
+            </a:lvl5pPr>
+            <a:lvl6pPr marL="2514600" indent="-228600" algn="l" defTabSz="914400" rtl="0" eaLnBrk="1" latinLnBrk="0" hangingPunct="1">
+              <a:lnSpc>
+                <a:spcPct val="90000"/>
+              </a:lnSpc>
+              <a:spcBef>
+                <a:spcPts val="500"/>
+              </a:spcBef>
+              <a:buFont typeface="Arial" panose="020B0604020202020204" pitchFamily="34" charset="0"/>
+              <a:buChar char="•"/>
+              <a:defRPr sz="1800" kern="1200">
+                <a:solidFill>
+                  <a:schemeClr val="tx1"/>
+                </a:solidFill>
+                <a:latin typeface="+mn-lt"/>
+                <a:ea typeface="+mn-ea"/>
+                <a:cs typeface="+mn-cs"/>
+              </a:defRPr>
+            </a:lvl6pPr>
+            <a:lvl7pPr marL="2971800" indent="-228600" algn="l" defTabSz="914400" rtl="0" eaLnBrk="1" latinLnBrk="0" hangingPunct="1">
+              <a:lnSpc>
+                <a:spcPct val="90000"/>
+              </a:lnSpc>
+              <a:spcBef>
+                <a:spcPts val="500"/>
+              </a:spcBef>
+              <a:buFont typeface="Arial" panose="020B0604020202020204" pitchFamily="34" charset="0"/>
+              <a:buChar char="•"/>
+              <a:defRPr sz="1800" kern="1200">
+                <a:solidFill>
+                  <a:schemeClr val="tx1"/>
+                </a:solidFill>
+                <a:latin typeface="+mn-lt"/>
+                <a:ea typeface="+mn-ea"/>
+                <a:cs typeface="+mn-cs"/>
+              </a:defRPr>
+            </a:lvl7pPr>
+            <a:lvl8pPr marL="3429000" indent="-228600" algn="l" defTabSz="914400" rtl="0" eaLnBrk="1" latinLnBrk="0" hangingPunct="1">
+              <a:lnSpc>
+                <a:spcPct val="90000"/>
+              </a:lnSpc>
+              <a:spcBef>
+                <a:spcPts val="500"/>
+              </a:spcBef>
+              <a:buFont typeface="Arial" panose="020B0604020202020204" pitchFamily="34" charset="0"/>
+              <a:buChar char="•"/>
+              <a:defRPr sz="1800" kern="1200">
+                <a:solidFill>
+                  <a:schemeClr val="tx1"/>
+                </a:solidFill>
+                <a:latin typeface="+mn-lt"/>
+                <a:ea typeface="+mn-ea"/>
+                <a:cs typeface="+mn-cs"/>
+              </a:defRPr>
+            </a:lvl8pPr>
+            <a:lvl9pPr marL="3886200" indent="-228600" algn="l" defTabSz="914400" rtl="0" eaLnBrk="1" latinLnBrk="0" hangingPunct="1">
+              <a:lnSpc>
+                <a:spcPct val="90000"/>
+              </a:lnSpc>
+              <a:spcBef>
+                <a:spcPts val="500"/>
+              </a:spcBef>
+              <a:buFont typeface="Arial" panose="020B0604020202020204" pitchFamily="34" charset="0"/>
+              <a:buChar char="•"/>
+              <a:defRPr sz="1800" kern="1200">
+                <a:solidFill>
+                  <a:schemeClr val="tx1"/>
+                </a:solidFill>
+                <a:latin typeface="+mn-lt"/>
+                <a:ea typeface="+mn-ea"/>
+                <a:cs typeface="+mn-cs"/>
+              </a:defRPr>
+            </a:lvl9pPr>
+          </a:lstStyle>
+          <a:p>
+            <a:pPr marL="0" lvl="0" indent="0">
+              <a:buNone/>
+              <a:defRPr/>
+            </a:pPr>
+            <a:r>
+              <a:rPr lang="es-CO" sz="1800" dirty="0" smtClean="0">
+                <a:latin typeface="Calibri" panose="020F0502020204030204"/>
+              </a:rPr>
+              <a:t>Nuestra ventajas son las siguientes:</a:t>
+            </a:r>
+          </a:p>
+          <a:p>
+            <a:pPr>
+              <a:defRPr/>
+            </a:pPr>
+            <a:r>
+              <a:rPr lang="es-CO" sz="1800" dirty="0" smtClean="0">
+                <a:solidFill>
+                  <a:schemeClr val="tx2">
+                    <a:lumMod val="50000"/>
+                  </a:schemeClr>
+                </a:solidFill>
+                <a:latin typeface="Calibri" panose="020F0502020204030204"/>
+              </a:rPr>
+              <a:t>Las constantes asesorías para la realimentación del diseño del software.</a:t>
+            </a:r>
+          </a:p>
+          <a:p>
+            <a:pPr>
+              <a:defRPr/>
+            </a:pPr>
+            <a:r>
+              <a:rPr lang="es-CO" sz="1800" dirty="0" smtClean="0">
+                <a:solidFill>
+                  <a:schemeClr val="tx2">
+                    <a:lumMod val="50000"/>
+                  </a:schemeClr>
+                </a:solidFill>
+                <a:latin typeface="Calibri" panose="020F0502020204030204"/>
+              </a:rPr>
+              <a:t>Plan de trabajo adaptable para el cliente.</a:t>
+            </a:r>
+          </a:p>
+          <a:p>
+            <a:pPr>
+              <a:defRPr/>
+            </a:pPr>
+            <a:r>
+              <a:rPr lang="es-CO" sz="1800" dirty="0" smtClean="0">
+                <a:solidFill>
+                  <a:schemeClr val="tx2">
+                    <a:lumMod val="50000"/>
+                  </a:schemeClr>
+                </a:solidFill>
+                <a:latin typeface="Calibri" panose="020F0502020204030204"/>
+              </a:rPr>
+              <a:t>Principal experiencia en problemas procedimentales y administrativos.</a:t>
+            </a:r>
+          </a:p>
+          <a:p>
+            <a:pPr>
+              <a:defRPr/>
+            </a:pPr>
+            <a:r>
+              <a:rPr lang="es-CO" sz="1800" dirty="0" smtClean="0">
+                <a:solidFill>
+                  <a:schemeClr val="tx2">
+                    <a:lumMod val="50000"/>
+                  </a:schemeClr>
+                </a:solidFill>
+                <a:latin typeface="Calibri" panose="020F0502020204030204"/>
+              </a:rPr>
+              <a:t>Equipo de trabajo eficiente que le permitirá mejores resultados en calidad.</a:t>
+            </a:r>
+          </a:p>
+        </p:txBody>
+      </p:sp>
+    </p:spTree>
+    <p:extLst>
+      <p:ext uri="{BB962C8B-B14F-4D97-AF65-F5344CB8AC3E}">
+        <p14:creationId xmlns:p14="http://schemas.microsoft.com/office/powerpoint/2010/main" val="2853391295"/>
+      </p:ext>
+    </p:extLst>
+  </p:cSld>
+  <p:clrMapOvr>
+    <a:masterClrMapping/>
+  </p:clrMapOvr>
+  <p:timing>
+    <p:tnLst>
+      <p:par>
+        <p:cTn id="1" dur="indefinite" restart="never" nodeType="tmRoot"/>
+      </p:par>
+    </p:tnLst>
+  </p:timing>
+</p:sld>
+</file>
+
+<file path=ppt/slides/slide16.xml><?xml version="1.0" encoding="utf-8"?>
+<p:sld xmlns:a="http://schemas.openxmlformats.org/drawingml/2006/main" xmlns:r="http://schemas.openxmlformats.org/officeDocument/2006/relationships" xmlns:p="http://schemas.openxmlformats.org/presentationml/2006/main">
+  <p:cSld>
+    <p:bg>
+      <p:bgPr>
+        <a:blipFill>
+          <a:blip r:embed="rId3">
+            <a:alphaModFix/>
+          </a:blip>
+          <a:stretch>
+            <a:fillRect/>
+          </a:stretch>
+        </a:blipFill>
+        <a:effectLst/>
+      </p:bgPr>
+    </p:bg>
+    <p:spTree>
+      <p:nvGrpSpPr>
+        <p:cNvPr id="1" name="Shape 75"/>
+        <p:cNvGrpSpPr/>
+        <p:nvPr/>
+      </p:nvGrpSpPr>
+      <p:grpSpPr>
+        <a:xfrm>
+          <a:off x="0" y="0"/>
+          <a:ext cx="0" cy="0"/>
+          <a:chOff x="0" y="0"/>
+          <a:chExt cx="0" cy="0"/>
+        </a:xfrm>
+      </p:grpSpPr>
+      <p:sp>
+        <p:nvSpPr>
+          <p:cNvPr id="2" name="Shape 76">
+            <a:extLst>
+              <a:ext uri="{FF2B5EF4-FFF2-40B4-BE49-F238E27FC236}">
+                <a16:creationId xmlns="" xmlns:a16="http://schemas.microsoft.com/office/drawing/2014/main" id="{53C233B4-85B1-4BA1-A512-E0FD3FF78830}"/>
+              </a:ext>
+            </a:extLst>
+          </p:cNvPr>
+          <p:cNvSpPr txBox="1">
+            <a:spLocks noGrp="1"/>
+          </p:cNvSpPr>
+          <p:nvPr>
+            <p:ph type="title"/>
+          </p:nvPr>
+        </p:nvSpPr>
+        <p:spPr>
+          <a:xfrm>
+            <a:off x="0" y="0"/>
+            <a:ext cx="9144000" cy="572700"/>
+          </a:xfrm>
+          <a:prstGeom prst="rect">
+            <a:avLst/>
+          </a:prstGeom>
+        </p:spPr>
+        <p:txBody>
+          <a:bodyPr lIns="91425" tIns="91425" rIns="91425" bIns="91425" anchor="t" anchorCtr="0">
+            <a:noAutofit/>
+          </a:bodyPr>
+          <a:lstStyle/>
+          <a:p>
+            <a:pPr lvl="0" algn="ctr"/>
+            <a:r>
+              <a:rPr lang="es-CO" dirty="0">
+                <a:solidFill>
+                  <a:srgbClr val="D65213"/>
+                </a:solidFill>
+              </a:rPr>
+              <a:t>Propuesta de valor</a:t>
+            </a:r>
+            <a:endParaRPr lang="es" dirty="0">
+              <a:solidFill>
+                <a:srgbClr val="D65213"/>
+              </a:solidFill>
+            </a:endParaRPr>
+          </a:p>
+        </p:txBody>
+      </p:sp>
+      <p:cxnSp>
+        <p:nvCxnSpPr>
+          <p:cNvPr id="3" name="Shape 77">
+            <a:extLst>
+              <a:ext uri="{FF2B5EF4-FFF2-40B4-BE49-F238E27FC236}">
+                <a16:creationId xmlns="" xmlns:a16="http://schemas.microsoft.com/office/drawing/2014/main" id="{08A6C367-C85B-4C21-800C-3BB63CD57AA4}"/>
+              </a:ext>
+            </a:extLst>
+          </p:cNvPr>
+          <p:cNvCxnSpPr/>
+          <p:nvPr/>
+        </p:nvCxnSpPr>
+        <p:spPr>
+          <a:xfrm>
+            <a:off x="1250331" y="1591977"/>
+            <a:ext cx="0" cy="330000"/>
+          </a:xfrm>
+          <a:prstGeom prst="straightConnector1">
+            <a:avLst/>
+          </a:prstGeom>
+          <a:noFill/>
+          <a:ln w="19050" cap="flat" cmpd="sng">
+            <a:solidFill>
+              <a:srgbClr val="FF9900"/>
+            </a:solidFill>
+            <a:prstDash val="solid"/>
+            <a:round/>
+            <a:headEnd type="none" w="lg" len="lg"/>
+            <a:tailEnd type="none" w="lg" len="lg"/>
+          </a:ln>
+        </p:spPr>
+      </p:cxnSp>
+      <p:sp>
+        <p:nvSpPr>
+          <p:cNvPr id="4" name="Marcador de contenido 2">
+            <a:extLst>
+              <a:ext uri="{FF2B5EF4-FFF2-40B4-BE49-F238E27FC236}">
+                <a16:creationId xmlns="" xmlns:a16="http://schemas.microsoft.com/office/drawing/2014/main" id="{C825BB67-98F6-4EED-8DAB-7A6E7335C2A9}"/>
+              </a:ext>
+            </a:extLst>
+          </p:cNvPr>
+          <p:cNvSpPr txBox="1">
+            <a:spLocks/>
+          </p:cNvSpPr>
+          <p:nvPr/>
+        </p:nvSpPr>
+        <p:spPr>
+          <a:xfrm>
+            <a:off x="1250331" y="1591977"/>
+            <a:ext cx="7321347" cy="1664340"/>
+          </a:xfrm>
+          <a:prstGeom prst="rect">
+            <a:avLst/>
+          </a:prstGeom>
+        </p:spPr>
+        <p:txBody>
+          <a:bodyPr vert="horz" lIns="91440" tIns="45720" rIns="91440" bIns="45720" rtlCol="0">
+            <a:normAutofit/>
+          </a:bodyPr>
+          <a:lstStyle>
+            <a:lvl1pPr marL="228600" indent="-228600" algn="l" defTabSz="914400" rtl="0" eaLnBrk="1" latinLnBrk="0" hangingPunct="1">
+              <a:lnSpc>
+                <a:spcPct val="90000"/>
+              </a:lnSpc>
+              <a:spcBef>
+                <a:spcPts val="1000"/>
+              </a:spcBef>
+              <a:buFont typeface="Arial" panose="020B0604020202020204" pitchFamily="34" charset="0"/>
+              <a:buChar char="•"/>
+              <a:defRPr sz="2800" kern="1200">
+                <a:solidFill>
+                  <a:schemeClr val="tx1"/>
+                </a:solidFill>
+                <a:latin typeface="+mn-lt"/>
+                <a:ea typeface="+mn-ea"/>
+                <a:cs typeface="+mn-cs"/>
+              </a:defRPr>
+            </a:lvl1pPr>
+            <a:lvl2pPr marL="685800" indent="-228600" algn="l" defTabSz="914400" rtl="0" eaLnBrk="1" latinLnBrk="0" hangingPunct="1">
+              <a:lnSpc>
+                <a:spcPct val="90000"/>
+              </a:lnSpc>
+              <a:spcBef>
+                <a:spcPts val="500"/>
+              </a:spcBef>
+              <a:buFont typeface="Arial" panose="020B0604020202020204" pitchFamily="34" charset="0"/>
+              <a:buChar char="•"/>
+              <a:defRPr sz="2400" kern="1200">
+                <a:solidFill>
+                  <a:schemeClr val="tx1"/>
+                </a:solidFill>
+                <a:latin typeface="+mn-lt"/>
+                <a:ea typeface="+mn-ea"/>
+                <a:cs typeface="+mn-cs"/>
+              </a:defRPr>
+            </a:lvl2pPr>
+            <a:lvl3pPr marL="1143000" indent="-228600" algn="l" defTabSz="914400" rtl="0" eaLnBrk="1" latinLnBrk="0" hangingPunct="1">
+              <a:lnSpc>
+                <a:spcPct val="90000"/>
+              </a:lnSpc>
+              <a:spcBef>
+                <a:spcPts val="500"/>
+              </a:spcBef>
+              <a:buFont typeface="Arial" panose="020B0604020202020204" pitchFamily="34" charset="0"/>
+              <a:buChar char="•"/>
+              <a:defRPr sz="2000" kern="1200">
+                <a:solidFill>
+                  <a:schemeClr val="tx1"/>
+                </a:solidFill>
+                <a:latin typeface="+mn-lt"/>
+                <a:ea typeface="+mn-ea"/>
+                <a:cs typeface="+mn-cs"/>
+              </a:defRPr>
+            </a:lvl3pPr>
+            <a:lvl4pPr marL="1600200" indent="-228600" algn="l" defTabSz="914400" rtl="0" eaLnBrk="1" latinLnBrk="0" hangingPunct="1">
+              <a:lnSpc>
+                <a:spcPct val="90000"/>
+              </a:lnSpc>
+              <a:spcBef>
+                <a:spcPts val="500"/>
+              </a:spcBef>
+              <a:buFont typeface="Arial" panose="020B0604020202020204" pitchFamily="34" charset="0"/>
+              <a:buChar char="•"/>
+              <a:defRPr sz="1800" kern="1200">
+                <a:solidFill>
+                  <a:schemeClr val="tx1"/>
+                </a:solidFill>
+                <a:latin typeface="+mn-lt"/>
+                <a:ea typeface="+mn-ea"/>
+                <a:cs typeface="+mn-cs"/>
+              </a:defRPr>
+            </a:lvl4pPr>
+            <a:lvl5pPr marL="2057400" indent="-228600" algn="l" defTabSz="914400" rtl="0" eaLnBrk="1" latinLnBrk="0" hangingPunct="1">
+              <a:lnSpc>
+                <a:spcPct val="90000"/>
+              </a:lnSpc>
+              <a:spcBef>
+                <a:spcPts val="500"/>
+              </a:spcBef>
+              <a:buFont typeface="Arial" panose="020B0604020202020204" pitchFamily="34" charset="0"/>
+              <a:buChar char="•"/>
+              <a:defRPr sz="1800" kern="1200">
+                <a:solidFill>
+                  <a:schemeClr val="tx1"/>
+                </a:solidFill>
+                <a:latin typeface="+mn-lt"/>
+                <a:ea typeface="+mn-ea"/>
+                <a:cs typeface="+mn-cs"/>
+              </a:defRPr>
+            </a:lvl5pPr>
+            <a:lvl6pPr marL="2514600" indent="-228600" algn="l" defTabSz="914400" rtl="0" eaLnBrk="1" latinLnBrk="0" hangingPunct="1">
+              <a:lnSpc>
+                <a:spcPct val="90000"/>
+              </a:lnSpc>
+              <a:spcBef>
+                <a:spcPts val="500"/>
+              </a:spcBef>
+              <a:buFont typeface="Arial" panose="020B0604020202020204" pitchFamily="34" charset="0"/>
+              <a:buChar char="•"/>
+              <a:defRPr sz="1800" kern="1200">
+                <a:solidFill>
+                  <a:schemeClr val="tx1"/>
+                </a:solidFill>
+                <a:latin typeface="+mn-lt"/>
+                <a:ea typeface="+mn-ea"/>
+                <a:cs typeface="+mn-cs"/>
+              </a:defRPr>
+            </a:lvl6pPr>
+            <a:lvl7pPr marL="2971800" indent="-228600" algn="l" defTabSz="914400" rtl="0" eaLnBrk="1" latinLnBrk="0" hangingPunct="1">
+              <a:lnSpc>
+                <a:spcPct val="90000"/>
+              </a:lnSpc>
+              <a:spcBef>
+                <a:spcPts val="500"/>
+              </a:spcBef>
+              <a:buFont typeface="Arial" panose="020B0604020202020204" pitchFamily="34" charset="0"/>
+              <a:buChar char="•"/>
+              <a:defRPr sz="1800" kern="1200">
+                <a:solidFill>
+                  <a:schemeClr val="tx1"/>
+                </a:solidFill>
+                <a:latin typeface="+mn-lt"/>
+                <a:ea typeface="+mn-ea"/>
+                <a:cs typeface="+mn-cs"/>
+              </a:defRPr>
+            </a:lvl7pPr>
+            <a:lvl8pPr marL="3429000" indent="-228600" algn="l" defTabSz="914400" rtl="0" eaLnBrk="1" latinLnBrk="0" hangingPunct="1">
+              <a:lnSpc>
+                <a:spcPct val="90000"/>
+              </a:lnSpc>
+              <a:spcBef>
+                <a:spcPts val="500"/>
+              </a:spcBef>
+              <a:buFont typeface="Arial" panose="020B0604020202020204" pitchFamily="34" charset="0"/>
+              <a:buChar char="•"/>
+              <a:defRPr sz="1800" kern="1200">
+                <a:solidFill>
+                  <a:schemeClr val="tx1"/>
+                </a:solidFill>
+                <a:latin typeface="+mn-lt"/>
+                <a:ea typeface="+mn-ea"/>
+                <a:cs typeface="+mn-cs"/>
+              </a:defRPr>
+            </a:lvl8pPr>
+            <a:lvl9pPr marL="3886200" indent="-228600" algn="l" defTabSz="914400" rtl="0" eaLnBrk="1" latinLnBrk="0" hangingPunct="1">
+              <a:lnSpc>
+                <a:spcPct val="90000"/>
+              </a:lnSpc>
+              <a:spcBef>
+                <a:spcPts val="500"/>
+              </a:spcBef>
+              <a:buFont typeface="Arial" panose="020B0604020202020204" pitchFamily="34" charset="0"/>
+              <a:buChar char="•"/>
+              <a:defRPr sz="1800" kern="1200">
+                <a:solidFill>
+                  <a:schemeClr val="tx1"/>
+                </a:solidFill>
+                <a:latin typeface="+mn-lt"/>
+                <a:ea typeface="+mn-ea"/>
+                <a:cs typeface="+mn-cs"/>
+              </a:defRPr>
+            </a:lvl9pPr>
+          </a:lstStyle>
+          <a:p>
+            <a:pPr marL="0" lvl="0" indent="0">
+              <a:buNone/>
+              <a:defRPr/>
+            </a:pPr>
+            <a:r>
+              <a:rPr lang="es-CO" sz="1800" dirty="0" smtClean="0">
+                <a:latin typeface="Calibri" panose="020F0502020204030204"/>
+              </a:rPr>
+              <a:t>Nuestra promesa de valor es la rápida adquisición de datos para poder generar los cálculos necesarios para poder proyectar un mejor proceso de producción</a:t>
+            </a:r>
+            <a:r>
+              <a:rPr lang="es-CO" sz="1800" dirty="0" smtClean="0">
+                <a:solidFill>
+                  <a:schemeClr val="tx2">
+                    <a:lumMod val="50000"/>
+                  </a:schemeClr>
+                </a:solidFill>
+                <a:latin typeface="Calibri" panose="020F0502020204030204"/>
+              </a:rPr>
+              <a:t>.</a:t>
+            </a:r>
+          </a:p>
+        </p:txBody>
+      </p:sp>
+    </p:spTree>
+    <p:extLst>
+      <p:ext uri="{BB962C8B-B14F-4D97-AF65-F5344CB8AC3E}">
+        <p14:creationId xmlns:p14="http://schemas.microsoft.com/office/powerpoint/2010/main" val="4208266172"/>
+      </p:ext>
+    </p:extLst>
+  </p:cSld>
+  <p:clrMapOvr>
+    <a:masterClrMapping/>
+  </p:clrMapOvr>
+  <p:timing>
+    <p:tnLst>
+      <p:par>
+        <p:cTn id="1" dur="indefinite" restart="never" nodeType="tmRoot"/>
+      </p:par>
+    </p:tnLst>
+  </p:timing>
+</p:sld>
+</file>
+
+<file path=ppt/slides/slide17.xml><?xml version="1.0" encoding="utf-8"?>
+<p:sld xmlns:a="http://schemas.openxmlformats.org/drawingml/2006/main" xmlns:r="http://schemas.openxmlformats.org/officeDocument/2006/relationships" xmlns:p="http://schemas.openxmlformats.org/presentationml/2006/main">
+  <p:cSld>
+    <p:bg>
+      <p:bgPr>
+        <a:blipFill>
+          <a:blip r:embed="rId3">
+            <a:alphaModFix/>
+          </a:blip>
+          <a:stretch>
+            <a:fillRect/>
+          </a:stretch>
+        </a:blipFill>
+        <a:effectLst/>
+      </p:bgPr>
+    </p:bg>
+    <p:spTree>
+      <p:nvGrpSpPr>
+        <p:cNvPr id="1" name="Shape 75"/>
+        <p:cNvGrpSpPr/>
+        <p:nvPr/>
+      </p:nvGrpSpPr>
+      <p:grpSpPr>
+        <a:xfrm>
+          <a:off x="0" y="0"/>
+          <a:ext cx="0" cy="0"/>
+          <a:chOff x="0" y="0"/>
+          <a:chExt cx="0" cy="0"/>
+        </a:xfrm>
+      </p:grpSpPr>
+      <p:sp>
+        <p:nvSpPr>
+          <p:cNvPr id="2" name="Shape 76">
+            <a:extLst>
+              <a:ext uri="{FF2B5EF4-FFF2-40B4-BE49-F238E27FC236}">
+                <a16:creationId xmlns="" xmlns:a16="http://schemas.microsoft.com/office/drawing/2014/main" id="{53C233B4-85B1-4BA1-A512-E0FD3FF78830}"/>
+              </a:ext>
+            </a:extLst>
+          </p:cNvPr>
+          <p:cNvSpPr txBox="1">
+            <a:spLocks noGrp="1"/>
+          </p:cNvSpPr>
+          <p:nvPr>
+            <p:ph type="title"/>
+          </p:nvPr>
+        </p:nvSpPr>
+        <p:spPr>
+          <a:xfrm>
+            <a:off x="0" y="0"/>
+            <a:ext cx="9144000" cy="572700"/>
+          </a:xfrm>
+          <a:prstGeom prst="rect">
+            <a:avLst/>
+          </a:prstGeom>
+        </p:spPr>
+        <p:txBody>
+          <a:bodyPr lIns="91425" tIns="91425" rIns="91425" bIns="91425" anchor="t" anchorCtr="0">
+            <a:noAutofit/>
+          </a:bodyPr>
+          <a:lstStyle/>
+          <a:p>
+            <a:pPr lvl="0" algn="ctr"/>
+            <a:r>
+              <a:rPr lang="es-CO" dirty="0" smtClean="0">
+                <a:solidFill>
+                  <a:srgbClr val="D65213"/>
+                </a:solidFill>
+              </a:rPr>
+              <a:t>Mapa de ruta</a:t>
+            </a:r>
+            <a:endParaRPr lang="es" dirty="0">
+              <a:solidFill>
+                <a:srgbClr val="D65213"/>
+              </a:solidFill>
+            </a:endParaRPr>
+          </a:p>
+        </p:txBody>
+      </p:sp>
+      <p:cxnSp>
+        <p:nvCxnSpPr>
+          <p:cNvPr id="3" name="Shape 77">
+            <a:extLst>
+              <a:ext uri="{FF2B5EF4-FFF2-40B4-BE49-F238E27FC236}">
+                <a16:creationId xmlns="" xmlns:a16="http://schemas.microsoft.com/office/drawing/2014/main" id="{08A6C367-C85B-4C21-800C-3BB63CD57AA4}"/>
+              </a:ext>
+            </a:extLst>
+          </p:cNvPr>
+          <p:cNvCxnSpPr/>
+          <p:nvPr/>
+        </p:nvCxnSpPr>
+        <p:spPr>
+          <a:xfrm>
+            <a:off x="1250331" y="1591977"/>
+            <a:ext cx="0" cy="330000"/>
+          </a:xfrm>
+          <a:prstGeom prst="straightConnector1">
+            <a:avLst/>
+          </a:prstGeom>
+          <a:noFill/>
+          <a:ln w="19050" cap="flat" cmpd="sng">
+            <a:solidFill>
+              <a:srgbClr val="FF9900"/>
+            </a:solidFill>
+            <a:prstDash val="solid"/>
+            <a:round/>
+            <a:headEnd type="none" w="lg" len="lg"/>
+            <a:tailEnd type="none" w="lg" len="lg"/>
+          </a:ln>
+        </p:spPr>
+      </p:cxnSp>
+      <p:sp>
+        <p:nvSpPr>
+          <p:cNvPr id="4" name="Marcador de contenido 2">
+            <a:extLst>
+              <a:ext uri="{FF2B5EF4-FFF2-40B4-BE49-F238E27FC236}">
+                <a16:creationId xmlns="" xmlns:a16="http://schemas.microsoft.com/office/drawing/2014/main" id="{C825BB67-98F6-4EED-8DAB-7A6E7335C2A9}"/>
+              </a:ext>
+            </a:extLst>
+          </p:cNvPr>
+          <p:cNvSpPr txBox="1">
+            <a:spLocks/>
+          </p:cNvSpPr>
+          <p:nvPr/>
+        </p:nvSpPr>
+        <p:spPr>
+          <a:xfrm>
+            <a:off x="1250331" y="1591977"/>
+            <a:ext cx="7321347" cy="3177376"/>
+          </a:xfrm>
+          <a:prstGeom prst="rect">
+            <a:avLst/>
+          </a:prstGeom>
+        </p:spPr>
+        <p:txBody>
+          <a:bodyPr vert="horz" lIns="91440" tIns="45720" rIns="91440" bIns="45720" rtlCol="0">
+            <a:normAutofit lnSpcReduction="10000"/>
+          </a:bodyPr>
+          <a:lstStyle>
+            <a:lvl1pPr marL="228600" indent="-228600" algn="l" defTabSz="914400" rtl="0" eaLnBrk="1" latinLnBrk="0" hangingPunct="1">
+              <a:lnSpc>
+                <a:spcPct val="90000"/>
+              </a:lnSpc>
+              <a:spcBef>
+                <a:spcPts val="1000"/>
+              </a:spcBef>
+              <a:buFont typeface="Arial" panose="020B0604020202020204" pitchFamily="34" charset="0"/>
+              <a:buChar char="•"/>
+              <a:defRPr sz="2800" kern="1200">
+                <a:solidFill>
+                  <a:schemeClr val="tx1"/>
+                </a:solidFill>
+                <a:latin typeface="+mn-lt"/>
+                <a:ea typeface="+mn-ea"/>
+                <a:cs typeface="+mn-cs"/>
+              </a:defRPr>
+            </a:lvl1pPr>
+            <a:lvl2pPr marL="685800" indent="-228600" algn="l" defTabSz="914400" rtl="0" eaLnBrk="1" latinLnBrk="0" hangingPunct="1">
+              <a:lnSpc>
+                <a:spcPct val="90000"/>
+              </a:lnSpc>
+              <a:spcBef>
+                <a:spcPts val="500"/>
+              </a:spcBef>
+              <a:buFont typeface="Arial" panose="020B0604020202020204" pitchFamily="34" charset="0"/>
+              <a:buChar char="•"/>
+              <a:defRPr sz="2400" kern="1200">
+                <a:solidFill>
+                  <a:schemeClr val="tx1"/>
+                </a:solidFill>
+                <a:latin typeface="+mn-lt"/>
+                <a:ea typeface="+mn-ea"/>
+                <a:cs typeface="+mn-cs"/>
+              </a:defRPr>
+            </a:lvl2pPr>
+            <a:lvl3pPr marL="1143000" indent="-228600" algn="l" defTabSz="914400" rtl="0" eaLnBrk="1" latinLnBrk="0" hangingPunct="1">
+              <a:lnSpc>
+                <a:spcPct val="90000"/>
+              </a:lnSpc>
+              <a:spcBef>
+                <a:spcPts val="500"/>
+              </a:spcBef>
+              <a:buFont typeface="Arial" panose="020B0604020202020204" pitchFamily="34" charset="0"/>
+              <a:buChar char="•"/>
+              <a:defRPr sz="2000" kern="1200">
+                <a:solidFill>
+                  <a:schemeClr val="tx1"/>
+                </a:solidFill>
+                <a:latin typeface="+mn-lt"/>
+                <a:ea typeface="+mn-ea"/>
+                <a:cs typeface="+mn-cs"/>
+              </a:defRPr>
+            </a:lvl3pPr>
+            <a:lvl4pPr marL="1600200" indent="-228600" algn="l" defTabSz="914400" rtl="0" eaLnBrk="1" latinLnBrk="0" hangingPunct="1">
+              <a:lnSpc>
+                <a:spcPct val="90000"/>
+              </a:lnSpc>
+              <a:spcBef>
+                <a:spcPts val="500"/>
+              </a:spcBef>
+              <a:buFont typeface="Arial" panose="020B0604020202020204" pitchFamily="34" charset="0"/>
+              <a:buChar char="•"/>
+              <a:defRPr sz="1800" kern="1200">
+                <a:solidFill>
+                  <a:schemeClr val="tx1"/>
+                </a:solidFill>
+                <a:latin typeface="+mn-lt"/>
+                <a:ea typeface="+mn-ea"/>
+                <a:cs typeface="+mn-cs"/>
+              </a:defRPr>
+            </a:lvl4pPr>
+            <a:lvl5pPr marL="2057400" indent="-228600" algn="l" defTabSz="914400" rtl="0" eaLnBrk="1" latinLnBrk="0" hangingPunct="1">
+              <a:lnSpc>
+                <a:spcPct val="90000"/>
+              </a:lnSpc>
+              <a:spcBef>
+                <a:spcPts val="500"/>
+              </a:spcBef>
+              <a:buFont typeface="Arial" panose="020B0604020202020204" pitchFamily="34" charset="0"/>
+              <a:buChar char="•"/>
+              <a:defRPr sz="1800" kern="1200">
+                <a:solidFill>
+                  <a:schemeClr val="tx1"/>
+                </a:solidFill>
+                <a:latin typeface="+mn-lt"/>
+                <a:ea typeface="+mn-ea"/>
+                <a:cs typeface="+mn-cs"/>
+              </a:defRPr>
+            </a:lvl5pPr>
+            <a:lvl6pPr marL="2514600" indent="-228600" algn="l" defTabSz="914400" rtl="0" eaLnBrk="1" latinLnBrk="0" hangingPunct="1">
+              <a:lnSpc>
+                <a:spcPct val="90000"/>
+              </a:lnSpc>
+              <a:spcBef>
+                <a:spcPts val="500"/>
+              </a:spcBef>
+              <a:buFont typeface="Arial" panose="020B0604020202020204" pitchFamily="34" charset="0"/>
+              <a:buChar char="•"/>
+              <a:defRPr sz="1800" kern="1200">
+                <a:solidFill>
+                  <a:schemeClr val="tx1"/>
+                </a:solidFill>
+                <a:latin typeface="+mn-lt"/>
+                <a:ea typeface="+mn-ea"/>
+                <a:cs typeface="+mn-cs"/>
+              </a:defRPr>
+            </a:lvl6pPr>
+            <a:lvl7pPr marL="2971800" indent="-228600" algn="l" defTabSz="914400" rtl="0" eaLnBrk="1" latinLnBrk="0" hangingPunct="1">
+              <a:lnSpc>
+                <a:spcPct val="90000"/>
+              </a:lnSpc>
+              <a:spcBef>
+                <a:spcPts val="500"/>
+              </a:spcBef>
+              <a:buFont typeface="Arial" panose="020B0604020202020204" pitchFamily="34" charset="0"/>
+              <a:buChar char="•"/>
+              <a:defRPr sz="1800" kern="1200">
+                <a:solidFill>
+                  <a:schemeClr val="tx1"/>
+                </a:solidFill>
+                <a:latin typeface="+mn-lt"/>
+                <a:ea typeface="+mn-ea"/>
+                <a:cs typeface="+mn-cs"/>
+              </a:defRPr>
+            </a:lvl7pPr>
+            <a:lvl8pPr marL="3429000" indent="-228600" algn="l" defTabSz="914400" rtl="0" eaLnBrk="1" latinLnBrk="0" hangingPunct="1">
+              <a:lnSpc>
+                <a:spcPct val="90000"/>
+              </a:lnSpc>
+              <a:spcBef>
+                <a:spcPts val="500"/>
+              </a:spcBef>
+              <a:buFont typeface="Arial" panose="020B0604020202020204" pitchFamily="34" charset="0"/>
+              <a:buChar char="•"/>
+              <a:defRPr sz="1800" kern="1200">
+                <a:solidFill>
+                  <a:schemeClr val="tx1"/>
+                </a:solidFill>
+                <a:latin typeface="+mn-lt"/>
+                <a:ea typeface="+mn-ea"/>
+                <a:cs typeface="+mn-cs"/>
+              </a:defRPr>
+            </a:lvl8pPr>
+            <a:lvl9pPr marL="3886200" indent="-228600" algn="l" defTabSz="914400" rtl="0" eaLnBrk="1" latinLnBrk="0" hangingPunct="1">
+              <a:lnSpc>
+                <a:spcPct val="90000"/>
+              </a:lnSpc>
+              <a:spcBef>
+                <a:spcPts val="500"/>
+              </a:spcBef>
+              <a:buFont typeface="Arial" panose="020B0604020202020204" pitchFamily="34" charset="0"/>
+              <a:buChar char="•"/>
+              <a:defRPr sz="1800" kern="1200">
+                <a:solidFill>
+                  <a:schemeClr val="tx1"/>
+                </a:solidFill>
+                <a:latin typeface="+mn-lt"/>
+                <a:ea typeface="+mn-ea"/>
+                <a:cs typeface="+mn-cs"/>
+              </a:defRPr>
+            </a:lvl9pPr>
+          </a:lstStyle>
+          <a:p>
+            <a:pPr marL="0" lvl="0" indent="0">
+              <a:buNone/>
+              <a:defRPr/>
+            </a:pPr>
+            <a:r>
+              <a:rPr lang="es-CO" sz="1800" dirty="0" smtClean="0">
+                <a:latin typeface="Calibri" panose="020F0502020204030204"/>
+              </a:rPr>
+              <a:t>Lo que se le entregara al cliente es.</a:t>
+            </a:r>
+          </a:p>
+          <a:p>
+            <a:pPr marL="342900" indent="-342900">
+              <a:buFont typeface="+mj-lt"/>
+              <a:buAutoNum type="arabicPeriod"/>
+              <a:defRPr/>
+            </a:pPr>
+            <a:r>
+              <a:rPr lang="es-CO" sz="1800" dirty="0" smtClean="0">
+                <a:solidFill>
+                  <a:schemeClr val="tx2">
+                    <a:lumMod val="50000"/>
+                  </a:schemeClr>
+                </a:solidFill>
+                <a:latin typeface="Calibri" panose="020F0502020204030204"/>
+              </a:rPr>
+              <a:t>La capa de datos suficiente para almacenar toda la información que se genera en el proceso de producción.</a:t>
+            </a:r>
+          </a:p>
+          <a:p>
+            <a:pPr marL="342900" indent="-342900">
+              <a:buFont typeface="+mj-lt"/>
+              <a:buAutoNum type="arabicPeriod"/>
+              <a:defRPr/>
+            </a:pPr>
+            <a:r>
+              <a:rPr lang="es-CO" sz="1800" dirty="0" smtClean="0">
+                <a:solidFill>
+                  <a:schemeClr val="tx2">
+                    <a:lumMod val="50000"/>
+                  </a:schemeClr>
+                </a:solidFill>
+                <a:latin typeface="Calibri" panose="020F0502020204030204"/>
+              </a:rPr>
+              <a:t>Un MVP que permita almacenar la información de manera eficiente. </a:t>
+            </a:r>
+          </a:p>
+          <a:p>
+            <a:pPr marL="342900" indent="-342900">
+              <a:buFont typeface="+mj-lt"/>
+              <a:buAutoNum type="arabicPeriod"/>
+              <a:defRPr/>
+            </a:pPr>
+            <a:r>
+              <a:rPr lang="es-CO" sz="1800" dirty="0" smtClean="0">
+                <a:solidFill>
+                  <a:schemeClr val="tx2">
+                    <a:lumMod val="50000"/>
+                  </a:schemeClr>
+                </a:solidFill>
+                <a:latin typeface="Calibri" panose="020F0502020204030204"/>
+              </a:rPr>
+              <a:t>Estructurar y establecer los procesos de producción a base de la información recolectada.</a:t>
+            </a:r>
+          </a:p>
+          <a:p>
+            <a:pPr marL="342900" indent="-342900">
+              <a:buFont typeface="+mj-lt"/>
+              <a:buAutoNum type="arabicPeriod"/>
+              <a:defRPr/>
+            </a:pPr>
+            <a:r>
+              <a:rPr lang="es-CO" sz="1800" dirty="0" smtClean="0">
+                <a:solidFill>
+                  <a:schemeClr val="tx2">
+                    <a:lumMod val="50000"/>
+                  </a:schemeClr>
+                </a:solidFill>
+                <a:latin typeface="Calibri" panose="020F0502020204030204"/>
+              </a:rPr>
+              <a:t>Implementar los cálculos suficientes para generar planeaciones de producción</a:t>
+            </a:r>
+            <a:r>
+              <a:rPr lang="es-CO" sz="1800" dirty="0" smtClean="0">
+                <a:solidFill>
+                  <a:schemeClr val="tx2">
+                    <a:lumMod val="50000"/>
+                  </a:schemeClr>
+                </a:solidFill>
+                <a:latin typeface="Calibri" panose="020F0502020204030204"/>
+              </a:rPr>
+              <a:t>.</a:t>
+            </a:r>
+          </a:p>
+          <a:p>
+            <a:pPr marL="342900" indent="-342900">
+              <a:buFont typeface="+mj-lt"/>
+              <a:buAutoNum type="arabicPeriod"/>
+              <a:defRPr/>
+            </a:pPr>
+            <a:r>
+              <a:rPr lang="es-CO" sz="1800" dirty="0" smtClean="0">
+                <a:solidFill>
+                  <a:schemeClr val="tx2">
+                    <a:lumMod val="50000"/>
+                  </a:schemeClr>
+                </a:solidFill>
+                <a:latin typeface="Calibri" panose="020F0502020204030204"/>
+              </a:rPr>
+              <a:t>Integrar una asesoría que permita validar los cálculos integrados y que funcionen para poder planear el proceso </a:t>
+            </a:r>
+            <a:r>
+              <a:rPr lang="es-CO" sz="1800" smtClean="0">
+                <a:solidFill>
+                  <a:schemeClr val="tx2">
+                    <a:lumMod val="50000"/>
+                  </a:schemeClr>
+                </a:solidFill>
+                <a:latin typeface="Calibri" panose="020F0502020204030204"/>
+              </a:rPr>
+              <a:t>de producción.</a:t>
+            </a:r>
+            <a:endParaRPr lang="es-CO" sz="1800" dirty="0" smtClean="0">
+              <a:solidFill>
+                <a:schemeClr val="tx2">
+                  <a:lumMod val="50000"/>
+                </a:schemeClr>
+              </a:solidFill>
+              <a:latin typeface="Calibri" panose="020F0502020204030204"/>
+            </a:endParaRPr>
+          </a:p>
+          <a:p>
+            <a:pPr marL="342900" indent="-342900">
+              <a:buFont typeface="+mj-lt"/>
+              <a:buAutoNum type="arabicPeriod"/>
+              <a:defRPr/>
+            </a:pPr>
+            <a:endParaRPr lang="es-CO" sz="1800" dirty="0" smtClean="0">
+              <a:solidFill>
+                <a:schemeClr val="tx2">
+                  <a:lumMod val="50000"/>
+                </a:schemeClr>
+              </a:solidFill>
+              <a:latin typeface="Calibri" panose="020F0502020204030204"/>
+            </a:endParaRPr>
+          </a:p>
+        </p:txBody>
+      </p:sp>
+    </p:spTree>
+    <p:extLst>
+      <p:ext uri="{BB962C8B-B14F-4D97-AF65-F5344CB8AC3E}">
+        <p14:creationId xmlns:p14="http://schemas.microsoft.com/office/powerpoint/2010/main" val="3208169593"/>
+      </p:ext>
+    </p:extLst>
+  </p:cSld>
+  <p:clrMapOvr>
+    <a:masterClrMapping/>
+  </p:clrMapOvr>
+  <p:timing>
+    <p:tnLst>
+      <p:par>
+        <p:cTn id="1" dur="indefinite" restart="never" nodeType="tmRoot"/>
+      </p:par>
+    </p:tnLst>
+  </p:timing>
+</p:sld>
+</file>
+
+<file path=ppt/slides/slide18.xml><?xml version="1.0" encoding="utf-8"?>
 <p:sld xmlns:a="http://schemas.openxmlformats.org/drawingml/2006/main" xmlns:r="http://schemas.openxmlformats.org/officeDocument/2006/relationships" xmlns:p="http://schemas.openxmlformats.org/presentationml/2006/main">
   <p:cSld>
     <p:bg>
@@ -7590,10 +9616,513 @@
   <p:clrMapOvr>
     <a:masterClrMapping/>
   </p:clrMapOvr>
+  <p:timing>
+    <p:tnLst>
+      <p:par>
+        <p:cTn id="1" dur="indefinite" restart="never" nodeType="tmRoot"/>
+      </p:par>
+    </p:tnLst>
+  </p:timing>
 </p:sld>
 </file>
 
 <file path=ppt/slides/slide2.xml><?xml version="1.0" encoding="utf-8"?>
+<p:sld xmlns:a="http://schemas.openxmlformats.org/drawingml/2006/main" xmlns:r="http://schemas.openxmlformats.org/officeDocument/2006/relationships" xmlns:p="http://schemas.openxmlformats.org/presentationml/2006/main">
+  <p:cSld>
+    <p:bg>
+      <p:bgPr>
+        <a:blipFill>
+          <a:blip r:embed="rId3">
+            <a:alphaModFix/>
+          </a:blip>
+          <a:stretch>
+            <a:fillRect/>
+          </a:stretch>
+        </a:blipFill>
+        <a:effectLst/>
+      </p:bgPr>
+    </p:bg>
+    <p:spTree>
+      <p:nvGrpSpPr>
+        <p:cNvPr id="1" name="Shape 75"/>
+        <p:cNvGrpSpPr/>
+        <p:nvPr/>
+      </p:nvGrpSpPr>
+      <p:grpSpPr>
+        <a:xfrm>
+          <a:off x="0" y="0"/>
+          <a:ext cx="0" cy="0"/>
+          <a:chOff x="0" y="0"/>
+          <a:chExt cx="0" cy="0"/>
+        </a:xfrm>
+      </p:grpSpPr>
+      <p:sp>
+        <p:nvSpPr>
+          <p:cNvPr id="7" name="Shape 76">
+            <a:extLst>
+              <a:ext uri="{FF2B5EF4-FFF2-40B4-BE49-F238E27FC236}">
+                <a16:creationId xmlns="" xmlns:a16="http://schemas.microsoft.com/office/drawing/2014/main" id="{823F227E-2080-4C2D-A66D-23642D088BDD}"/>
+              </a:ext>
+            </a:extLst>
+          </p:cNvPr>
+          <p:cNvSpPr txBox="1">
+            <a:spLocks noGrp="1"/>
+          </p:cNvSpPr>
+          <p:nvPr>
+            <p:ph type="title"/>
+          </p:nvPr>
+        </p:nvSpPr>
+        <p:spPr>
+          <a:xfrm>
+            <a:off x="0" y="1042600"/>
+            <a:ext cx="9144000" cy="572700"/>
+          </a:xfrm>
+          <a:prstGeom prst="rect">
+            <a:avLst/>
+          </a:prstGeom>
+        </p:spPr>
+        <p:txBody>
+          <a:bodyPr lIns="91425" tIns="91425" rIns="91425" bIns="91425" anchor="t" anchorCtr="0">
+            <a:noAutofit/>
+          </a:bodyPr>
+          <a:lstStyle/>
+          <a:p>
+            <a:pPr lvl="0" algn="ctr" rtl="0">
+              <a:spcBef>
+                <a:spcPts val="0"/>
+              </a:spcBef>
+              <a:buNone/>
+            </a:pPr>
+            <a:r>
+              <a:rPr lang="es-CO" dirty="0">
+                <a:solidFill>
+                  <a:srgbClr val="D65213"/>
+                </a:solidFill>
+              </a:rPr>
+              <a:t>Contexto</a:t>
+            </a:r>
+            <a:endParaRPr lang="es" dirty="0">
+              <a:solidFill>
+                <a:srgbClr val="D65213"/>
+              </a:solidFill>
+            </a:endParaRPr>
+          </a:p>
+        </p:txBody>
+      </p:sp>
+      <p:cxnSp>
+        <p:nvCxnSpPr>
+          <p:cNvPr id="9" name="Shape 77">
+            <a:extLst>
+              <a:ext uri="{FF2B5EF4-FFF2-40B4-BE49-F238E27FC236}">
+                <a16:creationId xmlns="" xmlns:a16="http://schemas.microsoft.com/office/drawing/2014/main" id="{70A6B525-E3CF-4F8C-835A-CDB84BD6BEBA}"/>
+              </a:ext>
+            </a:extLst>
+          </p:cNvPr>
+          <p:cNvCxnSpPr/>
+          <p:nvPr/>
+        </p:nvCxnSpPr>
+        <p:spPr>
+          <a:xfrm>
+            <a:off x="1465325" y="1921250"/>
+            <a:ext cx="0" cy="330000"/>
+          </a:xfrm>
+          <a:prstGeom prst="straightConnector1">
+            <a:avLst/>
+          </a:prstGeom>
+          <a:noFill/>
+          <a:ln w="19050" cap="flat" cmpd="sng">
+            <a:solidFill>
+              <a:srgbClr val="FF9900"/>
+            </a:solidFill>
+            <a:prstDash val="solid"/>
+            <a:round/>
+            <a:headEnd type="none" w="lg" len="lg"/>
+            <a:tailEnd type="none" w="lg" len="lg"/>
+          </a:ln>
+        </p:spPr>
+      </p:cxnSp>
+      <p:sp>
+        <p:nvSpPr>
+          <p:cNvPr id="10" name="Marcador de contenido 2">
+            <a:extLst>
+              <a:ext uri="{FF2B5EF4-FFF2-40B4-BE49-F238E27FC236}">
+                <a16:creationId xmlns="" xmlns:a16="http://schemas.microsoft.com/office/drawing/2014/main" id="{CCBDC1B4-3E5B-4797-AC57-42C6439571A5}"/>
+              </a:ext>
+            </a:extLst>
+          </p:cNvPr>
+          <p:cNvSpPr txBox="1">
+            <a:spLocks/>
+          </p:cNvSpPr>
+          <p:nvPr/>
+        </p:nvSpPr>
+        <p:spPr>
+          <a:xfrm>
+            <a:off x="1465325" y="1615300"/>
+            <a:ext cx="7107173" cy="3278818"/>
+          </a:xfrm>
+          <a:prstGeom prst="rect">
+            <a:avLst/>
+          </a:prstGeom>
+        </p:spPr>
+        <p:txBody>
+          <a:bodyPr vert="horz" lIns="91440" tIns="45720" rIns="91440" bIns="45720" rtlCol="0">
+            <a:normAutofit/>
+          </a:bodyPr>
+          <a:lstStyle>
+            <a:lvl1pPr marL="228600" indent="-228600" algn="l" defTabSz="914400" rtl="0" eaLnBrk="1" latinLnBrk="0" hangingPunct="1">
+              <a:lnSpc>
+                <a:spcPct val="90000"/>
+              </a:lnSpc>
+              <a:spcBef>
+                <a:spcPts val="1000"/>
+              </a:spcBef>
+              <a:buFont typeface="Arial" panose="020B0604020202020204" pitchFamily="34" charset="0"/>
+              <a:buChar char="•"/>
+              <a:defRPr sz="2800" kern="1200">
+                <a:solidFill>
+                  <a:schemeClr val="tx1"/>
+                </a:solidFill>
+                <a:latin typeface="+mn-lt"/>
+                <a:ea typeface="+mn-ea"/>
+                <a:cs typeface="+mn-cs"/>
+              </a:defRPr>
+            </a:lvl1pPr>
+            <a:lvl2pPr marL="685800" indent="-228600" algn="l" defTabSz="914400" rtl="0" eaLnBrk="1" latinLnBrk="0" hangingPunct="1">
+              <a:lnSpc>
+                <a:spcPct val="90000"/>
+              </a:lnSpc>
+              <a:spcBef>
+                <a:spcPts val="500"/>
+              </a:spcBef>
+              <a:buFont typeface="Arial" panose="020B0604020202020204" pitchFamily="34" charset="0"/>
+              <a:buChar char="•"/>
+              <a:defRPr sz="2400" kern="1200">
+                <a:solidFill>
+                  <a:schemeClr val="tx1"/>
+                </a:solidFill>
+                <a:latin typeface="+mn-lt"/>
+                <a:ea typeface="+mn-ea"/>
+                <a:cs typeface="+mn-cs"/>
+              </a:defRPr>
+            </a:lvl2pPr>
+            <a:lvl3pPr marL="1143000" indent="-228600" algn="l" defTabSz="914400" rtl="0" eaLnBrk="1" latinLnBrk="0" hangingPunct="1">
+              <a:lnSpc>
+                <a:spcPct val="90000"/>
+              </a:lnSpc>
+              <a:spcBef>
+                <a:spcPts val="500"/>
+              </a:spcBef>
+              <a:buFont typeface="Arial" panose="020B0604020202020204" pitchFamily="34" charset="0"/>
+              <a:buChar char="•"/>
+              <a:defRPr sz="2000" kern="1200">
+                <a:solidFill>
+                  <a:schemeClr val="tx1"/>
+                </a:solidFill>
+                <a:latin typeface="+mn-lt"/>
+                <a:ea typeface="+mn-ea"/>
+                <a:cs typeface="+mn-cs"/>
+              </a:defRPr>
+            </a:lvl3pPr>
+            <a:lvl4pPr marL="1600200" indent="-228600" algn="l" defTabSz="914400" rtl="0" eaLnBrk="1" latinLnBrk="0" hangingPunct="1">
+              <a:lnSpc>
+                <a:spcPct val="90000"/>
+              </a:lnSpc>
+              <a:spcBef>
+                <a:spcPts val="500"/>
+              </a:spcBef>
+              <a:buFont typeface="Arial" panose="020B0604020202020204" pitchFamily="34" charset="0"/>
+              <a:buChar char="•"/>
+              <a:defRPr sz="1800" kern="1200">
+                <a:solidFill>
+                  <a:schemeClr val="tx1"/>
+                </a:solidFill>
+                <a:latin typeface="+mn-lt"/>
+                <a:ea typeface="+mn-ea"/>
+                <a:cs typeface="+mn-cs"/>
+              </a:defRPr>
+            </a:lvl4pPr>
+            <a:lvl5pPr marL="2057400" indent="-228600" algn="l" defTabSz="914400" rtl="0" eaLnBrk="1" latinLnBrk="0" hangingPunct="1">
+              <a:lnSpc>
+                <a:spcPct val="90000"/>
+              </a:lnSpc>
+              <a:spcBef>
+                <a:spcPts val="500"/>
+              </a:spcBef>
+              <a:buFont typeface="Arial" panose="020B0604020202020204" pitchFamily="34" charset="0"/>
+              <a:buChar char="•"/>
+              <a:defRPr sz="1800" kern="1200">
+                <a:solidFill>
+                  <a:schemeClr val="tx1"/>
+                </a:solidFill>
+                <a:latin typeface="+mn-lt"/>
+                <a:ea typeface="+mn-ea"/>
+                <a:cs typeface="+mn-cs"/>
+              </a:defRPr>
+            </a:lvl5pPr>
+            <a:lvl6pPr marL="2514600" indent="-228600" algn="l" defTabSz="914400" rtl="0" eaLnBrk="1" latinLnBrk="0" hangingPunct="1">
+              <a:lnSpc>
+                <a:spcPct val="90000"/>
+              </a:lnSpc>
+              <a:spcBef>
+                <a:spcPts val="500"/>
+              </a:spcBef>
+              <a:buFont typeface="Arial" panose="020B0604020202020204" pitchFamily="34" charset="0"/>
+              <a:buChar char="•"/>
+              <a:defRPr sz="1800" kern="1200">
+                <a:solidFill>
+                  <a:schemeClr val="tx1"/>
+                </a:solidFill>
+                <a:latin typeface="+mn-lt"/>
+                <a:ea typeface="+mn-ea"/>
+                <a:cs typeface="+mn-cs"/>
+              </a:defRPr>
+            </a:lvl6pPr>
+            <a:lvl7pPr marL="2971800" indent="-228600" algn="l" defTabSz="914400" rtl="0" eaLnBrk="1" latinLnBrk="0" hangingPunct="1">
+              <a:lnSpc>
+                <a:spcPct val="90000"/>
+              </a:lnSpc>
+              <a:spcBef>
+                <a:spcPts val="500"/>
+              </a:spcBef>
+              <a:buFont typeface="Arial" panose="020B0604020202020204" pitchFamily="34" charset="0"/>
+              <a:buChar char="•"/>
+              <a:defRPr sz="1800" kern="1200">
+                <a:solidFill>
+                  <a:schemeClr val="tx1"/>
+                </a:solidFill>
+                <a:latin typeface="+mn-lt"/>
+                <a:ea typeface="+mn-ea"/>
+                <a:cs typeface="+mn-cs"/>
+              </a:defRPr>
+            </a:lvl7pPr>
+            <a:lvl8pPr marL="3429000" indent="-228600" algn="l" defTabSz="914400" rtl="0" eaLnBrk="1" latinLnBrk="0" hangingPunct="1">
+              <a:lnSpc>
+                <a:spcPct val="90000"/>
+              </a:lnSpc>
+              <a:spcBef>
+                <a:spcPts val="500"/>
+              </a:spcBef>
+              <a:buFont typeface="Arial" panose="020B0604020202020204" pitchFamily="34" charset="0"/>
+              <a:buChar char="•"/>
+              <a:defRPr sz="1800" kern="1200">
+                <a:solidFill>
+                  <a:schemeClr val="tx1"/>
+                </a:solidFill>
+                <a:latin typeface="+mn-lt"/>
+                <a:ea typeface="+mn-ea"/>
+                <a:cs typeface="+mn-cs"/>
+              </a:defRPr>
+            </a:lvl8pPr>
+            <a:lvl9pPr marL="3886200" indent="-228600" algn="l" defTabSz="914400" rtl="0" eaLnBrk="1" latinLnBrk="0" hangingPunct="1">
+              <a:lnSpc>
+                <a:spcPct val="90000"/>
+              </a:lnSpc>
+              <a:spcBef>
+                <a:spcPts val="500"/>
+              </a:spcBef>
+              <a:buFont typeface="Arial" panose="020B0604020202020204" pitchFamily="34" charset="0"/>
+              <a:buChar char="•"/>
+              <a:defRPr sz="1800" kern="1200">
+                <a:solidFill>
+                  <a:schemeClr val="tx1"/>
+                </a:solidFill>
+                <a:latin typeface="+mn-lt"/>
+                <a:ea typeface="+mn-ea"/>
+                <a:cs typeface="+mn-cs"/>
+              </a:defRPr>
+            </a:lvl9pPr>
+          </a:lstStyle>
+          <a:p>
+            <a:pPr marL="228600" marR="0" lvl="0" indent="-228600" algn="l" defTabSz="914400" rtl="0" eaLnBrk="1" fontAlgn="auto" latinLnBrk="0" hangingPunct="1">
+              <a:lnSpc>
+                <a:spcPct val="90000"/>
+              </a:lnSpc>
+              <a:spcBef>
+                <a:spcPts val="1000"/>
+              </a:spcBef>
+              <a:spcAft>
+                <a:spcPts val="0"/>
+              </a:spcAft>
+              <a:buClrTx/>
+              <a:buSzTx/>
+              <a:buFont typeface="Arial" panose="020B0604020202020204" pitchFamily="34" charset="0"/>
+              <a:buChar char="•"/>
+              <a:tabLst/>
+              <a:defRPr/>
+            </a:pPr>
+            <a:r>
+              <a:rPr lang="es-CO" sz="2000" dirty="0">
+                <a:solidFill>
+                  <a:schemeClr val="tx2">
+                    <a:lumMod val="50000"/>
+                  </a:schemeClr>
+                </a:solidFill>
+                <a:latin typeface="Calibri" panose="020F0502020204030204"/>
+              </a:rPr>
+              <a:t>Empresa de fabricación, confección y comercialización de calzado.</a:t>
+            </a:r>
+          </a:p>
+          <a:p>
+            <a:pPr marL="228600" marR="0" lvl="0" indent="-228600" algn="l" defTabSz="914400" rtl="0" eaLnBrk="1" fontAlgn="auto" latinLnBrk="0" hangingPunct="1">
+              <a:lnSpc>
+                <a:spcPct val="90000"/>
+              </a:lnSpc>
+              <a:spcBef>
+                <a:spcPts val="1000"/>
+              </a:spcBef>
+              <a:spcAft>
+                <a:spcPts val="0"/>
+              </a:spcAft>
+              <a:buClrTx/>
+              <a:buSzTx/>
+              <a:buFont typeface="Arial" panose="020B0604020202020204" pitchFamily="34" charset="0"/>
+              <a:buChar char="•"/>
+              <a:tabLst/>
+              <a:defRPr/>
+            </a:pPr>
+            <a:r>
+              <a:rPr kumimoji="0" lang="es-CO" sz="2000" b="0" i="0" u="none" strike="noStrike" kern="1200" cap="none" spc="0" normalizeH="0" baseline="0" noProof="0" dirty="0">
+                <a:ln>
+                  <a:noFill/>
+                </a:ln>
+                <a:solidFill>
+                  <a:schemeClr val="tx2">
+                    <a:lumMod val="50000"/>
+                  </a:schemeClr>
+                </a:solidFill>
+                <a:effectLst/>
+                <a:uLnTx/>
+                <a:uFillTx/>
+                <a:latin typeface="Calibri" panose="020F0502020204030204"/>
+                <a:ea typeface="+mn-ea"/>
+                <a:cs typeface="+mn-cs"/>
+              </a:rPr>
+              <a:t>La fábrica está ubicada en la zona industrial de la localidad de Puente Aranda, en la ciudad de Bogotá.</a:t>
+            </a:r>
+            <a:endParaRPr lang="es-ES" sz="1800" dirty="0">
+              <a:solidFill>
+                <a:schemeClr val="tx2">
+                  <a:lumMod val="50000"/>
+                </a:schemeClr>
+              </a:solidFill>
+              <a:latin typeface="Calibri" panose="020F0502020204030204"/>
+            </a:endParaRPr>
+          </a:p>
+          <a:p>
+            <a:pPr marL="228600" marR="0" lvl="0" indent="-228600" algn="l" defTabSz="914400" rtl="0" eaLnBrk="1" fontAlgn="auto" latinLnBrk="0" hangingPunct="1">
+              <a:lnSpc>
+                <a:spcPct val="90000"/>
+              </a:lnSpc>
+              <a:spcBef>
+                <a:spcPts val="1000"/>
+              </a:spcBef>
+              <a:spcAft>
+                <a:spcPts val="0"/>
+              </a:spcAft>
+              <a:buClrTx/>
+              <a:buSzTx/>
+              <a:buFont typeface="Arial" panose="020B0604020202020204" pitchFamily="34" charset="0"/>
+              <a:buChar char="•"/>
+              <a:tabLst/>
+              <a:defRPr/>
+            </a:pPr>
+            <a:r>
+              <a:rPr lang="es-ES" sz="1800" dirty="0">
+                <a:solidFill>
+                  <a:schemeClr val="tx2">
+                    <a:lumMod val="50000"/>
+                  </a:schemeClr>
+                </a:solidFill>
+                <a:latin typeface="Calibri" panose="020F0502020204030204"/>
+              </a:rPr>
+              <a:t>La fábrica cuenta con un total de 100 operarios entre los 25 y 45 años de edad.</a:t>
+            </a:r>
+          </a:p>
+          <a:p>
+            <a:pPr marL="228600" marR="0" lvl="0" indent="-228600" algn="l" defTabSz="914400" rtl="0" eaLnBrk="1" fontAlgn="auto" latinLnBrk="0" hangingPunct="1">
+              <a:lnSpc>
+                <a:spcPct val="90000"/>
+              </a:lnSpc>
+              <a:spcBef>
+                <a:spcPts val="1000"/>
+              </a:spcBef>
+              <a:spcAft>
+                <a:spcPts val="0"/>
+              </a:spcAft>
+              <a:buClrTx/>
+              <a:buSzTx/>
+              <a:buFont typeface="Arial" panose="020B0604020202020204" pitchFamily="34" charset="0"/>
+              <a:buChar char="•"/>
+              <a:tabLst/>
+              <a:defRPr/>
+            </a:pPr>
+            <a:endParaRPr lang="es-ES" sz="1800" dirty="0">
+              <a:solidFill>
+                <a:schemeClr val="tx2">
+                  <a:lumMod val="50000"/>
+                </a:schemeClr>
+              </a:solidFill>
+              <a:latin typeface="Calibri" panose="020F0502020204030204"/>
+            </a:endParaRPr>
+          </a:p>
+          <a:p>
+            <a:pPr marL="228600" marR="0" lvl="0" indent="-228600" algn="l" defTabSz="914400" rtl="0" eaLnBrk="1" fontAlgn="auto" latinLnBrk="0" hangingPunct="1">
+              <a:lnSpc>
+                <a:spcPct val="90000"/>
+              </a:lnSpc>
+              <a:spcBef>
+                <a:spcPts val="1000"/>
+              </a:spcBef>
+              <a:spcAft>
+                <a:spcPts val="0"/>
+              </a:spcAft>
+              <a:buClrTx/>
+              <a:buSzTx/>
+              <a:buFont typeface="Arial" panose="020B0604020202020204" pitchFamily="34" charset="0"/>
+              <a:buChar char="•"/>
+              <a:tabLst/>
+              <a:defRPr/>
+            </a:pPr>
+            <a:endParaRPr kumimoji="0" lang="es-CO" sz="2000" b="0" i="0" u="none" strike="noStrike" kern="1200" cap="none" spc="0" normalizeH="0" baseline="0" noProof="0" dirty="0">
+              <a:ln>
+                <a:noFill/>
+              </a:ln>
+              <a:solidFill>
+                <a:schemeClr val="tx2">
+                  <a:lumMod val="50000"/>
+                </a:schemeClr>
+              </a:solidFill>
+              <a:effectLst/>
+              <a:uLnTx/>
+              <a:uFillTx/>
+              <a:latin typeface="Calibri" panose="020F0502020204030204"/>
+              <a:ea typeface="+mn-ea"/>
+              <a:cs typeface="+mn-cs"/>
+            </a:endParaRPr>
+          </a:p>
+        </p:txBody>
+      </p:sp>
+    </p:spTree>
+    <p:extLst>
+      <p:ext uri="{BB962C8B-B14F-4D97-AF65-F5344CB8AC3E}">
+        <p14:creationId xmlns:p14="http://schemas.microsoft.com/office/powerpoint/2010/main" val="1202988118"/>
+      </p:ext>
+    </p:extLst>
+  </p:cSld>
+  <p:clrMapOvr>
+    <a:masterClrMapping/>
+  </p:clrMapOvr>
+  <p:timing>
+    <p:tnLst>
+      <p:par>
+        <p:cTn id="1" dur="indefinite" restart="never" nodeType="tmRoot"/>
+      </p:par>
+    </p:tnLst>
+  </p:timing>
+</p:sld>
+</file>
+
+<file path=ppt/slides/slide3.xml><?xml version="1.0" encoding="utf-8"?>
 <p:sld xmlns:a="http://schemas.openxmlformats.org/drawingml/2006/main" xmlns:r="http://schemas.openxmlformats.org/officeDocument/2006/relationships" xmlns:p="http://schemas.openxmlformats.org/presentationml/2006/main">
   <p:cSld>
     <p:bg>
@@ -8005,495 +10534,13 @@
   <p:clrMapOvr>
     <a:masterClrMapping/>
   </p:clrMapOvr>
-</p:sld>
-</file>
-
-<file path=ppt/slides/slide3.xml><?xml version="1.0" encoding="utf-8"?>
-<p:sld xmlns:a="http://schemas.openxmlformats.org/drawingml/2006/main" xmlns:r="http://schemas.openxmlformats.org/officeDocument/2006/relationships" xmlns:p="http://schemas.openxmlformats.org/presentationml/2006/main">
-  <p:cSld>
-    <p:bg>
-      <p:bgPr>
-        <a:blipFill>
-          <a:blip r:embed="rId3">
-            <a:alphaModFix/>
-          </a:blip>
-          <a:stretch>
-            <a:fillRect/>
-          </a:stretch>
-        </a:blipFill>
-        <a:effectLst/>
-      </p:bgPr>
-    </p:bg>
-    <p:spTree>
-      <p:nvGrpSpPr>
-        <p:cNvPr id="1" name="Shape 75"/>
-        <p:cNvGrpSpPr/>
-        <p:nvPr/>
-      </p:nvGrpSpPr>
-      <p:grpSpPr>
-        <a:xfrm>
-          <a:off x="0" y="0"/>
-          <a:ext cx="0" cy="0"/>
-          <a:chOff x="0" y="0"/>
-          <a:chExt cx="0" cy="0"/>
-        </a:xfrm>
-      </p:grpSpPr>
-      <p:sp>
-        <p:nvSpPr>
-          <p:cNvPr id="7" name="Shape 76">
-            <a:extLst>
-              <a:ext uri="{FF2B5EF4-FFF2-40B4-BE49-F238E27FC236}">
-                <a16:creationId xmlns:a16="http://schemas.microsoft.com/office/drawing/2014/main" id="{823F227E-2080-4C2D-A66D-23642D088BDD}"/>
-              </a:ext>
-            </a:extLst>
-          </p:cNvPr>
-          <p:cNvSpPr txBox="1">
-            <a:spLocks noGrp="1"/>
-          </p:cNvSpPr>
-          <p:nvPr>
-            <p:ph type="title"/>
-          </p:nvPr>
-        </p:nvSpPr>
-        <p:spPr>
-          <a:xfrm>
-            <a:off x="0" y="1042600"/>
-            <a:ext cx="9144000" cy="572700"/>
-          </a:xfrm>
-          <a:prstGeom prst="rect">
-            <a:avLst/>
-          </a:prstGeom>
-        </p:spPr>
-        <p:txBody>
-          <a:bodyPr lIns="91425" tIns="91425" rIns="91425" bIns="91425" anchor="t" anchorCtr="0">
-            <a:noAutofit/>
-          </a:bodyPr>
-          <a:lstStyle/>
-          <a:p>
-            <a:pPr lvl="0" algn="ctr" rtl="0">
-              <a:spcBef>
-                <a:spcPts val="0"/>
-              </a:spcBef>
-              <a:buNone/>
-            </a:pPr>
-            <a:r>
-              <a:rPr lang="es-CO" dirty="0">
-                <a:solidFill>
-                  <a:srgbClr val="D65213"/>
-                </a:solidFill>
-              </a:rPr>
-              <a:t>Contexto</a:t>
-            </a:r>
-            <a:endParaRPr lang="es" dirty="0">
-              <a:solidFill>
-                <a:srgbClr val="D65213"/>
-              </a:solidFill>
-            </a:endParaRPr>
-          </a:p>
-        </p:txBody>
-      </p:sp>
-      <p:cxnSp>
-        <p:nvCxnSpPr>
-          <p:cNvPr id="9" name="Shape 77">
-            <a:extLst>
-              <a:ext uri="{FF2B5EF4-FFF2-40B4-BE49-F238E27FC236}">
-                <a16:creationId xmlns:a16="http://schemas.microsoft.com/office/drawing/2014/main" id="{70A6B525-E3CF-4F8C-835A-CDB84BD6BEBA}"/>
-              </a:ext>
-            </a:extLst>
-          </p:cNvPr>
-          <p:cNvCxnSpPr/>
-          <p:nvPr/>
-        </p:nvCxnSpPr>
-        <p:spPr>
-          <a:xfrm>
-            <a:off x="1465325" y="1921250"/>
-            <a:ext cx="0" cy="330000"/>
-          </a:xfrm>
-          <a:prstGeom prst="straightConnector1">
-            <a:avLst/>
-          </a:prstGeom>
-          <a:noFill/>
-          <a:ln w="19050" cap="flat" cmpd="sng">
-            <a:solidFill>
-              <a:srgbClr val="FF9900"/>
-            </a:solidFill>
-            <a:prstDash val="solid"/>
-            <a:round/>
-            <a:headEnd type="none" w="lg" len="lg"/>
-            <a:tailEnd type="none" w="lg" len="lg"/>
-          </a:ln>
-        </p:spPr>
-      </p:cxnSp>
-      <p:sp>
-        <p:nvSpPr>
-          <p:cNvPr id="10" name="Marcador de contenido 2">
-            <a:extLst>
-              <a:ext uri="{FF2B5EF4-FFF2-40B4-BE49-F238E27FC236}">
-                <a16:creationId xmlns:a16="http://schemas.microsoft.com/office/drawing/2014/main" id="{CCBDC1B4-3E5B-4797-AC57-42C6439571A5}"/>
-              </a:ext>
-            </a:extLst>
-          </p:cNvPr>
-          <p:cNvSpPr txBox="1">
-            <a:spLocks/>
-          </p:cNvSpPr>
-          <p:nvPr/>
-        </p:nvSpPr>
-        <p:spPr>
-          <a:xfrm>
-            <a:off x="1465325" y="1615300"/>
-            <a:ext cx="7107173" cy="3278818"/>
-          </a:xfrm>
-          <a:prstGeom prst="rect">
-            <a:avLst/>
-          </a:prstGeom>
-        </p:spPr>
-        <p:txBody>
-          <a:bodyPr vert="horz" lIns="91440" tIns="45720" rIns="91440" bIns="45720" rtlCol="0">
-            <a:normAutofit/>
-          </a:bodyPr>
-          <a:lstStyle>
-            <a:lvl1pPr marL="228600" indent="-228600" algn="l" defTabSz="914400" rtl="0" eaLnBrk="1" latinLnBrk="0" hangingPunct="1">
-              <a:lnSpc>
-                <a:spcPct val="90000"/>
-              </a:lnSpc>
-              <a:spcBef>
-                <a:spcPts val="1000"/>
-              </a:spcBef>
-              <a:buFont typeface="Arial" panose="020B0604020202020204" pitchFamily="34" charset="0"/>
-              <a:buChar char="•"/>
-              <a:defRPr sz="2800" kern="1200">
-                <a:solidFill>
-                  <a:schemeClr val="tx1"/>
-                </a:solidFill>
-                <a:latin typeface="+mn-lt"/>
-                <a:ea typeface="+mn-ea"/>
-                <a:cs typeface="+mn-cs"/>
-              </a:defRPr>
-            </a:lvl1pPr>
-            <a:lvl2pPr marL="685800" indent="-228600" algn="l" defTabSz="914400" rtl="0" eaLnBrk="1" latinLnBrk="0" hangingPunct="1">
-              <a:lnSpc>
-                <a:spcPct val="90000"/>
-              </a:lnSpc>
-              <a:spcBef>
-                <a:spcPts val="500"/>
-              </a:spcBef>
-              <a:buFont typeface="Arial" panose="020B0604020202020204" pitchFamily="34" charset="0"/>
-              <a:buChar char="•"/>
-              <a:defRPr sz="2400" kern="1200">
-                <a:solidFill>
-                  <a:schemeClr val="tx1"/>
-                </a:solidFill>
-                <a:latin typeface="+mn-lt"/>
-                <a:ea typeface="+mn-ea"/>
-                <a:cs typeface="+mn-cs"/>
-              </a:defRPr>
-            </a:lvl2pPr>
-            <a:lvl3pPr marL="1143000" indent="-228600" algn="l" defTabSz="914400" rtl="0" eaLnBrk="1" latinLnBrk="0" hangingPunct="1">
-              <a:lnSpc>
-                <a:spcPct val="90000"/>
-              </a:lnSpc>
-              <a:spcBef>
-                <a:spcPts val="500"/>
-              </a:spcBef>
-              <a:buFont typeface="Arial" panose="020B0604020202020204" pitchFamily="34" charset="0"/>
-              <a:buChar char="•"/>
-              <a:defRPr sz="2000" kern="1200">
-                <a:solidFill>
-                  <a:schemeClr val="tx1"/>
-                </a:solidFill>
-                <a:latin typeface="+mn-lt"/>
-                <a:ea typeface="+mn-ea"/>
-                <a:cs typeface="+mn-cs"/>
-              </a:defRPr>
-            </a:lvl3pPr>
-            <a:lvl4pPr marL="1600200" indent="-228600" algn="l" defTabSz="914400" rtl="0" eaLnBrk="1" latinLnBrk="0" hangingPunct="1">
-              <a:lnSpc>
-                <a:spcPct val="90000"/>
-              </a:lnSpc>
-              <a:spcBef>
-                <a:spcPts val="500"/>
-              </a:spcBef>
-              <a:buFont typeface="Arial" panose="020B0604020202020204" pitchFamily="34" charset="0"/>
-              <a:buChar char="•"/>
-              <a:defRPr sz="1800" kern="1200">
-                <a:solidFill>
-                  <a:schemeClr val="tx1"/>
-                </a:solidFill>
-                <a:latin typeface="+mn-lt"/>
-                <a:ea typeface="+mn-ea"/>
-                <a:cs typeface="+mn-cs"/>
-              </a:defRPr>
-            </a:lvl4pPr>
-            <a:lvl5pPr marL="2057400" indent="-228600" algn="l" defTabSz="914400" rtl="0" eaLnBrk="1" latinLnBrk="0" hangingPunct="1">
-              <a:lnSpc>
-                <a:spcPct val="90000"/>
-              </a:lnSpc>
-              <a:spcBef>
-                <a:spcPts val="500"/>
-              </a:spcBef>
-              <a:buFont typeface="Arial" panose="020B0604020202020204" pitchFamily="34" charset="0"/>
-              <a:buChar char="•"/>
-              <a:defRPr sz="1800" kern="1200">
-                <a:solidFill>
-                  <a:schemeClr val="tx1"/>
-                </a:solidFill>
-                <a:latin typeface="+mn-lt"/>
-                <a:ea typeface="+mn-ea"/>
-                <a:cs typeface="+mn-cs"/>
-              </a:defRPr>
-            </a:lvl5pPr>
-            <a:lvl6pPr marL="2514600" indent="-228600" algn="l" defTabSz="914400" rtl="0" eaLnBrk="1" latinLnBrk="0" hangingPunct="1">
-              <a:lnSpc>
-                <a:spcPct val="90000"/>
-              </a:lnSpc>
-              <a:spcBef>
-                <a:spcPts val="500"/>
-              </a:spcBef>
-              <a:buFont typeface="Arial" panose="020B0604020202020204" pitchFamily="34" charset="0"/>
-              <a:buChar char="•"/>
-              <a:defRPr sz="1800" kern="1200">
-                <a:solidFill>
-                  <a:schemeClr val="tx1"/>
-                </a:solidFill>
-                <a:latin typeface="+mn-lt"/>
-                <a:ea typeface="+mn-ea"/>
-                <a:cs typeface="+mn-cs"/>
-              </a:defRPr>
-            </a:lvl6pPr>
-            <a:lvl7pPr marL="2971800" indent="-228600" algn="l" defTabSz="914400" rtl="0" eaLnBrk="1" latinLnBrk="0" hangingPunct="1">
-              <a:lnSpc>
-                <a:spcPct val="90000"/>
-              </a:lnSpc>
-              <a:spcBef>
-                <a:spcPts val="500"/>
-              </a:spcBef>
-              <a:buFont typeface="Arial" panose="020B0604020202020204" pitchFamily="34" charset="0"/>
-              <a:buChar char="•"/>
-              <a:defRPr sz="1800" kern="1200">
-                <a:solidFill>
-                  <a:schemeClr val="tx1"/>
-                </a:solidFill>
-                <a:latin typeface="+mn-lt"/>
-                <a:ea typeface="+mn-ea"/>
-                <a:cs typeface="+mn-cs"/>
-              </a:defRPr>
-            </a:lvl7pPr>
-            <a:lvl8pPr marL="3429000" indent="-228600" algn="l" defTabSz="914400" rtl="0" eaLnBrk="1" latinLnBrk="0" hangingPunct="1">
-              <a:lnSpc>
-                <a:spcPct val="90000"/>
-              </a:lnSpc>
-              <a:spcBef>
-                <a:spcPts val="500"/>
-              </a:spcBef>
-              <a:buFont typeface="Arial" panose="020B0604020202020204" pitchFamily="34" charset="0"/>
-              <a:buChar char="•"/>
-              <a:defRPr sz="1800" kern="1200">
-                <a:solidFill>
-                  <a:schemeClr val="tx1"/>
-                </a:solidFill>
-                <a:latin typeface="+mn-lt"/>
-                <a:ea typeface="+mn-ea"/>
-                <a:cs typeface="+mn-cs"/>
-              </a:defRPr>
-            </a:lvl8pPr>
-            <a:lvl9pPr marL="3886200" indent="-228600" algn="l" defTabSz="914400" rtl="0" eaLnBrk="1" latinLnBrk="0" hangingPunct="1">
-              <a:lnSpc>
-                <a:spcPct val="90000"/>
-              </a:lnSpc>
-              <a:spcBef>
-                <a:spcPts val="500"/>
-              </a:spcBef>
-              <a:buFont typeface="Arial" panose="020B0604020202020204" pitchFamily="34" charset="0"/>
-              <a:buChar char="•"/>
-              <a:defRPr sz="1800" kern="1200">
-                <a:solidFill>
-                  <a:schemeClr val="tx1"/>
-                </a:solidFill>
-                <a:latin typeface="+mn-lt"/>
-                <a:ea typeface="+mn-ea"/>
-                <a:cs typeface="+mn-cs"/>
-              </a:defRPr>
-            </a:lvl9pPr>
-          </a:lstStyle>
-          <a:p>
-            <a:pPr marL="228600" marR="0" lvl="0" indent="-228600" algn="l" defTabSz="914400" rtl="0" eaLnBrk="1" fontAlgn="auto" latinLnBrk="0" hangingPunct="1">
-              <a:lnSpc>
-                <a:spcPct val="90000"/>
-              </a:lnSpc>
-              <a:spcBef>
-                <a:spcPts val="1000"/>
-              </a:spcBef>
-              <a:spcAft>
-                <a:spcPts val="0"/>
-              </a:spcAft>
-              <a:buClrTx/>
-              <a:buSzTx/>
-              <a:buFont typeface="Arial" panose="020B0604020202020204" pitchFamily="34" charset="0"/>
-              <a:buChar char="•"/>
-              <a:tabLst/>
-              <a:defRPr/>
-            </a:pPr>
-            <a:r>
-              <a:rPr lang="es-CO" sz="2000" dirty="0">
-                <a:solidFill>
-                  <a:schemeClr val="tx2">
-                    <a:lumMod val="50000"/>
-                  </a:schemeClr>
-                </a:solidFill>
-                <a:latin typeface="Calibri" panose="020F0502020204030204"/>
-              </a:rPr>
-              <a:t>Empresa de fabricación, confección y comercialización de calzado.</a:t>
-            </a:r>
-          </a:p>
-          <a:p>
-            <a:pPr marL="228600" marR="0" lvl="0" indent="-228600" algn="l" defTabSz="914400" rtl="0" eaLnBrk="1" fontAlgn="auto" latinLnBrk="0" hangingPunct="1">
-              <a:lnSpc>
-                <a:spcPct val="90000"/>
-              </a:lnSpc>
-              <a:spcBef>
-                <a:spcPts val="1000"/>
-              </a:spcBef>
-              <a:spcAft>
-                <a:spcPts val="0"/>
-              </a:spcAft>
-              <a:buClrTx/>
-              <a:buSzTx/>
-              <a:buFont typeface="Arial" panose="020B0604020202020204" pitchFamily="34" charset="0"/>
-              <a:buChar char="•"/>
-              <a:tabLst/>
-              <a:defRPr/>
-            </a:pPr>
-            <a:r>
-              <a:rPr kumimoji="0" lang="es-CO" sz="2000" b="0" i="0" u="none" strike="noStrike" kern="1200" cap="none" spc="0" normalizeH="0" baseline="0" noProof="0" dirty="0">
-                <a:ln>
-                  <a:noFill/>
-                </a:ln>
-                <a:solidFill>
-                  <a:schemeClr val="tx2">
-                    <a:lumMod val="50000"/>
-                  </a:schemeClr>
-                </a:solidFill>
-                <a:effectLst/>
-                <a:uLnTx/>
-                <a:uFillTx/>
-                <a:latin typeface="Calibri" panose="020F0502020204030204"/>
-                <a:ea typeface="+mn-ea"/>
-                <a:cs typeface="+mn-cs"/>
-              </a:rPr>
-              <a:t>La fábrica está ubicada en la zona industrial de la localidad de Puente Aranda, en la ciudad de Bogotá.</a:t>
-            </a:r>
-            <a:endParaRPr lang="es-ES" sz="1800" dirty="0">
-              <a:solidFill>
-                <a:schemeClr val="tx2">
-                  <a:lumMod val="50000"/>
-                </a:schemeClr>
-              </a:solidFill>
-              <a:latin typeface="Calibri" panose="020F0502020204030204"/>
-            </a:endParaRPr>
-          </a:p>
-          <a:p>
-            <a:pPr marL="228600" marR="0" lvl="0" indent="-228600" algn="l" defTabSz="914400" rtl="0" eaLnBrk="1" fontAlgn="auto" latinLnBrk="0" hangingPunct="1">
-              <a:lnSpc>
-                <a:spcPct val="90000"/>
-              </a:lnSpc>
-              <a:spcBef>
-                <a:spcPts val="1000"/>
-              </a:spcBef>
-              <a:spcAft>
-                <a:spcPts val="0"/>
-              </a:spcAft>
-              <a:buClrTx/>
-              <a:buSzTx/>
-              <a:buFont typeface="Arial" panose="020B0604020202020204" pitchFamily="34" charset="0"/>
-              <a:buChar char="•"/>
-              <a:tabLst/>
-              <a:defRPr/>
-            </a:pPr>
-            <a:r>
-              <a:rPr lang="es-ES" sz="1800" dirty="0">
-                <a:solidFill>
-                  <a:schemeClr val="tx2">
-                    <a:lumMod val="50000"/>
-                  </a:schemeClr>
-                </a:solidFill>
-                <a:latin typeface="Calibri" panose="020F0502020204030204"/>
-              </a:rPr>
-              <a:t>La fábrica cuenta con un total de 100 operarios entre los 25 y 45 años de edad.</a:t>
-            </a:r>
-          </a:p>
-          <a:p>
-            <a:pPr marL="228600" marR="0" lvl="0" indent="-228600" algn="l" defTabSz="914400" rtl="0" eaLnBrk="1" fontAlgn="auto" latinLnBrk="0" hangingPunct="1">
-              <a:lnSpc>
-                <a:spcPct val="90000"/>
-              </a:lnSpc>
-              <a:spcBef>
-                <a:spcPts val="1000"/>
-              </a:spcBef>
-              <a:spcAft>
-                <a:spcPts val="0"/>
-              </a:spcAft>
-              <a:buClrTx/>
-              <a:buSzTx/>
-              <a:buFont typeface="Arial" panose="020B0604020202020204" pitchFamily="34" charset="0"/>
-              <a:buChar char="•"/>
-              <a:tabLst/>
-              <a:defRPr/>
-            </a:pPr>
-            <a:endParaRPr lang="es-ES" sz="1800" dirty="0">
-              <a:solidFill>
-                <a:schemeClr val="tx2">
-                  <a:lumMod val="50000"/>
-                </a:schemeClr>
-              </a:solidFill>
-              <a:latin typeface="Calibri" panose="020F0502020204030204"/>
-            </a:endParaRPr>
-          </a:p>
-          <a:p>
-            <a:pPr marL="228600" marR="0" lvl="0" indent="-228600" algn="l" defTabSz="914400" rtl="0" eaLnBrk="1" fontAlgn="auto" latinLnBrk="0" hangingPunct="1">
-              <a:lnSpc>
-                <a:spcPct val="90000"/>
-              </a:lnSpc>
-              <a:spcBef>
-                <a:spcPts val="1000"/>
-              </a:spcBef>
-              <a:spcAft>
-                <a:spcPts val="0"/>
-              </a:spcAft>
-              <a:buClrTx/>
-              <a:buSzTx/>
-              <a:buFont typeface="Arial" panose="020B0604020202020204" pitchFamily="34" charset="0"/>
-              <a:buChar char="•"/>
-              <a:tabLst/>
-              <a:defRPr/>
-            </a:pPr>
-            <a:endParaRPr kumimoji="0" lang="es-CO" sz="2000" b="0" i="0" u="none" strike="noStrike" kern="1200" cap="none" spc="0" normalizeH="0" baseline="0" noProof="0" dirty="0">
-              <a:ln>
-                <a:noFill/>
-              </a:ln>
-              <a:solidFill>
-                <a:schemeClr val="tx2">
-                  <a:lumMod val="50000"/>
-                </a:schemeClr>
-              </a:solidFill>
-              <a:effectLst/>
-              <a:uLnTx/>
-              <a:uFillTx/>
-              <a:latin typeface="Calibri" panose="020F0502020204030204"/>
-              <a:ea typeface="+mn-ea"/>
-              <a:cs typeface="+mn-cs"/>
-            </a:endParaRPr>
-          </a:p>
-        </p:txBody>
-      </p:sp>
-    </p:spTree>
-    <p:extLst>
-      <p:ext uri="{BB962C8B-B14F-4D97-AF65-F5344CB8AC3E}">
-        <p14:creationId xmlns:p14="http://schemas.microsoft.com/office/powerpoint/2010/main" val="1202988118"/>
-      </p:ext>
-    </p:extLst>
-  </p:cSld>
-  <p:clrMapOvr>
-    <a:masterClrMapping/>
-  </p:clrMapOvr>
+  <p:timing>
+    <p:tnLst>
+      <p:par>
+        <p:cTn id="1" dur="indefinite" restart="never" nodeType="tmRoot"/>
+      </p:par>
+    </p:tnLst>
+  </p:timing>
 </p:sld>
 </file>
 
@@ -8529,10 +10576,10 @@
       </p:grpSpPr>
       <p:sp>
         <p:nvSpPr>
-          <p:cNvPr id="8" name="Shape 76">
+          <p:cNvPr id="2" name="Shape 76">
             <a:extLst>
               <a:ext uri="{FF2B5EF4-FFF2-40B4-BE49-F238E27FC236}">
-                <a16:creationId xmlns:a16="http://schemas.microsoft.com/office/drawing/2014/main" id="{CF40DF45-FB5D-4440-92AC-93BE8C82B997}"/>
+                <a16:creationId xmlns="" xmlns:a16="http://schemas.microsoft.com/office/drawing/2014/main" id="{5127D90A-2316-4D99-B1C3-3B89C94DA5FF}"/>
               </a:ext>
             </a:extLst>
           </p:cNvPr>
@@ -8570,7 +10617,7 @@
                   <a:srgbClr val="D65213"/>
                 </a:solidFill>
               </a:rPr>
-              <a:t>Cuantificación</a:t>
+              <a:t>Causas</a:t>
             </a:r>
             <a:endParaRPr lang="es" dirty="0">
               <a:solidFill>
@@ -8582,10 +10629,10 @@
       </p:sp>
       <p:cxnSp>
         <p:nvCxnSpPr>
-          <p:cNvPr id="11" name="Shape 77">
+          <p:cNvPr id="3" name="Shape 77">
             <a:extLst>
               <a:ext uri="{FF2B5EF4-FFF2-40B4-BE49-F238E27FC236}">
-                <a16:creationId xmlns:a16="http://schemas.microsoft.com/office/drawing/2014/main" id="{03DCC001-B4A5-444C-804B-FB0C6BA1FEB0}"/>
+                <a16:creationId xmlns="" xmlns:a16="http://schemas.microsoft.com/office/drawing/2014/main" id="{301F4023-D500-4009-B8B1-9518F79B9B72}"/>
               </a:ext>
             </a:extLst>
           </p:cNvPr>
@@ -8614,10 +10661,10 @@
       </p:cxnSp>
       <p:sp>
         <p:nvSpPr>
-          <p:cNvPr id="12" name="Marcador de contenido 2">
+          <p:cNvPr id="4" name="Marcador de contenido 2">
             <a:extLst>
               <a:ext uri="{FF2B5EF4-FFF2-40B4-BE49-F238E27FC236}">
-                <a16:creationId xmlns:a16="http://schemas.microsoft.com/office/drawing/2014/main" id="{9DEC5C61-270A-4264-B408-4C7D43594634}"/>
+                <a16:creationId xmlns="" xmlns:a16="http://schemas.microsoft.com/office/drawing/2014/main" id="{9DEA87FC-FE36-4A0C-870B-61A75C799DED}"/>
               </a:ext>
             </a:extLst>
           </p:cNvPr>
@@ -8628,8 +10675,8 @@
         </p:nvSpPr>
         <p:spPr>
           <a:xfrm>
-            <a:off x="1465325" y="1613634"/>
-            <a:ext cx="7169517" cy="3072666"/>
+            <a:off x="1465325" y="1921250"/>
+            <a:ext cx="7096783" cy="2557232"/>
           </a:xfrm>
           <a:prstGeom prst="rect">
             <a:avLst/>
@@ -8637,7 +10684,7 @@
         </p:spPr>
         <p:txBody>
           <a:bodyPr vert="horz" lIns="91440" tIns="45720" rIns="91440" bIns="45720" rtlCol="0">
-            <a:normAutofit fontScale="92500" lnSpcReduction="10000"/>
+            <a:normAutofit/>
           </a:bodyPr>
           <a:lstStyle>
             <a:lvl1pPr marL="228600" indent="-228600" algn="l" defTabSz="914400" rtl="0" eaLnBrk="1" latinLnBrk="0" hangingPunct="1">
@@ -8803,6 +10850,22 @@
               </a:defRPr>
             </a:lvl9pPr>
           </a:lstStyle>
+          <a:p>
+            <a:pPr>
+              <a:defRPr/>
+            </a:pPr>
+            <a:r>
+              <a:rPr lang="es-CO" sz="2000" u="sng" dirty="0">
+                <a:solidFill>
+                  <a:schemeClr val="tx2">
+                    <a:lumMod val="50000"/>
+                  </a:schemeClr>
+                </a:solidFill>
+                <a:latin typeface="Calibri" panose="020F0502020204030204"/>
+              </a:rPr>
+              <a:t>MALA PLANEACIÓN DE LA PRODUCCIÓN</a:t>
+            </a:r>
+          </a:p>
           <a:p>
             <a:pPr marL="228600" marR="0" lvl="0" indent="-228600" algn="l" defTabSz="914400" rtl="0" eaLnBrk="1" fontAlgn="auto" latinLnBrk="0" hangingPunct="1">
               <a:lnSpc>
@@ -8838,8 +10901,27 @@
                 <a:ea typeface="+mn-ea"/>
                 <a:cs typeface="+mn-cs"/>
               </a:rPr>
-              <a:t>La fábrica debe producir entre 10.000 y 15.000 zapatos semanales </a:t>
+              <a:t>Falta de personal.</a:t>
             </a:r>
+          </a:p>
+          <a:p>
+            <a:pPr marL="228600" marR="0" lvl="0" indent="-228600" algn="l" defTabSz="914400" rtl="0" eaLnBrk="1" fontAlgn="auto" latinLnBrk="0" hangingPunct="1">
+              <a:lnSpc>
+                <a:spcPct val="90000"/>
+              </a:lnSpc>
+              <a:spcBef>
+                <a:spcPts val="1000"/>
+              </a:spcBef>
+              <a:spcAft>
+                <a:spcPts val="0"/>
+              </a:spcAft>
+              <a:buClrTx/>
+              <a:buSzTx/>
+              <a:buFont typeface="Arial" panose="020B0604020202020204" pitchFamily="34" charset="0"/>
+              <a:buChar char="•"/>
+              <a:tabLst/>
+              <a:defRPr/>
+            </a:pPr>
             <a:r>
               <a:rPr lang="es-CO" sz="2000" dirty="0">
                 <a:solidFill>
@@ -8849,7 +10931,7 @@
                 </a:solidFill>
                 <a:latin typeface="Calibri" panose="020F0502020204030204"/>
               </a:rPr>
-              <a:t>en el periodo de mayor demanda de cada mes.</a:t>
+              <a:t>Horarios muy largos.</a:t>
             </a:r>
           </a:p>
           <a:p>
@@ -8871,23 +10953,15 @@
               <a:defRPr/>
             </a:pPr>
             <a:r>
-              <a:rPr kumimoji="0" lang="es-CO" sz="2000" b="0" i="0" u="none" strike="noStrike" kern="1200" cap="none" spc="0" normalizeH="0" baseline="0" noProof="0" dirty="0">
-                <a:ln>
-                  <a:noFill/>
-                </a:ln>
+              <a:rPr lang="es-CO" sz="2000" dirty="0">
                 <a:solidFill>
                   <a:schemeClr val="tx2">
                     <a:lumMod val="50000"/>
                   </a:schemeClr>
                 </a:solidFill>
-                <a:effectLst/>
-                <a:uLnTx/>
-                <a:uFillTx/>
                 <a:latin typeface="Calibri" panose="020F0502020204030204"/>
-                <a:ea typeface="+mn-ea"/>
-                <a:cs typeface="+mn-cs"/>
               </a:rPr>
-              <a:t>El 60% de los zapatos fabricados está siendo devuelto por baja calidad.</a:t>
+              <a:t>Capacitación del personal.</a:t>
             </a:r>
           </a:p>
           <a:p>
@@ -8908,144 +10982,42 @@
               <a:tabLst/>
               <a:defRPr/>
             </a:pPr>
-            <a:r>
-              <a:rPr kumimoji="0" lang="es-CO" sz="2000" b="0" i="0" u="none" strike="noStrike" kern="1200" cap="none" spc="0" normalizeH="0" baseline="0" noProof="0" dirty="0">
-                <a:ln>
-                  <a:noFill/>
-                </a:ln>
-                <a:solidFill>
-                  <a:schemeClr val="tx2">
-                    <a:lumMod val="50000"/>
-                  </a:schemeClr>
-                </a:solidFill>
-                <a:effectLst/>
-                <a:uLnTx/>
-                <a:uFillTx/>
-                <a:latin typeface="Calibri" panose="020F0502020204030204"/>
-                <a:ea typeface="+mn-ea"/>
-                <a:cs typeface="+mn-cs"/>
-              </a:rPr>
-              <a:t>El 20% de los zapatos fabricados no está saliendo a la venta por no cumplir los estándares mínimos de calidad.</a:t>
-            </a:r>
-          </a:p>
-          <a:p>
-            <a:pPr marL="228600" marR="0" lvl="0" indent="-228600" algn="l" defTabSz="914400" rtl="0" eaLnBrk="1" fontAlgn="auto" latinLnBrk="0" hangingPunct="1">
-              <a:lnSpc>
-                <a:spcPct val="90000"/>
-              </a:lnSpc>
-              <a:spcBef>
-                <a:spcPts val="1000"/>
-              </a:spcBef>
-              <a:spcAft>
-                <a:spcPts val="0"/>
-              </a:spcAft>
-              <a:buClrTx/>
-              <a:buSzTx/>
-              <a:buFont typeface="Arial" panose="020B0604020202020204" pitchFamily="34" charset="0"/>
-              <a:buChar char="•"/>
-              <a:tabLst/>
-              <a:defRPr/>
-            </a:pPr>
-            <a:r>
-              <a:rPr kumimoji="0" lang="es-CO" sz="2000" b="0" i="0" u="none" strike="noStrike" kern="1200" cap="none" spc="0" normalizeH="0" baseline="0" noProof="0" dirty="0">
-                <a:ln>
-                  <a:noFill/>
-                </a:ln>
-                <a:solidFill>
-                  <a:schemeClr val="tx2">
-                    <a:lumMod val="50000"/>
-                  </a:schemeClr>
-                </a:solidFill>
-                <a:effectLst/>
-                <a:uLnTx/>
-                <a:uFillTx/>
-                <a:latin typeface="Calibri" panose="020F0502020204030204"/>
-                <a:ea typeface="+mn-ea"/>
-                <a:cs typeface="+mn-cs"/>
-              </a:rPr>
-              <a:t>La empresa ha tenido que hacer recortes de personal porque el producido mensual no ha suplido el salario.</a:t>
-            </a:r>
-          </a:p>
-          <a:p>
-            <a:pPr marL="228600" marR="0" lvl="0" indent="-228600" algn="l" defTabSz="914400" rtl="0" eaLnBrk="1" fontAlgn="auto" latinLnBrk="0" hangingPunct="1">
-              <a:lnSpc>
-                <a:spcPct val="90000"/>
-              </a:lnSpc>
-              <a:spcBef>
-                <a:spcPts val="1000"/>
-              </a:spcBef>
-              <a:spcAft>
-                <a:spcPts val="0"/>
-              </a:spcAft>
-              <a:buClrTx/>
-              <a:buSzTx/>
-              <a:buFont typeface="Arial" panose="020B0604020202020204" pitchFamily="34" charset="0"/>
-              <a:buChar char="•"/>
-              <a:tabLst/>
-              <a:defRPr/>
-            </a:pPr>
-            <a:r>
-              <a:rPr kumimoji="0" lang="es-CO" sz="2000" b="0" i="0" u="none" strike="noStrike" kern="1200" cap="none" spc="0" normalizeH="0" baseline="0" noProof="0" dirty="0">
-                <a:ln>
-                  <a:noFill/>
-                </a:ln>
-                <a:solidFill>
-                  <a:schemeClr val="tx2">
-                    <a:lumMod val="50000"/>
-                  </a:schemeClr>
-                </a:solidFill>
-                <a:effectLst/>
-                <a:uLnTx/>
-                <a:uFillTx/>
-                <a:latin typeface="Calibri" panose="020F0502020204030204"/>
-                <a:ea typeface="+mn-ea"/>
-                <a:cs typeface="+mn-cs"/>
-              </a:rPr>
-              <a:t>El </a:t>
-            </a:r>
-            <a:r>
-              <a:rPr lang="es-CO" sz="2000" dirty="0">
-                <a:solidFill>
-                  <a:schemeClr val="tx2">
-                    <a:lumMod val="50000"/>
-                  </a:schemeClr>
-                </a:solidFill>
-                <a:latin typeface="Calibri" panose="020F0502020204030204"/>
-              </a:rPr>
-              <a:t>35% del personal operario </a:t>
-            </a:r>
-            <a:r>
-              <a:rPr kumimoji="0" lang="es-CO" sz="2000" b="0" i="0" u="none" strike="noStrike" kern="1200" cap="none" spc="0" normalizeH="0" baseline="0" noProof="0" dirty="0">
-                <a:ln>
-                  <a:noFill/>
-                </a:ln>
-                <a:solidFill>
-                  <a:schemeClr val="tx2">
-                    <a:lumMod val="50000"/>
-                  </a:schemeClr>
-                </a:solidFill>
-                <a:effectLst/>
-                <a:uLnTx/>
-                <a:uFillTx/>
-                <a:latin typeface="Calibri" panose="020F0502020204030204"/>
-                <a:ea typeface="+mn-ea"/>
-                <a:cs typeface="+mn-cs"/>
-              </a:rPr>
-              <a:t>ha presentado enfermedades por causa del estrés y cansancio.</a:t>
-            </a:r>
+            <a:endParaRPr kumimoji="0" lang="es-CO" sz="2000" b="0" i="0" u="none" strike="noStrike" kern="1200" cap="none" spc="0" normalizeH="0" baseline="0" noProof="0" dirty="0">
+              <a:ln>
+                <a:noFill/>
+              </a:ln>
+              <a:solidFill>
+                <a:schemeClr val="tx2">
+                  <a:lumMod val="50000"/>
+                </a:schemeClr>
+              </a:solidFill>
+              <a:effectLst/>
+              <a:uLnTx/>
+              <a:uFillTx/>
+              <a:latin typeface="Calibri" panose="020F0502020204030204"/>
+              <a:ea typeface="+mn-ea"/>
+              <a:cs typeface="+mn-cs"/>
+            </a:endParaRPr>
           </a:p>
         </p:txBody>
       </p:sp>
     </p:spTree>
     <p:extLst>
       <p:ext uri="{BB962C8B-B14F-4D97-AF65-F5344CB8AC3E}">
-        <p14:creationId xmlns:p14="http://schemas.microsoft.com/office/powerpoint/2010/main" val="1114994470"/>
+        <p14:creationId xmlns:p14="http://schemas.microsoft.com/office/powerpoint/2010/main" val="2206785876"/>
       </p:ext>
     </p:extLst>
   </p:cSld>
   <p:clrMapOvr>
     <a:masterClrMapping/>
   </p:clrMapOvr>
+  <p:timing>
+    <p:tnLst>
+      <p:par>
+        <p:cTn id="1" dur="indefinite" restart="never" nodeType="tmRoot"/>
+      </p:par>
+    </p:tnLst>
+  </p:timing>
 </p:sld>
 </file>
 
@@ -9084,7 +11056,7 @@
           <p:cNvPr id="2" name="Shape 76">
             <a:extLst>
               <a:ext uri="{FF2B5EF4-FFF2-40B4-BE49-F238E27FC236}">
-                <a16:creationId xmlns:a16="http://schemas.microsoft.com/office/drawing/2014/main" id="{4D0BC5B2-D3FF-4136-BCED-C693C0AFA6AC}"/>
+                <a16:creationId xmlns="" xmlns:a16="http://schemas.microsoft.com/office/drawing/2014/main" id="{53C233B4-85B1-4BA1-A512-E0FD3FF78830}"/>
               </a:ext>
             </a:extLst>
           </p:cNvPr>
@@ -9097,7 +11069,7 @@
         </p:nvSpPr>
         <p:spPr>
           <a:xfrm>
-            <a:off x="0" y="1042600"/>
+            <a:off x="0" y="0"/>
             <a:ext cx="9144000" cy="572700"/>
           </a:xfrm>
           <a:prstGeom prst="rect">
@@ -9122,7 +11094,7 @@
                   <a:srgbClr val="D65213"/>
                 </a:solidFill>
               </a:rPr>
-              <a:t>Quién lo sufre</a:t>
+              <a:t>Descripción</a:t>
             </a:r>
             <a:endParaRPr lang="es" dirty="0">
               <a:solidFill>
@@ -9137,7 +11109,7 @@
           <p:cNvPr id="3" name="Shape 77">
             <a:extLst>
               <a:ext uri="{FF2B5EF4-FFF2-40B4-BE49-F238E27FC236}">
-                <a16:creationId xmlns:a16="http://schemas.microsoft.com/office/drawing/2014/main" id="{60CD1C9F-92BA-495D-B553-D273A598DA00}"/>
+                <a16:creationId xmlns="" xmlns:a16="http://schemas.microsoft.com/office/drawing/2014/main" id="{08A6C367-C85B-4C21-800C-3BB63CD57AA4}"/>
               </a:ext>
             </a:extLst>
           </p:cNvPr>
@@ -9169,7 +11141,7 @@
           <p:cNvPr id="4" name="Marcador de contenido 2">
             <a:extLst>
               <a:ext uri="{FF2B5EF4-FFF2-40B4-BE49-F238E27FC236}">
-                <a16:creationId xmlns:a16="http://schemas.microsoft.com/office/drawing/2014/main" id="{62DA86C1-0F4B-42F5-93E0-CCE56A485388}"/>
+                <a16:creationId xmlns="" xmlns:a16="http://schemas.microsoft.com/office/drawing/2014/main" id="{C825BB67-98F6-4EED-8DAB-7A6E7335C2A9}"/>
               </a:ext>
             </a:extLst>
           </p:cNvPr>
@@ -9180,8 +11152,8 @@
         </p:nvSpPr>
         <p:spPr>
           <a:xfrm>
-            <a:off x="1465325" y="1921250"/>
-            <a:ext cx="3615827" cy="2557232"/>
+            <a:off x="1465325" y="972634"/>
+            <a:ext cx="7096783" cy="3412330"/>
           </a:xfrm>
           <a:prstGeom prst="rect">
             <a:avLst/>
@@ -9390,18 +11362,29 @@
                 <a:ea typeface="+mn-ea"/>
                 <a:cs typeface="+mn-cs"/>
               </a:rPr>
-              <a:t>Directamente:</a:t>
+              <a:t>Como hay una mala planeación del proceso de producción, hay una sobrecarga en los operarios cuando llega el pico de ventas, por lo tanto el producto se ve afectado.</a:t>
             </a:r>
           </a:p>
           <a:p>
-            <a:pPr lvl="1">
+            <a:pPr marL="228600" marR="0" lvl="0" indent="-228600" algn="l" defTabSz="914400" rtl="0" eaLnBrk="1" fontAlgn="auto" latinLnBrk="0" hangingPunct="1">
+              <a:lnSpc>
+                <a:spcPct val="90000"/>
+              </a:lnSpc>
               <a:spcBef>
                 <a:spcPts val="1000"/>
               </a:spcBef>
+              <a:spcAft>
+                <a:spcPts val="0"/>
+              </a:spcAft>
+              <a:buClrTx/>
+              <a:buSzTx/>
+              <a:buFont typeface="Arial" panose="020B0604020202020204" pitchFamily="34" charset="0"/>
+              <a:buChar char="•"/>
+              <a:tabLst/>
               <a:defRPr/>
             </a:pPr>
             <a:r>
-              <a:rPr lang="es-CO" sz="1600" dirty="0">
+              <a:rPr lang="es-CO" sz="2000" dirty="0">
                 <a:solidFill>
                   <a:schemeClr val="tx2">
                     <a:lumMod val="50000"/>
@@ -9409,44 +11392,58 @@
                 </a:solidFill>
                 <a:latin typeface="Calibri" panose="020F0502020204030204"/>
               </a:rPr>
-              <a:t>Los empleados: Por su situación económica y de salud.</a:t>
+              <a:t>Se ha visto que los clientes devuelven 3 de cada 5 pares de zapatos por la baja calidad, eso genera que se deban producir pares de zapatos extra para reponer el producto, causando pérdidas económicas.</a:t>
             </a:r>
           </a:p>
           <a:p>
-            <a:pPr lvl="1">
+            <a:pPr marL="228600" marR="0" lvl="0" indent="-228600" algn="l" defTabSz="914400" rtl="0" eaLnBrk="1" fontAlgn="auto" latinLnBrk="0" hangingPunct="1">
+              <a:lnSpc>
+                <a:spcPct val="90000"/>
+              </a:lnSpc>
               <a:spcBef>
                 <a:spcPts val="1000"/>
               </a:spcBef>
+              <a:spcAft>
+                <a:spcPts val="0"/>
+              </a:spcAft>
+              <a:buClrTx/>
+              <a:buSzTx/>
+              <a:buFont typeface="Arial" panose="020B0604020202020204" pitchFamily="34" charset="0"/>
+              <a:buChar char="•"/>
+              <a:tabLst/>
               <a:defRPr/>
             </a:pPr>
             <a:r>
-              <a:rPr kumimoji="0" lang="es-CO" sz="1600" b="0" i="0" u="none" strike="noStrike" kern="1200" cap="none" spc="0" normalizeH="0" baseline="0" noProof="0" dirty="0">
-                <a:ln>
-                  <a:noFill/>
-                </a:ln>
+              <a:rPr lang="es-CO" sz="2000" dirty="0">
                 <a:solidFill>
                   <a:schemeClr val="tx2">
                     <a:lumMod val="50000"/>
                   </a:schemeClr>
                 </a:solidFill>
-                <a:effectLst/>
-                <a:uLnTx/>
-                <a:uFillTx/>
                 <a:latin typeface="Calibri" panose="020F0502020204030204"/>
-                <a:ea typeface="+mn-ea"/>
-                <a:cs typeface="+mn-cs"/>
               </a:rPr>
-              <a:t>La gerencia: Porque no generan los ingresos suficientes.</a:t>
+              <a:t>La sobrecarga de trabajo genera horarios de trabajo más largos, afectando el estado de salud de los trabajadores y la calidad del producto.</a:t>
             </a:r>
           </a:p>
           <a:p>
-            <a:pPr lvl="1">
+            <a:pPr marL="228600" marR="0" lvl="0" indent="-228600" algn="l" defTabSz="914400" rtl="0" eaLnBrk="1" fontAlgn="auto" latinLnBrk="0" hangingPunct="1">
+              <a:lnSpc>
+                <a:spcPct val="90000"/>
+              </a:lnSpc>
               <a:spcBef>
                 <a:spcPts val="1000"/>
               </a:spcBef>
+              <a:spcAft>
+                <a:spcPts val="0"/>
+              </a:spcAft>
+              <a:buClrTx/>
+              <a:buSzTx/>
+              <a:buFont typeface="Arial" panose="020B0604020202020204" pitchFamily="34" charset="0"/>
+              <a:buChar char="•"/>
+              <a:tabLst/>
               <a:defRPr/>
             </a:pPr>
-            <a:endParaRPr kumimoji="0" lang="es-CO" sz="1600" b="0" i="0" u="none" strike="noStrike" kern="1200" cap="none" spc="0" normalizeH="0" baseline="0" noProof="0" dirty="0">
+            <a:endParaRPr kumimoji="0" lang="es-CO" sz="2000" b="0" i="0" u="none" strike="noStrike" kern="1200" cap="none" spc="0" normalizeH="0" baseline="0" noProof="0" dirty="0">
               <a:ln>
                 <a:noFill/>
               </a:ln>
@@ -9465,285 +11462,23 @@
           </a:p>
         </p:txBody>
       </p:sp>
-      <p:sp>
-        <p:nvSpPr>
-          <p:cNvPr id="5" name="Marcador de contenido 2">
-            <a:extLst>
-              <a:ext uri="{FF2B5EF4-FFF2-40B4-BE49-F238E27FC236}">
-                <a16:creationId xmlns:a16="http://schemas.microsoft.com/office/drawing/2014/main" id="{8B7A350A-B96B-4D11-BD6A-2621F5472FD9}"/>
-              </a:ext>
-            </a:extLst>
-          </p:cNvPr>
-          <p:cNvSpPr txBox="1">
-            <a:spLocks/>
-          </p:cNvSpPr>
-          <p:nvPr/>
-        </p:nvSpPr>
-        <p:spPr>
-          <a:xfrm>
-            <a:off x="4922034" y="1921250"/>
-            <a:ext cx="3847887" cy="2557232"/>
-          </a:xfrm>
-          <a:prstGeom prst="rect">
-            <a:avLst/>
-          </a:prstGeom>
-        </p:spPr>
-        <p:txBody>
-          <a:bodyPr vert="horz" lIns="91440" tIns="45720" rIns="91440" bIns="45720" rtlCol="0">
-            <a:normAutofit/>
-          </a:bodyPr>
-          <a:lstStyle>
-            <a:lvl1pPr marL="228600" indent="-228600" algn="l" defTabSz="914400" rtl="0" eaLnBrk="1" latinLnBrk="0" hangingPunct="1">
-              <a:lnSpc>
-                <a:spcPct val="90000"/>
-              </a:lnSpc>
-              <a:spcBef>
-                <a:spcPts val="1000"/>
-              </a:spcBef>
-              <a:buFont typeface="Arial" panose="020B0604020202020204" pitchFamily="34" charset="0"/>
-              <a:buChar char="•"/>
-              <a:defRPr sz="2800" kern="1200">
-                <a:solidFill>
-                  <a:schemeClr val="tx1"/>
-                </a:solidFill>
-                <a:latin typeface="+mn-lt"/>
-                <a:ea typeface="+mn-ea"/>
-                <a:cs typeface="+mn-cs"/>
-              </a:defRPr>
-            </a:lvl1pPr>
-            <a:lvl2pPr marL="685800" indent="-228600" algn="l" defTabSz="914400" rtl="0" eaLnBrk="1" latinLnBrk="0" hangingPunct="1">
-              <a:lnSpc>
-                <a:spcPct val="90000"/>
-              </a:lnSpc>
-              <a:spcBef>
-                <a:spcPts val="500"/>
-              </a:spcBef>
-              <a:buFont typeface="Arial" panose="020B0604020202020204" pitchFamily="34" charset="0"/>
-              <a:buChar char="•"/>
-              <a:defRPr sz="2400" kern="1200">
-                <a:solidFill>
-                  <a:schemeClr val="tx1"/>
-                </a:solidFill>
-                <a:latin typeface="+mn-lt"/>
-                <a:ea typeface="+mn-ea"/>
-                <a:cs typeface="+mn-cs"/>
-              </a:defRPr>
-            </a:lvl2pPr>
-            <a:lvl3pPr marL="1143000" indent="-228600" algn="l" defTabSz="914400" rtl="0" eaLnBrk="1" latinLnBrk="0" hangingPunct="1">
-              <a:lnSpc>
-                <a:spcPct val="90000"/>
-              </a:lnSpc>
-              <a:spcBef>
-                <a:spcPts val="500"/>
-              </a:spcBef>
-              <a:buFont typeface="Arial" panose="020B0604020202020204" pitchFamily="34" charset="0"/>
-              <a:buChar char="•"/>
-              <a:defRPr sz="2000" kern="1200">
-                <a:solidFill>
-                  <a:schemeClr val="tx1"/>
-                </a:solidFill>
-                <a:latin typeface="+mn-lt"/>
-                <a:ea typeface="+mn-ea"/>
-                <a:cs typeface="+mn-cs"/>
-              </a:defRPr>
-            </a:lvl3pPr>
-            <a:lvl4pPr marL="1600200" indent="-228600" algn="l" defTabSz="914400" rtl="0" eaLnBrk="1" latinLnBrk="0" hangingPunct="1">
-              <a:lnSpc>
-                <a:spcPct val="90000"/>
-              </a:lnSpc>
-              <a:spcBef>
-                <a:spcPts val="500"/>
-              </a:spcBef>
-              <a:buFont typeface="Arial" panose="020B0604020202020204" pitchFamily="34" charset="0"/>
-              <a:buChar char="•"/>
-              <a:defRPr sz="1800" kern="1200">
-                <a:solidFill>
-                  <a:schemeClr val="tx1"/>
-                </a:solidFill>
-                <a:latin typeface="+mn-lt"/>
-                <a:ea typeface="+mn-ea"/>
-                <a:cs typeface="+mn-cs"/>
-              </a:defRPr>
-            </a:lvl4pPr>
-            <a:lvl5pPr marL="2057400" indent="-228600" algn="l" defTabSz="914400" rtl="0" eaLnBrk="1" latinLnBrk="0" hangingPunct="1">
-              <a:lnSpc>
-                <a:spcPct val="90000"/>
-              </a:lnSpc>
-              <a:spcBef>
-                <a:spcPts val="500"/>
-              </a:spcBef>
-              <a:buFont typeface="Arial" panose="020B0604020202020204" pitchFamily="34" charset="0"/>
-              <a:buChar char="•"/>
-              <a:defRPr sz="1800" kern="1200">
-                <a:solidFill>
-                  <a:schemeClr val="tx1"/>
-                </a:solidFill>
-                <a:latin typeface="+mn-lt"/>
-                <a:ea typeface="+mn-ea"/>
-                <a:cs typeface="+mn-cs"/>
-              </a:defRPr>
-            </a:lvl5pPr>
-            <a:lvl6pPr marL="2514600" indent="-228600" algn="l" defTabSz="914400" rtl="0" eaLnBrk="1" latinLnBrk="0" hangingPunct="1">
-              <a:lnSpc>
-                <a:spcPct val="90000"/>
-              </a:lnSpc>
-              <a:spcBef>
-                <a:spcPts val="500"/>
-              </a:spcBef>
-              <a:buFont typeface="Arial" panose="020B0604020202020204" pitchFamily="34" charset="0"/>
-              <a:buChar char="•"/>
-              <a:defRPr sz="1800" kern="1200">
-                <a:solidFill>
-                  <a:schemeClr val="tx1"/>
-                </a:solidFill>
-                <a:latin typeface="+mn-lt"/>
-                <a:ea typeface="+mn-ea"/>
-                <a:cs typeface="+mn-cs"/>
-              </a:defRPr>
-            </a:lvl6pPr>
-            <a:lvl7pPr marL="2971800" indent="-228600" algn="l" defTabSz="914400" rtl="0" eaLnBrk="1" latinLnBrk="0" hangingPunct="1">
-              <a:lnSpc>
-                <a:spcPct val="90000"/>
-              </a:lnSpc>
-              <a:spcBef>
-                <a:spcPts val="500"/>
-              </a:spcBef>
-              <a:buFont typeface="Arial" panose="020B0604020202020204" pitchFamily="34" charset="0"/>
-              <a:buChar char="•"/>
-              <a:defRPr sz="1800" kern="1200">
-                <a:solidFill>
-                  <a:schemeClr val="tx1"/>
-                </a:solidFill>
-                <a:latin typeface="+mn-lt"/>
-                <a:ea typeface="+mn-ea"/>
-                <a:cs typeface="+mn-cs"/>
-              </a:defRPr>
-            </a:lvl7pPr>
-            <a:lvl8pPr marL="3429000" indent="-228600" algn="l" defTabSz="914400" rtl="0" eaLnBrk="1" latinLnBrk="0" hangingPunct="1">
-              <a:lnSpc>
-                <a:spcPct val="90000"/>
-              </a:lnSpc>
-              <a:spcBef>
-                <a:spcPts val="500"/>
-              </a:spcBef>
-              <a:buFont typeface="Arial" panose="020B0604020202020204" pitchFamily="34" charset="0"/>
-              <a:buChar char="•"/>
-              <a:defRPr sz="1800" kern="1200">
-                <a:solidFill>
-                  <a:schemeClr val="tx1"/>
-                </a:solidFill>
-                <a:latin typeface="+mn-lt"/>
-                <a:ea typeface="+mn-ea"/>
-                <a:cs typeface="+mn-cs"/>
-              </a:defRPr>
-            </a:lvl8pPr>
-            <a:lvl9pPr marL="3886200" indent="-228600" algn="l" defTabSz="914400" rtl="0" eaLnBrk="1" latinLnBrk="0" hangingPunct="1">
-              <a:lnSpc>
-                <a:spcPct val="90000"/>
-              </a:lnSpc>
-              <a:spcBef>
-                <a:spcPts val="500"/>
-              </a:spcBef>
-              <a:buFont typeface="Arial" panose="020B0604020202020204" pitchFamily="34" charset="0"/>
-              <a:buChar char="•"/>
-              <a:defRPr sz="1800" kern="1200">
-                <a:solidFill>
-                  <a:schemeClr val="tx1"/>
-                </a:solidFill>
-                <a:latin typeface="+mn-lt"/>
-                <a:ea typeface="+mn-ea"/>
-                <a:cs typeface="+mn-cs"/>
-              </a:defRPr>
-            </a:lvl9pPr>
-          </a:lstStyle>
-          <a:p>
-            <a:pPr marL="228600" marR="0" lvl="0" indent="-228600" algn="l" defTabSz="914400" rtl="0" eaLnBrk="1" fontAlgn="auto" latinLnBrk="0" hangingPunct="1">
-              <a:lnSpc>
-                <a:spcPct val="90000"/>
-              </a:lnSpc>
-              <a:spcBef>
-                <a:spcPts val="1000"/>
-              </a:spcBef>
-              <a:spcAft>
-                <a:spcPts val="0"/>
-              </a:spcAft>
-              <a:buClrTx/>
-              <a:buSzTx/>
-              <a:buFont typeface="Arial" panose="020B0604020202020204" pitchFamily="34" charset="0"/>
-              <a:buChar char="•"/>
-              <a:tabLst/>
-              <a:defRPr/>
-            </a:pPr>
-            <a:r>
-              <a:rPr kumimoji="0" lang="es-CO" sz="2000" b="0" i="0" u="none" strike="noStrike" kern="1200" cap="none" spc="0" normalizeH="0" baseline="0" noProof="0" dirty="0">
-                <a:ln>
-                  <a:noFill/>
-                </a:ln>
-                <a:solidFill>
-                  <a:schemeClr val="tx2">
-                    <a:lumMod val="50000"/>
-                  </a:schemeClr>
-                </a:solidFill>
-                <a:effectLst/>
-                <a:uLnTx/>
-                <a:uFillTx/>
-                <a:latin typeface="Calibri" panose="020F0502020204030204"/>
-                <a:ea typeface="+mn-ea"/>
-                <a:cs typeface="+mn-cs"/>
-              </a:rPr>
-              <a:t>Indirectamente:</a:t>
-            </a:r>
-          </a:p>
-          <a:p>
-            <a:pPr lvl="1">
-              <a:spcBef>
-                <a:spcPts val="1000"/>
-              </a:spcBef>
-              <a:defRPr/>
-            </a:pPr>
-            <a:r>
-              <a:rPr lang="es-CO" sz="1600" dirty="0">
-                <a:solidFill>
-                  <a:schemeClr val="tx2">
-                    <a:lumMod val="50000"/>
-                  </a:schemeClr>
-                </a:solidFill>
-                <a:latin typeface="Calibri" panose="020F0502020204030204"/>
-              </a:rPr>
-              <a:t>Los clientes: Por la calidad de sus productos.</a:t>
-            </a:r>
-          </a:p>
-          <a:p>
-            <a:pPr lvl="1">
-              <a:spcBef>
-                <a:spcPts val="1000"/>
-              </a:spcBef>
-              <a:defRPr/>
-            </a:pPr>
-            <a:r>
-              <a:rPr lang="es-CO" sz="1600" dirty="0">
-                <a:solidFill>
-                  <a:schemeClr val="tx2">
-                    <a:lumMod val="50000"/>
-                  </a:schemeClr>
-                </a:solidFill>
-                <a:latin typeface="Calibri" panose="020F0502020204030204"/>
-              </a:rPr>
-              <a:t>Las familias de los empleados: Por ver poco a sus familiares y no contar con dinero suficiente.</a:t>
-            </a:r>
-          </a:p>
-        </p:txBody>
-      </p:sp>
     </p:spTree>
     <p:extLst>
       <p:ext uri="{BB962C8B-B14F-4D97-AF65-F5344CB8AC3E}">
-        <p14:creationId xmlns:p14="http://schemas.microsoft.com/office/powerpoint/2010/main" val="2379376993"/>
+        <p14:creationId xmlns:p14="http://schemas.microsoft.com/office/powerpoint/2010/main" val="3356504998"/>
       </p:ext>
     </p:extLst>
   </p:cSld>
   <p:clrMapOvr>
     <a:masterClrMapping/>
   </p:clrMapOvr>
+  <p:timing>
+    <p:tnLst>
+      <p:par>
+        <p:cTn id="1" dur="indefinite" restart="never" nodeType="tmRoot"/>
+      </p:par>
+    </p:tnLst>
+  </p:timing>
 </p:sld>
 </file>
 
@@ -9779,10 +11514,10 @@
       </p:grpSpPr>
       <p:sp>
         <p:nvSpPr>
-          <p:cNvPr id="2" name="Shape 76">
+          <p:cNvPr id="8" name="Shape 76">
             <a:extLst>
               <a:ext uri="{FF2B5EF4-FFF2-40B4-BE49-F238E27FC236}">
-                <a16:creationId xmlns:a16="http://schemas.microsoft.com/office/drawing/2014/main" id="{5127D90A-2316-4D99-B1C3-3B89C94DA5FF}"/>
+                <a16:creationId xmlns="" xmlns:a16="http://schemas.microsoft.com/office/drawing/2014/main" id="{CF40DF45-FB5D-4440-92AC-93BE8C82B997}"/>
               </a:ext>
             </a:extLst>
           </p:cNvPr>
@@ -9820,7 +11555,7 @@
                   <a:srgbClr val="D65213"/>
                 </a:solidFill>
               </a:rPr>
-              <a:t>Causas</a:t>
+              <a:t>Cuantificación</a:t>
             </a:r>
             <a:endParaRPr lang="es" dirty="0">
               <a:solidFill>
@@ -9832,10 +11567,10 @@
       </p:sp>
       <p:cxnSp>
         <p:nvCxnSpPr>
-          <p:cNvPr id="3" name="Shape 77">
+          <p:cNvPr id="11" name="Shape 77">
             <a:extLst>
               <a:ext uri="{FF2B5EF4-FFF2-40B4-BE49-F238E27FC236}">
-                <a16:creationId xmlns:a16="http://schemas.microsoft.com/office/drawing/2014/main" id="{301F4023-D500-4009-B8B1-9518F79B9B72}"/>
+                <a16:creationId xmlns="" xmlns:a16="http://schemas.microsoft.com/office/drawing/2014/main" id="{03DCC001-B4A5-444C-804B-FB0C6BA1FEB0}"/>
               </a:ext>
             </a:extLst>
           </p:cNvPr>
@@ -9864,10 +11599,10 @@
       </p:cxnSp>
       <p:sp>
         <p:nvSpPr>
-          <p:cNvPr id="4" name="Marcador de contenido 2">
+          <p:cNvPr id="12" name="Marcador de contenido 2">
             <a:extLst>
               <a:ext uri="{FF2B5EF4-FFF2-40B4-BE49-F238E27FC236}">
-                <a16:creationId xmlns:a16="http://schemas.microsoft.com/office/drawing/2014/main" id="{9DEA87FC-FE36-4A0C-870B-61A75C799DED}"/>
+                <a16:creationId xmlns="" xmlns:a16="http://schemas.microsoft.com/office/drawing/2014/main" id="{9DEC5C61-270A-4264-B408-4C7D43594634}"/>
               </a:ext>
             </a:extLst>
           </p:cNvPr>
@@ -9878,8 +11613,8 @@
         </p:nvSpPr>
         <p:spPr>
           <a:xfrm>
-            <a:off x="1465325" y="1921250"/>
-            <a:ext cx="7096783" cy="2557232"/>
+            <a:off x="1465325" y="1613634"/>
+            <a:ext cx="7169517" cy="3072666"/>
           </a:xfrm>
           <a:prstGeom prst="rect">
             <a:avLst/>
@@ -9887,7 +11622,7 @@
         </p:spPr>
         <p:txBody>
           <a:bodyPr vert="horz" lIns="91440" tIns="45720" rIns="91440" bIns="45720" rtlCol="0">
-            <a:normAutofit/>
+            <a:normAutofit fontScale="92500" lnSpcReduction="10000"/>
           </a:bodyPr>
           <a:lstStyle>
             <a:lvl1pPr marL="228600" indent="-228600" algn="l" defTabSz="914400" rtl="0" eaLnBrk="1" latinLnBrk="0" hangingPunct="1">
@@ -10053,22 +11788,6 @@
               </a:defRPr>
             </a:lvl9pPr>
           </a:lstStyle>
-          <a:p>
-            <a:pPr>
-              <a:defRPr/>
-            </a:pPr>
-            <a:r>
-              <a:rPr lang="es-CO" sz="2000" u="sng" dirty="0">
-                <a:solidFill>
-                  <a:schemeClr val="tx2">
-                    <a:lumMod val="50000"/>
-                  </a:schemeClr>
-                </a:solidFill>
-                <a:latin typeface="Calibri" panose="020F0502020204030204"/>
-              </a:rPr>
-              <a:t>MALA PLANEACIÓN DE LA PRODUCCIÓN</a:t>
-            </a:r>
-          </a:p>
           <a:p>
             <a:pPr marL="228600" marR="0" lvl="0" indent="-228600" algn="l" defTabSz="914400" rtl="0" eaLnBrk="1" fontAlgn="auto" latinLnBrk="0" hangingPunct="1">
               <a:lnSpc>
@@ -10104,7 +11823,18 @@
                 <a:ea typeface="+mn-ea"/>
                 <a:cs typeface="+mn-cs"/>
               </a:rPr>
-              <a:t>Falta de personal.</a:t>
+              <a:t>La fábrica debe producir entre 10.000 y 15.000 zapatos semanales </a:t>
+            </a:r>
+            <a:r>
+              <a:rPr lang="es-CO" sz="2000" dirty="0">
+                <a:solidFill>
+                  <a:schemeClr val="tx2">
+                    <a:lumMod val="50000"/>
+                  </a:schemeClr>
+                </a:solidFill>
+                <a:latin typeface="Calibri" panose="020F0502020204030204"/>
+              </a:rPr>
+              <a:t>en el periodo de mayor demanda de cada mes.</a:t>
             </a:r>
           </a:p>
           <a:p>
@@ -10126,15 +11856,23 @@
               <a:defRPr/>
             </a:pPr>
             <a:r>
-              <a:rPr lang="es-CO" sz="2000" dirty="0">
+              <a:rPr kumimoji="0" lang="es-CO" sz="2000" b="0" i="0" u="none" strike="noStrike" kern="1200" cap="none" spc="0" normalizeH="0" baseline="0" noProof="0" dirty="0">
+                <a:ln>
+                  <a:noFill/>
+                </a:ln>
                 <a:solidFill>
                   <a:schemeClr val="tx2">
                     <a:lumMod val="50000"/>
                   </a:schemeClr>
                 </a:solidFill>
+                <a:effectLst/>
+                <a:uLnTx/>
+                <a:uFillTx/>
                 <a:latin typeface="Calibri" panose="020F0502020204030204"/>
+                <a:ea typeface="+mn-ea"/>
+                <a:cs typeface="+mn-cs"/>
               </a:rPr>
-              <a:t>Horarios muy largos.</a:t>
+              <a:t>El 60% de los zapatos fabricados está siendo devuelto por baja calidad.</a:t>
             </a:r>
           </a:p>
           <a:p>
@@ -10156,15 +11894,23 @@
               <a:defRPr/>
             </a:pPr>
             <a:r>
-              <a:rPr lang="es-CO" sz="2000" dirty="0">
+              <a:rPr kumimoji="0" lang="es-CO" sz="2000" b="0" i="0" u="none" strike="noStrike" kern="1200" cap="none" spc="0" normalizeH="0" baseline="0" noProof="0" dirty="0">
+                <a:ln>
+                  <a:noFill/>
+                </a:ln>
                 <a:solidFill>
                   <a:schemeClr val="tx2">
                     <a:lumMod val="50000"/>
                   </a:schemeClr>
                 </a:solidFill>
+                <a:effectLst/>
+                <a:uLnTx/>
+                <a:uFillTx/>
                 <a:latin typeface="Calibri" panose="020F0502020204030204"/>
+                <a:ea typeface="+mn-ea"/>
+                <a:cs typeface="+mn-cs"/>
               </a:rPr>
-              <a:t>Capacitación del personal.</a:t>
+              <a:t>El 20% de los zapatos fabricados no está saliendo a la venta por no cumplir los estándares mínimos de calidad.</a:t>
             </a:r>
           </a:p>
           <a:p>
@@ -10185,35 +11931,113 @@
               <a:tabLst/>
               <a:defRPr/>
             </a:pPr>
-            <a:endParaRPr kumimoji="0" lang="es-CO" sz="2000" b="0" i="0" u="none" strike="noStrike" kern="1200" cap="none" spc="0" normalizeH="0" baseline="0" noProof="0" dirty="0">
-              <a:ln>
-                <a:noFill/>
-              </a:ln>
-              <a:solidFill>
-                <a:schemeClr val="tx2">
-                  <a:lumMod val="50000"/>
-                </a:schemeClr>
-              </a:solidFill>
-              <a:effectLst/>
-              <a:uLnTx/>
-              <a:uFillTx/>
-              <a:latin typeface="Calibri" panose="020F0502020204030204"/>
-              <a:ea typeface="+mn-ea"/>
-              <a:cs typeface="+mn-cs"/>
-            </a:endParaRPr>
+            <a:r>
+              <a:rPr kumimoji="0" lang="es-CO" sz="2000" b="0" i="0" u="none" strike="noStrike" kern="1200" cap="none" spc="0" normalizeH="0" baseline="0" noProof="0" dirty="0">
+                <a:ln>
+                  <a:noFill/>
+                </a:ln>
+                <a:solidFill>
+                  <a:schemeClr val="tx2">
+                    <a:lumMod val="50000"/>
+                  </a:schemeClr>
+                </a:solidFill>
+                <a:effectLst/>
+                <a:uLnTx/>
+                <a:uFillTx/>
+                <a:latin typeface="Calibri" panose="020F0502020204030204"/>
+                <a:ea typeface="+mn-ea"/>
+                <a:cs typeface="+mn-cs"/>
+              </a:rPr>
+              <a:t>La empresa ha tenido que hacer recortes de personal porque el producido mensual no ha suplido el salario.</a:t>
+            </a:r>
+          </a:p>
+          <a:p>
+            <a:pPr marL="228600" marR="0" lvl="0" indent="-228600" algn="l" defTabSz="914400" rtl="0" eaLnBrk="1" fontAlgn="auto" latinLnBrk="0" hangingPunct="1">
+              <a:lnSpc>
+                <a:spcPct val="90000"/>
+              </a:lnSpc>
+              <a:spcBef>
+                <a:spcPts val="1000"/>
+              </a:spcBef>
+              <a:spcAft>
+                <a:spcPts val="0"/>
+              </a:spcAft>
+              <a:buClrTx/>
+              <a:buSzTx/>
+              <a:buFont typeface="Arial" panose="020B0604020202020204" pitchFamily="34" charset="0"/>
+              <a:buChar char="•"/>
+              <a:tabLst/>
+              <a:defRPr/>
+            </a:pPr>
+            <a:r>
+              <a:rPr kumimoji="0" lang="es-CO" sz="2000" b="0" i="0" u="none" strike="noStrike" kern="1200" cap="none" spc="0" normalizeH="0" baseline="0" noProof="0" dirty="0">
+                <a:ln>
+                  <a:noFill/>
+                </a:ln>
+                <a:solidFill>
+                  <a:schemeClr val="tx2">
+                    <a:lumMod val="50000"/>
+                  </a:schemeClr>
+                </a:solidFill>
+                <a:effectLst/>
+                <a:uLnTx/>
+                <a:uFillTx/>
+                <a:latin typeface="Calibri" panose="020F0502020204030204"/>
+                <a:ea typeface="+mn-ea"/>
+                <a:cs typeface="+mn-cs"/>
+              </a:rPr>
+              <a:t>El </a:t>
+            </a:r>
+            <a:r>
+              <a:rPr lang="es-CO" sz="2000" dirty="0">
+                <a:solidFill>
+                  <a:schemeClr val="tx2">
+                    <a:lumMod val="50000"/>
+                  </a:schemeClr>
+                </a:solidFill>
+                <a:latin typeface="Calibri" panose="020F0502020204030204"/>
+              </a:rPr>
+              <a:t>35% del personal operario </a:t>
+            </a:r>
+            <a:r>
+              <a:rPr kumimoji="0" lang="es-CO" sz="2000" b="0" i="0" u="none" strike="noStrike" kern="1200" cap="none" spc="0" normalizeH="0" baseline="0" noProof="0" dirty="0">
+                <a:ln>
+                  <a:noFill/>
+                </a:ln>
+                <a:solidFill>
+                  <a:schemeClr val="tx2">
+                    <a:lumMod val="50000"/>
+                  </a:schemeClr>
+                </a:solidFill>
+                <a:effectLst/>
+                <a:uLnTx/>
+                <a:uFillTx/>
+                <a:latin typeface="Calibri" panose="020F0502020204030204"/>
+                <a:ea typeface="+mn-ea"/>
+                <a:cs typeface="+mn-cs"/>
+              </a:rPr>
+              <a:t>ha presentado enfermedades por causa del estrés y cansancio.</a:t>
+            </a:r>
           </a:p>
         </p:txBody>
       </p:sp>
     </p:spTree>
     <p:extLst>
       <p:ext uri="{BB962C8B-B14F-4D97-AF65-F5344CB8AC3E}">
-        <p14:creationId xmlns:p14="http://schemas.microsoft.com/office/powerpoint/2010/main" val="2206785876"/>
+        <p14:creationId xmlns:p14="http://schemas.microsoft.com/office/powerpoint/2010/main" val="1114994470"/>
       </p:ext>
     </p:extLst>
   </p:cSld>
   <p:clrMapOvr>
     <a:masterClrMapping/>
   </p:clrMapOvr>
+  <p:timing>
+    <p:tnLst>
+      <p:par>
+        <p:cTn id="1" dur="indefinite" restart="never" nodeType="tmRoot"/>
+      </p:par>
+    </p:tnLst>
+  </p:timing>
 </p:sld>
 </file>
 
@@ -10252,7 +12076,7 @@
           <p:cNvPr id="2" name="Shape 76">
             <a:extLst>
               <a:ext uri="{FF2B5EF4-FFF2-40B4-BE49-F238E27FC236}">
-                <a16:creationId xmlns:a16="http://schemas.microsoft.com/office/drawing/2014/main" id="{53C233B4-85B1-4BA1-A512-E0FD3FF78830}"/>
+                <a16:creationId xmlns="" xmlns:a16="http://schemas.microsoft.com/office/drawing/2014/main" id="{4D0BC5B2-D3FF-4136-BCED-C693C0AFA6AC}"/>
               </a:ext>
             </a:extLst>
           </p:cNvPr>
@@ -10265,7 +12089,7 @@
         </p:nvSpPr>
         <p:spPr>
           <a:xfrm>
-            <a:off x="0" y="0"/>
+            <a:off x="0" y="1042600"/>
             <a:ext cx="9144000" cy="572700"/>
           </a:xfrm>
           <a:prstGeom prst="rect">
@@ -10290,7 +12114,7 @@
                   <a:srgbClr val="D65213"/>
                 </a:solidFill>
               </a:rPr>
-              <a:t>Descripción</a:t>
+              <a:t>Quién lo sufre</a:t>
             </a:r>
             <a:endParaRPr lang="es" dirty="0">
               <a:solidFill>
@@ -10305,7 +12129,7 @@
           <p:cNvPr id="3" name="Shape 77">
             <a:extLst>
               <a:ext uri="{FF2B5EF4-FFF2-40B4-BE49-F238E27FC236}">
-                <a16:creationId xmlns:a16="http://schemas.microsoft.com/office/drawing/2014/main" id="{08A6C367-C85B-4C21-800C-3BB63CD57AA4}"/>
+                <a16:creationId xmlns="" xmlns:a16="http://schemas.microsoft.com/office/drawing/2014/main" id="{60CD1C9F-92BA-495D-B553-D273A598DA00}"/>
               </a:ext>
             </a:extLst>
           </p:cNvPr>
@@ -10337,7 +12161,7 @@
           <p:cNvPr id="4" name="Marcador de contenido 2">
             <a:extLst>
               <a:ext uri="{FF2B5EF4-FFF2-40B4-BE49-F238E27FC236}">
-                <a16:creationId xmlns:a16="http://schemas.microsoft.com/office/drawing/2014/main" id="{C825BB67-98F6-4EED-8DAB-7A6E7335C2A9}"/>
+                <a16:creationId xmlns="" xmlns:a16="http://schemas.microsoft.com/office/drawing/2014/main" id="{62DA86C1-0F4B-42F5-93E0-CCE56A485388}"/>
               </a:ext>
             </a:extLst>
           </p:cNvPr>
@@ -10348,8 +12172,8 @@
         </p:nvSpPr>
         <p:spPr>
           <a:xfrm>
-            <a:off x="1465325" y="972634"/>
-            <a:ext cx="7096783" cy="3412330"/>
+            <a:off x="1465325" y="1921250"/>
+            <a:ext cx="3615827" cy="2557232"/>
           </a:xfrm>
           <a:prstGeom prst="rect">
             <a:avLst/>
@@ -10558,29 +12382,18 @@
                 <a:ea typeface="+mn-ea"/>
                 <a:cs typeface="+mn-cs"/>
               </a:rPr>
-              <a:t>Como hay una mala planeación del proceso de producción, hay una sobrecarga en los operarios cuando llega el pico de ventas, por lo tanto el producto se ve afectado.</a:t>
+              <a:t>Directamente:</a:t>
             </a:r>
           </a:p>
           <a:p>
-            <a:pPr marL="228600" marR="0" lvl="0" indent="-228600" algn="l" defTabSz="914400" rtl="0" eaLnBrk="1" fontAlgn="auto" latinLnBrk="0" hangingPunct="1">
-              <a:lnSpc>
-                <a:spcPct val="90000"/>
-              </a:lnSpc>
+            <a:pPr lvl="1">
               <a:spcBef>
                 <a:spcPts val="1000"/>
               </a:spcBef>
-              <a:spcAft>
-                <a:spcPts val="0"/>
-              </a:spcAft>
-              <a:buClrTx/>
-              <a:buSzTx/>
-              <a:buFont typeface="Arial" panose="020B0604020202020204" pitchFamily="34" charset="0"/>
-              <a:buChar char="•"/>
-              <a:tabLst/>
               <a:defRPr/>
             </a:pPr>
             <a:r>
-              <a:rPr lang="es-CO" sz="2000" dirty="0">
+              <a:rPr lang="es-CO" sz="1600" dirty="0">
                 <a:solidFill>
                   <a:schemeClr val="tx2">
                     <a:lumMod val="50000"/>
@@ -10588,58 +12401,44 @@
                 </a:solidFill>
                 <a:latin typeface="Calibri" panose="020F0502020204030204"/>
               </a:rPr>
-              <a:t>Se ha visto que los clientes devuelven 3 de cada 5 pares de zapatos por la baja calidad, eso genera que se deban producir pares de zapatos extra para reponer el producto, causando pérdidas económicas.</a:t>
+              <a:t>Los empleados: Por su situación económica y de salud.</a:t>
             </a:r>
           </a:p>
           <a:p>
-            <a:pPr marL="228600" marR="0" lvl="0" indent="-228600" algn="l" defTabSz="914400" rtl="0" eaLnBrk="1" fontAlgn="auto" latinLnBrk="0" hangingPunct="1">
-              <a:lnSpc>
-                <a:spcPct val="90000"/>
-              </a:lnSpc>
+            <a:pPr lvl="1">
               <a:spcBef>
                 <a:spcPts val="1000"/>
               </a:spcBef>
-              <a:spcAft>
-                <a:spcPts val="0"/>
-              </a:spcAft>
-              <a:buClrTx/>
-              <a:buSzTx/>
-              <a:buFont typeface="Arial" panose="020B0604020202020204" pitchFamily="34" charset="0"/>
-              <a:buChar char="•"/>
-              <a:tabLst/>
               <a:defRPr/>
             </a:pPr>
             <a:r>
-              <a:rPr lang="es-CO" sz="2000" dirty="0">
+              <a:rPr kumimoji="0" lang="es-CO" sz="1600" b="0" i="0" u="none" strike="noStrike" kern="1200" cap="none" spc="0" normalizeH="0" baseline="0" noProof="0" dirty="0">
+                <a:ln>
+                  <a:noFill/>
+                </a:ln>
                 <a:solidFill>
                   <a:schemeClr val="tx2">
                     <a:lumMod val="50000"/>
                   </a:schemeClr>
                 </a:solidFill>
+                <a:effectLst/>
+                <a:uLnTx/>
+                <a:uFillTx/>
                 <a:latin typeface="Calibri" panose="020F0502020204030204"/>
+                <a:ea typeface="+mn-ea"/>
+                <a:cs typeface="+mn-cs"/>
               </a:rPr>
-              <a:t>La sobrecarga de trabajo genera horarios de trabajo más largos, afectando el estado de salud de los trabajadores y la calidad del producto.</a:t>
+              <a:t>La gerencia: Porque no generan los ingresos suficientes.</a:t>
             </a:r>
           </a:p>
           <a:p>
-            <a:pPr marL="228600" marR="0" lvl="0" indent="-228600" algn="l" defTabSz="914400" rtl="0" eaLnBrk="1" fontAlgn="auto" latinLnBrk="0" hangingPunct="1">
-              <a:lnSpc>
-                <a:spcPct val="90000"/>
-              </a:lnSpc>
+            <a:pPr lvl="1">
               <a:spcBef>
                 <a:spcPts val="1000"/>
               </a:spcBef>
-              <a:spcAft>
-                <a:spcPts val="0"/>
-              </a:spcAft>
-              <a:buClrTx/>
-              <a:buSzTx/>
-              <a:buFont typeface="Arial" panose="020B0604020202020204" pitchFamily="34" charset="0"/>
-              <a:buChar char="•"/>
-              <a:tabLst/>
               <a:defRPr/>
             </a:pPr>
-            <a:endParaRPr kumimoji="0" lang="es-CO" sz="2000" b="0" i="0" u="none" strike="noStrike" kern="1200" cap="none" spc="0" normalizeH="0" baseline="0" noProof="0" dirty="0">
+            <a:endParaRPr kumimoji="0" lang="es-CO" sz="1600" b="0" i="0" u="none" strike="noStrike" kern="1200" cap="none" spc="0" normalizeH="0" baseline="0" noProof="0" dirty="0">
               <a:ln>
                 <a:noFill/>
               </a:ln>
@@ -10658,16 +12457,292 @@
           </a:p>
         </p:txBody>
       </p:sp>
+      <p:sp>
+        <p:nvSpPr>
+          <p:cNvPr id="5" name="Marcador de contenido 2">
+            <a:extLst>
+              <a:ext uri="{FF2B5EF4-FFF2-40B4-BE49-F238E27FC236}">
+                <a16:creationId xmlns="" xmlns:a16="http://schemas.microsoft.com/office/drawing/2014/main" id="{8B7A350A-B96B-4D11-BD6A-2621F5472FD9}"/>
+              </a:ext>
+            </a:extLst>
+          </p:cNvPr>
+          <p:cNvSpPr txBox="1">
+            <a:spLocks/>
+          </p:cNvSpPr>
+          <p:nvPr/>
+        </p:nvSpPr>
+        <p:spPr>
+          <a:xfrm>
+            <a:off x="4922034" y="1921250"/>
+            <a:ext cx="3847887" cy="2557232"/>
+          </a:xfrm>
+          <a:prstGeom prst="rect">
+            <a:avLst/>
+          </a:prstGeom>
+        </p:spPr>
+        <p:txBody>
+          <a:bodyPr vert="horz" lIns="91440" tIns="45720" rIns="91440" bIns="45720" rtlCol="0">
+            <a:normAutofit/>
+          </a:bodyPr>
+          <a:lstStyle>
+            <a:lvl1pPr marL="228600" indent="-228600" algn="l" defTabSz="914400" rtl="0" eaLnBrk="1" latinLnBrk="0" hangingPunct="1">
+              <a:lnSpc>
+                <a:spcPct val="90000"/>
+              </a:lnSpc>
+              <a:spcBef>
+                <a:spcPts val="1000"/>
+              </a:spcBef>
+              <a:buFont typeface="Arial" panose="020B0604020202020204" pitchFamily="34" charset="0"/>
+              <a:buChar char="•"/>
+              <a:defRPr sz="2800" kern="1200">
+                <a:solidFill>
+                  <a:schemeClr val="tx1"/>
+                </a:solidFill>
+                <a:latin typeface="+mn-lt"/>
+                <a:ea typeface="+mn-ea"/>
+                <a:cs typeface="+mn-cs"/>
+              </a:defRPr>
+            </a:lvl1pPr>
+            <a:lvl2pPr marL="685800" indent="-228600" algn="l" defTabSz="914400" rtl="0" eaLnBrk="1" latinLnBrk="0" hangingPunct="1">
+              <a:lnSpc>
+                <a:spcPct val="90000"/>
+              </a:lnSpc>
+              <a:spcBef>
+                <a:spcPts val="500"/>
+              </a:spcBef>
+              <a:buFont typeface="Arial" panose="020B0604020202020204" pitchFamily="34" charset="0"/>
+              <a:buChar char="•"/>
+              <a:defRPr sz="2400" kern="1200">
+                <a:solidFill>
+                  <a:schemeClr val="tx1"/>
+                </a:solidFill>
+                <a:latin typeface="+mn-lt"/>
+                <a:ea typeface="+mn-ea"/>
+                <a:cs typeface="+mn-cs"/>
+              </a:defRPr>
+            </a:lvl2pPr>
+            <a:lvl3pPr marL="1143000" indent="-228600" algn="l" defTabSz="914400" rtl="0" eaLnBrk="1" latinLnBrk="0" hangingPunct="1">
+              <a:lnSpc>
+                <a:spcPct val="90000"/>
+              </a:lnSpc>
+              <a:spcBef>
+                <a:spcPts val="500"/>
+              </a:spcBef>
+              <a:buFont typeface="Arial" panose="020B0604020202020204" pitchFamily="34" charset="0"/>
+              <a:buChar char="•"/>
+              <a:defRPr sz="2000" kern="1200">
+                <a:solidFill>
+                  <a:schemeClr val="tx1"/>
+                </a:solidFill>
+                <a:latin typeface="+mn-lt"/>
+                <a:ea typeface="+mn-ea"/>
+                <a:cs typeface="+mn-cs"/>
+              </a:defRPr>
+            </a:lvl3pPr>
+            <a:lvl4pPr marL="1600200" indent="-228600" algn="l" defTabSz="914400" rtl="0" eaLnBrk="1" latinLnBrk="0" hangingPunct="1">
+              <a:lnSpc>
+                <a:spcPct val="90000"/>
+              </a:lnSpc>
+              <a:spcBef>
+                <a:spcPts val="500"/>
+              </a:spcBef>
+              <a:buFont typeface="Arial" panose="020B0604020202020204" pitchFamily="34" charset="0"/>
+              <a:buChar char="•"/>
+              <a:defRPr sz="1800" kern="1200">
+                <a:solidFill>
+                  <a:schemeClr val="tx1"/>
+                </a:solidFill>
+                <a:latin typeface="+mn-lt"/>
+                <a:ea typeface="+mn-ea"/>
+                <a:cs typeface="+mn-cs"/>
+              </a:defRPr>
+            </a:lvl4pPr>
+            <a:lvl5pPr marL="2057400" indent="-228600" algn="l" defTabSz="914400" rtl="0" eaLnBrk="1" latinLnBrk="0" hangingPunct="1">
+              <a:lnSpc>
+                <a:spcPct val="90000"/>
+              </a:lnSpc>
+              <a:spcBef>
+                <a:spcPts val="500"/>
+              </a:spcBef>
+              <a:buFont typeface="Arial" panose="020B0604020202020204" pitchFamily="34" charset="0"/>
+              <a:buChar char="•"/>
+              <a:defRPr sz="1800" kern="1200">
+                <a:solidFill>
+                  <a:schemeClr val="tx1"/>
+                </a:solidFill>
+                <a:latin typeface="+mn-lt"/>
+                <a:ea typeface="+mn-ea"/>
+                <a:cs typeface="+mn-cs"/>
+              </a:defRPr>
+            </a:lvl5pPr>
+            <a:lvl6pPr marL="2514600" indent="-228600" algn="l" defTabSz="914400" rtl="0" eaLnBrk="1" latinLnBrk="0" hangingPunct="1">
+              <a:lnSpc>
+                <a:spcPct val="90000"/>
+              </a:lnSpc>
+              <a:spcBef>
+                <a:spcPts val="500"/>
+              </a:spcBef>
+              <a:buFont typeface="Arial" panose="020B0604020202020204" pitchFamily="34" charset="0"/>
+              <a:buChar char="•"/>
+              <a:defRPr sz="1800" kern="1200">
+                <a:solidFill>
+                  <a:schemeClr val="tx1"/>
+                </a:solidFill>
+                <a:latin typeface="+mn-lt"/>
+                <a:ea typeface="+mn-ea"/>
+                <a:cs typeface="+mn-cs"/>
+              </a:defRPr>
+            </a:lvl6pPr>
+            <a:lvl7pPr marL="2971800" indent="-228600" algn="l" defTabSz="914400" rtl="0" eaLnBrk="1" latinLnBrk="0" hangingPunct="1">
+              <a:lnSpc>
+                <a:spcPct val="90000"/>
+              </a:lnSpc>
+              <a:spcBef>
+                <a:spcPts val="500"/>
+              </a:spcBef>
+              <a:buFont typeface="Arial" panose="020B0604020202020204" pitchFamily="34" charset="0"/>
+              <a:buChar char="•"/>
+              <a:defRPr sz="1800" kern="1200">
+                <a:solidFill>
+                  <a:schemeClr val="tx1"/>
+                </a:solidFill>
+                <a:latin typeface="+mn-lt"/>
+                <a:ea typeface="+mn-ea"/>
+                <a:cs typeface="+mn-cs"/>
+              </a:defRPr>
+            </a:lvl7pPr>
+            <a:lvl8pPr marL="3429000" indent="-228600" algn="l" defTabSz="914400" rtl="0" eaLnBrk="1" latinLnBrk="0" hangingPunct="1">
+              <a:lnSpc>
+                <a:spcPct val="90000"/>
+              </a:lnSpc>
+              <a:spcBef>
+                <a:spcPts val="500"/>
+              </a:spcBef>
+              <a:buFont typeface="Arial" panose="020B0604020202020204" pitchFamily="34" charset="0"/>
+              <a:buChar char="•"/>
+              <a:defRPr sz="1800" kern="1200">
+                <a:solidFill>
+                  <a:schemeClr val="tx1"/>
+                </a:solidFill>
+                <a:latin typeface="+mn-lt"/>
+                <a:ea typeface="+mn-ea"/>
+                <a:cs typeface="+mn-cs"/>
+              </a:defRPr>
+            </a:lvl8pPr>
+            <a:lvl9pPr marL="3886200" indent="-228600" algn="l" defTabSz="914400" rtl="0" eaLnBrk="1" latinLnBrk="0" hangingPunct="1">
+              <a:lnSpc>
+                <a:spcPct val="90000"/>
+              </a:lnSpc>
+              <a:spcBef>
+                <a:spcPts val="500"/>
+              </a:spcBef>
+              <a:buFont typeface="Arial" panose="020B0604020202020204" pitchFamily="34" charset="0"/>
+              <a:buChar char="•"/>
+              <a:defRPr sz="1800" kern="1200">
+                <a:solidFill>
+                  <a:schemeClr val="tx1"/>
+                </a:solidFill>
+                <a:latin typeface="+mn-lt"/>
+                <a:ea typeface="+mn-ea"/>
+                <a:cs typeface="+mn-cs"/>
+              </a:defRPr>
+            </a:lvl9pPr>
+          </a:lstStyle>
+          <a:p>
+            <a:pPr marL="228600" marR="0" lvl="0" indent="-228600" algn="l" defTabSz="914400" rtl="0" eaLnBrk="1" fontAlgn="auto" latinLnBrk="0" hangingPunct="1">
+              <a:lnSpc>
+                <a:spcPct val="90000"/>
+              </a:lnSpc>
+              <a:spcBef>
+                <a:spcPts val="1000"/>
+              </a:spcBef>
+              <a:spcAft>
+                <a:spcPts val="0"/>
+              </a:spcAft>
+              <a:buClrTx/>
+              <a:buSzTx/>
+              <a:buFont typeface="Arial" panose="020B0604020202020204" pitchFamily="34" charset="0"/>
+              <a:buChar char="•"/>
+              <a:tabLst/>
+              <a:defRPr/>
+            </a:pPr>
+            <a:r>
+              <a:rPr kumimoji="0" lang="es-CO" sz="2000" b="0" i="0" u="none" strike="noStrike" kern="1200" cap="none" spc="0" normalizeH="0" baseline="0" noProof="0" dirty="0">
+                <a:ln>
+                  <a:noFill/>
+                </a:ln>
+                <a:solidFill>
+                  <a:schemeClr val="tx2">
+                    <a:lumMod val="50000"/>
+                  </a:schemeClr>
+                </a:solidFill>
+                <a:effectLst/>
+                <a:uLnTx/>
+                <a:uFillTx/>
+                <a:latin typeface="Calibri" panose="020F0502020204030204"/>
+                <a:ea typeface="+mn-ea"/>
+                <a:cs typeface="+mn-cs"/>
+              </a:rPr>
+              <a:t>Indirectamente:</a:t>
+            </a:r>
+          </a:p>
+          <a:p>
+            <a:pPr lvl="1">
+              <a:spcBef>
+                <a:spcPts val="1000"/>
+              </a:spcBef>
+              <a:defRPr/>
+            </a:pPr>
+            <a:r>
+              <a:rPr lang="es-CO" sz="1600" dirty="0">
+                <a:solidFill>
+                  <a:schemeClr val="tx2">
+                    <a:lumMod val="50000"/>
+                  </a:schemeClr>
+                </a:solidFill>
+                <a:latin typeface="Calibri" panose="020F0502020204030204"/>
+              </a:rPr>
+              <a:t>Los clientes: Por la calidad de sus productos.</a:t>
+            </a:r>
+          </a:p>
+          <a:p>
+            <a:pPr lvl="1">
+              <a:spcBef>
+                <a:spcPts val="1000"/>
+              </a:spcBef>
+              <a:defRPr/>
+            </a:pPr>
+            <a:r>
+              <a:rPr lang="es-CO" sz="1600" dirty="0">
+                <a:solidFill>
+                  <a:schemeClr val="tx2">
+                    <a:lumMod val="50000"/>
+                  </a:schemeClr>
+                </a:solidFill>
+                <a:latin typeface="Calibri" panose="020F0502020204030204"/>
+              </a:rPr>
+              <a:t>Las familias de los empleados: Por ver poco a sus familiares y no contar con dinero suficiente.</a:t>
+            </a:r>
+          </a:p>
+        </p:txBody>
+      </p:sp>
     </p:spTree>
     <p:extLst>
       <p:ext uri="{BB962C8B-B14F-4D97-AF65-F5344CB8AC3E}">
-        <p14:creationId xmlns:p14="http://schemas.microsoft.com/office/powerpoint/2010/main" val="3356504998"/>
+        <p14:creationId xmlns:p14="http://schemas.microsoft.com/office/powerpoint/2010/main" val="2379376993"/>
       </p:ext>
     </p:extLst>
   </p:cSld>
   <p:clrMapOvr>
     <a:masterClrMapping/>
   </p:clrMapOvr>
+  <p:timing>
+    <p:tnLst>
+      <p:par>
+        <p:cTn id="1" dur="indefinite" restart="never" nodeType="tmRoot"/>
+      </p:par>
+    </p:tnLst>
+  </p:timing>
 </p:sld>
 </file>
 
@@ -10706,7 +12781,7 @@
           <p:cNvPr id="2" name="Shape 76">
             <a:extLst>
               <a:ext uri="{FF2B5EF4-FFF2-40B4-BE49-F238E27FC236}">
-                <a16:creationId xmlns:a16="http://schemas.microsoft.com/office/drawing/2014/main" id="{53C233B4-85B1-4BA1-A512-E0FD3FF78830}"/>
+                <a16:creationId xmlns="" xmlns:a16="http://schemas.microsoft.com/office/drawing/2014/main" id="{53C233B4-85B1-4BA1-A512-E0FD3FF78830}"/>
               </a:ext>
             </a:extLst>
           </p:cNvPr>
@@ -10759,7 +12834,7 @@
           <p:cNvPr id="3" name="Shape 77">
             <a:extLst>
               <a:ext uri="{FF2B5EF4-FFF2-40B4-BE49-F238E27FC236}">
-                <a16:creationId xmlns:a16="http://schemas.microsoft.com/office/drawing/2014/main" id="{08A6C367-C85B-4C21-800C-3BB63CD57AA4}"/>
+                <a16:creationId xmlns="" xmlns:a16="http://schemas.microsoft.com/office/drawing/2014/main" id="{08A6C367-C85B-4C21-800C-3BB63CD57AA4}"/>
               </a:ext>
             </a:extLst>
           </p:cNvPr>
@@ -10791,7 +12866,7 @@
           <p:cNvPr id="4" name="Marcador de contenido 2">
             <a:extLst>
               <a:ext uri="{FF2B5EF4-FFF2-40B4-BE49-F238E27FC236}">
-                <a16:creationId xmlns:a16="http://schemas.microsoft.com/office/drawing/2014/main" id="{C825BB67-98F6-4EED-8DAB-7A6E7335C2A9}"/>
+                <a16:creationId xmlns="" xmlns:a16="http://schemas.microsoft.com/office/drawing/2014/main" id="{C825BB67-98F6-4EED-8DAB-7A6E7335C2A9}"/>
               </a:ext>
             </a:extLst>
           </p:cNvPr>
@@ -11119,6 +13194,13 @@
   <p:clrMapOvr>
     <a:masterClrMapping/>
   </p:clrMapOvr>
+  <p:timing>
+    <p:tnLst>
+      <p:par>
+        <p:cTn id="1" dur="indefinite" restart="never" nodeType="tmRoot"/>
+      </p:par>
+    </p:tnLst>
+  </p:timing>
 </p:sld>
 </file>
 
@@ -11157,7 +13239,7 @@
           <p:cNvPr id="2" name="Shape 76">
             <a:extLst>
               <a:ext uri="{FF2B5EF4-FFF2-40B4-BE49-F238E27FC236}">
-                <a16:creationId xmlns:a16="http://schemas.microsoft.com/office/drawing/2014/main" id="{53C233B4-85B1-4BA1-A512-E0FD3FF78830}"/>
+                <a16:creationId xmlns="" xmlns:a16="http://schemas.microsoft.com/office/drawing/2014/main" id="{53C233B4-85B1-4BA1-A512-E0FD3FF78830}"/>
               </a:ext>
             </a:extLst>
           </p:cNvPr>
@@ -11210,7 +13292,7 @@
           <p:cNvPr id="3" name="Shape 77">
             <a:extLst>
               <a:ext uri="{FF2B5EF4-FFF2-40B4-BE49-F238E27FC236}">
-                <a16:creationId xmlns:a16="http://schemas.microsoft.com/office/drawing/2014/main" id="{08A6C367-C85B-4C21-800C-3BB63CD57AA4}"/>
+                <a16:creationId xmlns="" xmlns:a16="http://schemas.microsoft.com/office/drawing/2014/main" id="{08A6C367-C85B-4C21-800C-3BB63CD57AA4}"/>
               </a:ext>
             </a:extLst>
           </p:cNvPr>
@@ -11242,7 +13324,7 @@
           <p:cNvPr id="4" name="Marcador de contenido 2">
             <a:extLst>
               <a:ext uri="{FF2B5EF4-FFF2-40B4-BE49-F238E27FC236}">
-                <a16:creationId xmlns:a16="http://schemas.microsoft.com/office/drawing/2014/main" id="{C825BB67-98F6-4EED-8DAB-7A6E7335C2A9}"/>
+                <a16:creationId xmlns="" xmlns:a16="http://schemas.microsoft.com/office/drawing/2014/main" id="{C825BB67-98F6-4EED-8DAB-7A6E7335C2A9}"/>
               </a:ext>
             </a:extLst>
           </p:cNvPr>
@@ -11519,6 +13601,13 @@
   <p:clrMapOvr>
     <a:masterClrMapping/>
   </p:clrMapOvr>
+  <p:timing>
+    <p:tnLst>
+      <p:par>
+        <p:cTn id="1" dur="indefinite" restart="never" nodeType="tmRoot"/>
+      </p:par>
+    </p:tnLst>
+  </p:timing>
 </p:sld>
 </file>
 

</xml_diff>